<commit_message>
Cambios en las diapositivas para la sustentación del proyecto
</commit_message>
<xml_diff>
--- a/Documento(s) de proyecto de grado/Presentación del proyecto de grado.pptx
+++ b/Documento(s) de proyecto de grado/Presentación del proyecto de grado.pptx
@@ -6,7 +6,7 @@
     <p:sldMasterId id="2147483672" r:id="rId2"/>
   </p:sldMasterIdLst>
   <p:notesMasterIdLst>
-    <p:notesMasterId r:id="rId22"/>
+    <p:notesMasterId r:id="rId27"/>
   </p:notesMasterIdLst>
   <p:sldIdLst>
     <p:sldId id="256" r:id="rId3"/>
@@ -22,12 +22,17 @@
     <p:sldId id="312" r:id="rId13"/>
     <p:sldId id="324" r:id="rId14"/>
     <p:sldId id="325" r:id="rId15"/>
-    <p:sldId id="328" r:id="rId16"/>
-    <p:sldId id="310" r:id="rId17"/>
-    <p:sldId id="330" r:id="rId18"/>
-    <p:sldId id="317" r:id="rId19"/>
-    <p:sldId id="318" r:id="rId20"/>
-    <p:sldId id="297" r:id="rId21"/>
+    <p:sldId id="336" r:id="rId16"/>
+    <p:sldId id="337" r:id="rId17"/>
+    <p:sldId id="338" r:id="rId18"/>
+    <p:sldId id="343" r:id="rId19"/>
+    <p:sldId id="342" r:id="rId20"/>
+    <p:sldId id="341" r:id="rId21"/>
+    <p:sldId id="344" r:id="rId22"/>
+    <p:sldId id="330" r:id="rId23"/>
+    <p:sldId id="317" r:id="rId24"/>
+    <p:sldId id="318" r:id="rId25"/>
+    <p:sldId id="297" r:id="rId26"/>
   </p:sldIdLst>
   <p:sldSz cx="9144000" cy="6858000" type="screen4x3"/>
   <p:notesSz cx="6858000" cy="9144000"/>
@@ -129,12 +134,12 @@
   <p:extLst>
     <p:ext uri="{EFAFB233-063F-42B5-8137-9DF3F51BA10A}">
       <p15:sldGuideLst xmlns:p15="http://schemas.microsoft.com/office/powerpoint/2012/main">
-        <p15:guide id="1" orient="horz" pos="2160">
+        <p15:guide id="1" orient="horz" pos="2160" userDrawn="1">
           <p15:clr>
             <a:srgbClr val="A4A3A4"/>
           </p15:clr>
         </p15:guide>
-        <p15:guide id="2" pos="2880">
+        <p15:guide id="2" pos="2880" userDrawn="1">
           <p15:clr>
             <a:srgbClr val="A4A3A4"/>
           </p15:clr>
@@ -4859,7 +4864,7 @@
         </p:nvSpPr>
         <p:spPr>
           <a:xfrm>
-            <a:off x="6543675" y="365125"/>
+            <a:off x="6543676" y="365125"/>
             <a:ext cx="1971675" cy="5811838"/>
           </a:xfrm>
         </p:spPr>
@@ -4887,7 +4892,7 @@
         </p:nvSpPr>
         <p:spPr>
           <a:xfrm>
-            <a:off x="628650" y="365125"/>
+            <a:off x="628651" y="365125"/>
             <a:ext cx="5800725" cy="5811838"/>
           </a:xfrm>
         </p:spPr>
@@ -5481,7 +5486,7 @@
         </p:nvSpPr>
         <p:spPr>
           <a:xfrm>
-            <a:off x="623888" y="1709739"/>
+            <a:off x="623888" y="1709741"/>
             <a:ext cx="7886700" cy="2852737"/>
           </a:xfrm>
         </p:spPr>
@@ -5513,7 +5518,7 @@
         </p:nvSpPr>
         <p:spPr>
           <a:xfrm>
-            <a:off x="623888" y="4589464"/>
+            <a:off x="623888" y="4589466"/>
             <a:ext cx="7886700" cy="1500187"/>
           </a:xfrm>
         </p:spPr>
@@ -6037,7 +6042,7 @@
         </p:nvSpPr>
         <p:spPr>
           <a:xfrm>
-            <a:off x="629841" y="365126"/>
+            <a:off x="629841" y="365128"/>
             <a:ext cx="7886700" cy="1325563"/>
           </a:xfrm>
         </p:spPr>
@@ -6187,7 +6192,7 @@
         </p:nvSpPr>
         <p:spPr>
           <a:xfrm>
-            <a:off x="4629150" y="1681163"/>
+            <a:off x="4629151" y="1681163"/>
             <a:ext cx="3887391" cy="823912"/>
           </a:xfrm>
         </p:spPr>
@@ -6252,7 +6257,7 @@
         </p:nvSpPr>
         <p:spPr>
           <a:xfrm>
-            <a:off x="4629150" y="2505075"/>
+            <a:off x="4629151" y="2505075"/>
             <a:ext cx="3887391" cy="3684588"/>
           </a:xfrm>
         </p:spPr>
@@ -6769,7 +6774,7 @@
         </p:nvSpPr>
         <p:spPr>
           <a:xfrm>
-            <a:off x="3887391" y="987426"/>
+            <a:off x="3887391" y="987428"/>
             <a:ext cx="4629150" cy="4873625"/>
           </a:xfrm>
         </p:spPr>
@@ -7256,7 +7261,7 @@
         </p:nvSpPr>
         <p:spPr>
           <a:xfrm>
-            <a:off x="3887391" y="987426"/>
+            <a:off x="3887391" y="987428"/>
             <a:ext cx="4629150" cy="4873625"/>
           </a:xfrm>
         </p:spPr>
@@ -7734,7 +7739,7 @@
         </p:nvSpPr>
         <p:spPr>
           <a:xfrm>
-            <a:off x="6543675" y="365125"/>
+            <a:off x="6543676" y="365125"/>
             <a:ext cx="1971675" cy="5811838"/>
           </a:xfrm>
         </p:spPr>
@@ -7762,7 +7767,7 @@
         </p:nvSpPr>
         <p:spPr>
           <a:xfrm>
-            <a:off x="628650" y="365125"/>
+            <a:off x="628651" y="365125"/>
             <a:ext cx="5800725" cy="5811838"/>
           </a:xfrm>
         </p:spPr>
@@ -7954,7 +7959,7 @@
         </p:nvSpPr>
         <p:spPr>
           <a:xfrm>
-            <a:off x="623888" y="1709739"/>
+            <a:off x="623888" y="1709741"/>
             <a:ext cx="7886700" cy="2852737"/>
           </a:xfrm>
         </p:spPr>
@@ -7986,7 +7991,7 @@
         </p:nvSpPr>
         <p:spPr>
           <a:xfrm>
-            <a:off x="623888" y="4589464"/>
+            <a:off x="623888" y="4589466"/>
             <a:ext cx="7886700" cy="1500187"/>
           </a:xfrm>
         </p:spPr>
@@ -8430,7 +8435,7 @@
         </p:nvSpPr>
         <p:spPr>
           <a:xfrm>
-            <a:off x="629841" y="365126"/>
+            <a:off x="629841" y="365128"/>
             <a:ext cx="7886700" cy="1325563"/>
           </a:xfrm>
         </p:spPr>
@@ -8580,7 +8585,7 @@
         </p:nvSpPr>
         <p:spPr>
           <a:xfrm>
-            <a:off x="4629150" y="1681163"/>
+            <a:off x="4629151" y="1681163"/>
             <a:ext cx="3887391" cy="823912"/>
           </a:xfrm>
         </p:spPr>
@@ -8645,7 +8650,7 @@
         </p:nvSpPr>
         <p:spPr>
           <a:xfrm>
-            <a:off x="4629150" y="2505075"/>
+            <a:off x="4629151" y="2505075"/>
             <a:ext cx="3887391" cy="3684588"/>
           </a:xfrm>
         </p:spPr>
@@ -9042,7 +9047,7 @@
         </p:nvSpPr>
         <p:spPr>
           <a:xfrm>
-            <a:off x="3887391" y="987426"/>
+            <a:off x="3887391" y="987428"/>
             <a:ext cx="4629150" cy="4873625"/>
           </a:xfrm>
         </p:spPr>
@@ -9319,7 +9324,7 @@
         </p:nvSpPr>
         <p:spPr>
           <a:xfrm>
-            <a:off x="3887391" y="987426"/>
+            <a:off x="3887391" y="987428"/>
             <a:ext cx="4629150" cy="4873625"/>
           </a:xfrm>
         </p:spPr>
@@ -9549,7 +9554,7 @@
         </p:nvSpPr>
         <p:spPr>
           <a:xfrm>
-            <a:off x="628650" y="365126"/>
+            <a:off x="628650" y="365128"/>
             <a:ext cx="7886700" cy="1325563"/>
           </a:xfrm>
           <a:prstGeom prst="rect">
@@ -9644,7 +9649,7 @@
         </p:nvSpPr>
         <p:spPr>
           <a:xfrm>
-            <a:off x="628650" y="6356351"/>
+            <a:off x="628650" y="6356353"/>
             <a:ext cx="2057400" cy="365125"/>
           </a:xfrm>
           <a:prstGeom prst="rect">
@@ -9685,7 +9690,7 @@
         </p:nvSpPr>
         <p:spPr>
           <a:xfrm>
-            <a:off x="3028950" y="6356351"/>
+            <a:off x="3028950" y="6356353"/>
             <a:ext cx="3086100" cy="365125"/>
           </a:xfrm>
           <a:prstGeom prst="rect">
@@ -9722,7 +9727,7 @@
         </p:nvSpPr>
         <p:spPr>
           <a:xfrm>
-            <a:off x="6457950" y="6356351"/>
+            <a:off x="6457950" y="6356353"/>
             <a:ext cx="2057400" cy="365125"/>
           </a:xfrm>
           <a:prstGeom prst="rect">
@@ -10098,7 +10103,7 @@
         </p:nvSpPr>
         <p:spPr bwMode="auto">
           <a:xfrm>
-            <a:off x="628650" y="365125"/>
+            <a:off x="628650" y="365127"/>
             <a:ext cx="7886700" cy="1325563"/>
           </a:xfrm>
           <a:prstGeom prst="rect">
@@ -10256,7 +10261,7 @@
         </p:nvSpPr>
         <p:spPr>
           <a:xfrm>
-            <a:off x="628650" y="6356350"/>
+            <a:off x="628650" y="6356352"/>
             <a:ext cx="2057400" cy="365125"/>
           </a:xfrm>
           <a:prstGeom prst="rect">
@@ -10317,7 +10322,7 @@
         </p:nvSpPr>
         <p:spPr>
           <a:xfrm>
-            <a:off x="3028950" y="6356350"/>
+            <a:off x="3028950" y="6356352"/>
             <a:ext cx="3086100" cy="365125"/>
           </a:xfrm>
           <a:prstGeom prst="rect">
@@ -10371,7 +10376,7 @@
         </p:nvSpPr>
         <p:spPr>
           <a:xfrm>
-            <a:off x="6457950" y="6356350"/>
+            <a:off x="6457950" y="6356352"/>
             <a:ext cx="2057400" cy="365125"/>
           </a:xfrm>
           <a:prstGeom prst="rect">
@@ -11030,7 +11035,7 @@
         </p:nvSpPr>
         <p:spPr>
           <a:xfrm>
-            <a:off x="239797" y="964606"/>
+            <a:off x="239799" y="964608"/>
             <a:ext cx="5178167" cy="4928787"/>
           </a:xfrm>
         </p:spPr>
@@ -11133,7 +11138,7 @@
         </p:nvSpPr>
         <p:spPr>
           <a:xfrm>
-            <a:off x="2022591" y="589610"/>
+            <a:off x="2022591" y="589612"/>
             <a:ext cx="6848788" cy="768477"/>
           </a:xfrm>
         </p:spPr>
@@ -11178,7 +11183,7 @@
         </p:nvSpPr>
         <p:spPr>
           <a:xfrm>
-            <a:off x="628650" y="1825625"/>
+            <a:off x="628650" y="1825627"/>
             <a:ext cx="7886700" cy="3081935"/>
           </a:xfrm>
         </p:spPr>
@@ -11223,53 +11228,10 @@
                 <a:latin typeface="Arial" panose="020B0604020202020204" pitchFamily="34" charset="0"/>
                 <a:cs typeface="Arial" panose="020B0604020202020204" pitchFamily="34" charset="0"/>
               </a:rPr>
-              <a:t> (</a:t>
-            </a:r>
-            <a:r>
-              <a:rPr lang="es-CO" sz="1800" dirty="0" err="1">
-                <a:latin typeface="Arial" panose="020B0604020202020204" pitchFamily="34" charset="0"/>
-                <a:cs typeface="Arial" panose="020B0604020202020204" pitchFamily="34" charset="0"/>
-              </a:rPr>
-              <a:t>Very</a:t>
-            </a:r>
-            <a:r>
-              <a:rPr lang="es-CO" sz="1800" dirty="0">
-                <a:latin typeface="Arial" panose="020B0604020202020204" pitchFamily="34" charset="0"/>
-                <a:cs typeface="Arial" panose="020B0604020202020204" pitchFamily="34" charset="0"/>
-              </a:rPr>
-              <a:t> Small </a:t>
-            </a:r>
-            <a:r>
-              <a:rPr lang="es-CO" sz="1800" dirty="0" err="1">
-                <a:latin typeface="Arial" panose="020B0604020202020204" pitchFamily="34" charset="0"/>
-                <a:cs typeface="Arial" panose="020B0604020202020204" pitchFamily="34" charset="0"/>
-              </a:rPr>
-              <a:t>Enterprises</a:t>
-            </a:r>
-            <a:r>
-              <a:rPr lang="es-CO" sz="1800" dirty="0">
-                <a:latin typeface="Arial" panose="020B0604020202020204" pitchFamily="34" charset="0"/>
-                <a:cs typeface="Arial" panose="020B0604020202020204" pitchFamily="34" charset="0"/>
-              </a:rPr>
-              <a:t> (</a:t>
-            </a:r>
-            <a:r>
-              <a:rPr lang="es-CO" sz="1800" dirty="0" err="1">
-                <a:latin typeface="Arial" panose="020B0604020202020204" pitchFamily="34" charset="0"/>
-                <a:cs typeface="Arial" panose="020B0604020202020204" pitchFamily="34" charset="0"/>
-              </a:rPr>
-              <a:t>VSEs</a:t>
-            </a:r>
-            <a:r>
-              <a:rPr lang="es-CO" sz="1800" dirty="0">
-                <a:latin typeface="Arial" panose="020B0604020202020204" pitchFamily="34" charset="0"/>
-                <a:cs typeface="Arial" panose="020B0604020202020204" pitchFamily="34" charset="0"/>
-              </a:rPr>
-              <a:t>))” y se basa en subconjuntos de elementos normativos apropiados, conocidos como perfiles VSE.</a:t>
-            </a:r>
-          </a:p>
-          <a:p>
-            <a:pPr algn="just"/>
+              <a:t> (Very Small Enterprises (VSEs))”. </a:t>
+            </a:r>
+          </a:p>
+          <a:p>
             <a:r>
               <a:rPr lang="es-CO" sz="1800" dirty="0">
                 <a:latin typeface="Arial" panose="020B0604020202020204" pitchFamily="34" charset="0"/>
@@ -11302,7 +11264,7 @@
         </p:blipFill>
         <p:spPr>
           <a:xfrm>
-            <a:off x="2812009" y="4733087"/>
+            <a:off x="2812009" y="4733089"/>
             <a:ext cx="3519982" cy="1759991"/>
           </a:xfrm>
           <a:prstGeom prst="rect">
@@ -11363,7 +11325,7 @@
         </p:nvSpPr>
         <p:spPr>
           <a:xfrm>
-            <a:off x="2022591" y="589610"/>
+            <a:off x="2022591" y="589612"/>
             <a:ext cx="6848788" cy="768477"/>
           </a:xfrm>
         </p:spPr>
@@ -11408,7 +11370,7 @@
         </p:nvSpPr>
         <p:spPr>
           <a:xfrm>
-            <a:off x="628649" y="1825626"/>
+            <a:off x="628651" y="1825626"/>
             <a:ext cx="7995233" cy="906942"/>
           </a:xfrm>
         </p:spPr>
@@ -11446,7 +11408,7 @@
         </p:nvGrpSpPr>
         <p:grpSpPr>
           <a:xfrm>
-            <a:off x="2446871" y="2861384"/>
+            <a:off x="2446873" y="2861384"/>
             <a:ext cx="3952549" cy="2092160"/>
             <a:chOff x="-140874" y="0"/>
             <a:chExt cx="5942992" cy="3513933"/>
@@ -11608,13 +11570,9 @@
                 <a:lnSpc>
                   <a:spcPct val="150000"/>
                 </a:lnSpc>
-                <a:spcAft>
-                  <a:spcPts val="0"/>
-                </a:spcAft>
               </a:pPr>
               <a:r>
                 <a:rPr lang="es-CO" sz="1000" dirty="0">
-                  <a:effectLst/>
                   <a:latin typeface="Arial" panose="020B0604020202020204" pitchFamily="34" charset="0"/>
                   <a:ea typeface="Arial" panose="020B0604020202020204" pitchFamily="34" charset="0"/>
                   <a:cs typeface="Arial" panose="020B0604020202020204" pitchFamily="34" charset="0"/>
@@ -11780,13 +11738,9 @@
                 <a:lnSpc>
                   <a:spcPct val="150000"/>
                 </a:lnSpc>
-                <a:spcAft>
-                  <a:spcPts val="0"/>
-                </a:spcAft>
               </a:pPr>
               <a:r>
                 <a:rPr lang="es-CO" sz="1000" b="1" dirty="0">
-                  <a:effectLst/>
                   <a:latin typeface="Arial" panose="020B0604020202020204" pitchFamily="34" charset="0"/>
                   <a:ea typeface="Arial" panose="020B0604020202020204" pitchFamily="34" charset="0"/>
                   <a:cs typeface="Arial" panose="020B0604020202020204" pitchFamily="34" charset="0"/>
@@ -11795,7 +11749,6 @@
               </a:r>
               <a:r>
                 <a:rPr lang="es-CO" sz="1000" dirty="0">
-                  <a:effectLst/>
                   <a:latin typeface="Arial" panose="020B0604020202020204" pitchFamily="34" charset="0"/>
                   <a:ea typeface="Arial" panose="020B0604020202020204" pitchFamily="34" charset="0"/>
                   <a:cs typeface="Arial" panose="020B0604020202020204" pitchFamily="34" charset="0"/>
@@ -12159,13 +12112,9 @@
                 <a:lnSpc>
                   <a:spcPct val="150000"/>
                 </a:lnSpc>
-                <a:spcAft>
-                  <a:spcPts val="0"/>
-                </a:spcAft>
               </a:pPr>
               <a:r>
                 <a:rPr lang="es-CO" sz="1000" b="1" dirty="0">
-                  <a:effectLst/>
                   <a:latin typeface="Arial" panose="020B0604020202020204" pitchFamily="34" charset="0"/>
                   <a:ea typeface="Arial" panose="020B0604020202020204" pitchFamily="34" charset="0"/>
                   <a:cs typeface="Arial" panose="020B0604020202020204" pitchFamily="34" charset="0"/>
@@ -12174,7 +12123,6 @@
               </a:r>
               <a:r>
                 <a:rPr lang="es-CO" sz="1000" dirty="0">
-                  <a:effectLst/>
                   <a:latin typeface="Arial" panose="020B0604020202020204" pitchFamily="34" charset="0"/>
                   <a:ea typeface="Arial" panose="020B0604020202020204" pitchFamily="34" charset="0"/>
                   <a:cs typeface="Arial" panose="020B0604020202020204" pitchFamily="34" charset="0"/>
@@ -12187,13 +12135,9 @@
                 <a:lnSpc>
                   <a:spcPct val="150000"/>
                 </a:lnSpc>
-                <a:spcAft>
-                  <a:spcPts val="0"/>
-                </a:spcAft>
               </a:pPr>
               <a:r>
                 <a:rPr lang="es-CO" sz="1000" dirty="0">
-                  <a:effectLst/>
                   <a:latin typeface="Arial" panose="020B0604020202020204" pitchFamily="34" charset="0"/>
                   <a:ea typeface="Arial" panose="020B0604020202020204" pitchFamily="34" charset="0"/>
                   <a:cs typeface="Arial" panose="020B0604020202020204" pitchFamily="34" charset="0"/>
@@ -12359,13 +12303,9 @@
                 <a:lnSpc>
                   <a:spcPct val="150000"/>
                 </a:lnSpc>
-                <a:spcAft>
-                  <a:spcPts val="0"/>
-                </a:spcAft>
               </a:pPr>
               <a:r>
                 <a:rPr lang="es-CO" sz="1000" dirty="0">
-                  <a:effectLst/>
                   <a:latin typeface="Arial" panose="020B0604020202020204" pitchFamily="34" charset="0"/>
                   <a:ea typeface="Arial" panose="020B0604020202020204" pitchFamily="34" charset="0"/>
                   <a:cs typeface="Arial" panose="020B0604020202020204" pitchFamily="34" charset="0"/>
@@ -12378,13 +12318,9 @@
                 <a:lnSpc>
                   <a:spcPct val="150000"/>
                 </a:lnSpc>
-                <a:spcAft>
-                  <a:spcPts val="0"/>
-                </a:spcAft>
               </a:pPr>
               <a:r>
                 <a:rPr lang="es-CO" sz="1000" dirty="0">
-                  <a:effectLst/>
                   <a:latin typeface="Arial" panose="020B0604020202020204" pitchFamily="34" charset="0"/>
                   <a:ea typeface="Arial" panose="020B0604020202020204" pitchFamily="34" charset="0"/>
                   <a:cs typeface="Arial" panose="020B0604020202020204" pitchFamily="34" charset="0"/>
@@ -12403,7 +12339,7 @@
         </p:nvSpPr>
         <p:spPr>
           <a:xfrm>
-            <a:off x="628649" y="6138598"/>
+            <a:off x="628651" y="6138600"/>
             <a:ext cx="7266899" cy="338507"/>
           </a:xfrm>
           <a:prstGeom prst="rect">
@@ -12444,7 +12380,7 @@
         </p:nvSpPr>
         <p:spPr>
           <a:xfrm>
-            <a:off x="2891679" y="5210673"/>
+            <a:off x="2891679" y="5210675"/>
             <a:ext cx="3382464" cy="276999"/>
           </a:xfrm>
           <a:prstGeom prst="rect">
@@ -12521,7 +12457,7 @@
         </p:nvSpPr>
         <p:spPr>
           <a:xfrm>
-            <a:off x="2022591" y="589610"/>
+            <a:off x="2022591" y="589612"/>
             <a:ext cx="6848788" cy="768477"/>
           </a:xfrm>
         </p:spPr>
@@ -12539,7 +12475,7 @@
                 <a:latin typeface="Arial" panose="020B0604020202020204" pitchFamily="34" charset="0"/>
                 <a:cs typeface="Arial" panose="020B0604020202020204" pitchFamily="34" charset="0"/>
               </a:rPr>
-              <a:t>Desarrollo</a:t>
+              <a:t>Desarrollo (1/8) - Fases</a:t>
             </a:r>
             <a:endParaRPr lang="es-ES" sz="2500" b="1" dirty="0">
               <a:solidFill>
@@ -12563,7 +12499,7 @@
         </p:nvSpPr>
         <p:spPr>
           <a:xfrm>
-            <a:off x="1627202" y="2089177"/>
+            <a:off x="1627202" y="2089179"/>
             <a:ext cx="5889596" cy="385575"/>
           </a:xfrm>
         </p:spPr>
@@ -12618,7 +12554,7 @@
           </p:nvPr>
         </p:nvGraphicFramePr>
         <p:xfrm>
-          <a:off x="434007" y="2672070"/>
+          <a:off x="434009" y="2672070"/>
           <a:ext cx="8275983" cy="2073136"/>
         </p:xfrm>
         <a:graphic>
@@ -12680,7 +12616,7 @@
         </p:nvSpPr>
         <p:spPr>
           <a:xfrm>
-            <a:off x="2022591" y="589610"/>
+            <a:off x="2022591" y="589612"/>
             <a:ext cx="6848788" cy="768477"/>
           </a:xfrm>
         </p:spPr>
@@ -12698,7 +12634,7 @@
                 <a:latin typeface="Arial" panose="020B0604020202020204" pitchFamily="34" charset="0"/>
                 <a:cs typeface="Arial" panose="020B0604020202020204" pitchFamily="34" charset="0"/>
               </a:rPr>
-              <a:t>Resultados (1/2)</a:t>
+              <a:t>Desarrollo (2/8) – Repositorio del proyecto</a:t>
             </a:r>
             <a:endParaRPr lang="es-ES" sz="2500" b="1" dirty="0">
               <a:solidFill>
@@ -12710,71 +12646,39 @@
           </a:p>
         </p:txBody>
       </p:sp>
-      <p:sp>
-        <p:nvSpPr>
-          <p:cNvPr id="3" name="Marcador de contenido 2"/>
-          <p:cNvSpPr>
-            <a:spLocks noGrp="1"/>
-          </p:cNvSpPr>
-          <p:nvPr>
-            <p:ph idx="1"/>
-          </p:nvPr>
-        </p:nvSpPr>
-        <p:spPr>
-          <a:xfrm>
-            <a:off x="628650" y="1825626"/>
-            <a:ext cx="7886700" cy="372290"/>
-          </a:xfrm>
-        </p:spPr>
-        <p:txBody>
-          <a:bodyPr>
-            <a:normAutofit/>
-          </a:bodyPr>
-          <a:lstStyle/>
-          <a:p>
-            <a:r>
-              <a:rPr lang="es-CO" sz="1800" dirty="0">
-                <a:latin typeface="Arial" panose="020B0604020202020204" pitchFamily="34" charset="0"/>
-                <a:cs typeface="Arial" panose="020B0604020202020204" pitchFamily="34" charset="0"/>
-              </a:rPr>
-              <a:t>Algunos de los resultados que se dieron en este diseño fueron:</a:t>
-            </a:r>
-          </a:p>
-        </p:txBody>
-      </p:sp>
       <p:pic>
         <p:nvPicPr>
-          <p:cNvPr id="12" name="Imagen 11">
+          <p:cNvPr id="8" name="Marcador de contenido 7">
             <a:extLst>
               <a:ext uri="{FF2B5EF4-FFF2-40B4-BE49-F238E27FC236}">
-                <a16:creationId xmlns:a16="http://schemas.microsoft.com/office/drawing/2014/main" id="{207DBE15-3AA1-4575-BC42-8D90CE48E6EC}"/>
+                <a16:creationId xmlns:a16="http://schemas.microsoft.com/office/drawing/2014/main" id="{107943BD-451F-4968-A1EF-AD32F3367205}"/>
               </a:ext>
             </a:extLst>
           </p:cNvPr>
           <p:cNvPicPr>
-            <a:picLocks noChangeAspect="1"/>
+            <a:picLocks noGrp="1" noChangeAspect="1"/>
           </p:cNvPicPr>
-          <p:nvPr/>
+          <p:nvPr>
+            <p:ph idx="1"/>
+          </p:nvPr>
         </p:nvPicPr>
         <p:blipFill>
-          <a:blip r:embed="rId3"/>
+          <a:blip r:embed="rId3">
+            <a:extLst>
+              <a:ext uri="{28A0092B-C50C-407E-A947-70E740481C1C}">
+                <a14:useLocalDpi xmlns:a14="http://schemas.microsoft.com/office/drawing/2010/main" val="0"/>
+              </a:ext>
+            </a:extLst>
+          </a:blip>
           <a:stretch>
             <a:fillRect/>
           </a:stretch>
         </p:blipFill>
         <p:spPr>
           <a:xfrm>
-            <a:off x="847708" y="2588105"/>
-            <a:ext cx="7272835" cy="3429311"/>
+            <a:off x="2022593" y="1585928"/>
+            <a:ext cx="6521963" cy="4476368"/>
           </a:xfrm>
-          <a:prstGeom prst="rect">
-            <a:avLst/>
-          </a:prstGeom>
-          <a:ln>
-            <a:solidFill>
-              <a:schemeClr val="tx1"/>
-            </a:solidFill>
-          </a:ln>
         </p:spPr>
       </p:pic>
       <p:sp>
@@ -12782,7 +12686,7 @@
           <p:cNvPr id="5" name="CuadroTexto 4">
             <a:extLst>
               <a:ext uri="{FF2B5EF4-FFF2-40B4-BE49-F238E27FC236}">
-                <a16:creationId xmlns:a16="http://schemas.microsoft.com/office/drawing/2014/main" id="{668DCA41-D3D5-4E79-8401-09D5FE8262AD}"/>
+                <a16:creationId xmlns:a16="http://schemas.microsoft.com/office/drawing/2014/main" id="{0407966B-CEA6-4EC7-85CA-80EBB5EEF849}"/>
               </a:ext>
             </a:extLst>
           </p:cNvPr>
@@ -12791,18 +12695,13 @@
         </p:nvSpPr>
         <p:spPr>
           <a:xfrm>
-            <a:off x="847708" y="2311107"/>
-            <a:ext cx="7272835" cy="276999"/>
+            <a:off x="301841" y="2921168"/>
+            <a:ext cx="1624614" cy="1015663"/>
           </a:xfrm>
           <a:prstGeom prst="rect">
             <a:avLst/>
           </a:prstGeom>
           <a:noFill/>
-          <a:ln>
-            <a:solidFill>
-              <a:schemeClr val="tx1"/>
-            </a:solidFill>
-          </a:ln>
         </p:spPr>
         <p:txBody>
           <a:bodyPr wrap="square" rtlCol="0">
@@ -12810,13 +12709,19 @@
           </a:bodyPr>
           <a:lstStyle/>
           <a:p>
-            <a:pPr algn="ctr"/>
-            <a:r>
-              <a:rPr lang="es-CO" sz="1200" b="1" dirty="0">
+            <a:r>
+              <a:rPr lang="es-CO" sz="2000" b="1" dirty="0">
                 <a:latin typeface="Arial" panose="020B0604020202020204" pitchFamily="34" charset="0"/>
                 <a:cs typeface="Arial" panose="020B0604020202020204" pitchFamily="34" charset="0"/>
               </a:rPr>
-              <a:t>Registro de estado de progreso</a:t>
+              <a:t>Fase 1: </a:t>
+            </a:r>
+            <a:r>
+              <a:rPr lang="es-CO" sz="2000" dirty="0">
+                <a:latin typeface="Arial" panose="020B0604020202020204" pitchFamily="34" charset="0"/>
+                <a:cs typeface="Arial" panose="020B0604020202020204" pitchFamily="34" charset="0"/>
+              </a:rPr>
+              <a:t>Planificación del proyecto</a:t>
             </a:r>
           </a:p>
         </p:txBody>
@@ -12824,7 +12729,7 @@
     </p:spTree>
     <p:extLst>
       <p:ext uri="{BB962C8B-B14F-4D97-AF65-F5344CB8AC3E}">
-        <p14:creationId xmlns:p14="http://schemas.microsoft.com/office/powerpoint/2010/main" val="2502258909"/>
+        <p14:creationId xmlns:p14="http://schemas.microsoft.com/office/powerpoint/2010/main" val="3201176488"/>
       </p:ext>
     </p:extLst>
   </p:cSld>
@@ -12862,12 +12767,99 @@
           <a:chExt cx="0" cy="0"/>
         </a:xfrm>
       </p:grpSpPr>
+      <p:sp>
+        <p:nvSpPr>
+          <p:cNvPr id="6" name="Título 5"/>
+          <p:cNvSpPr>
+            <a:spLocks noGrp="1"/>
+          </p:cNvSpPr>
+          <p:nvPr>
+            <p:ph type="title"/>
+          </p:nvPr>
+        </p:nvSpPr>
+        <p:spPr>
+          <a:xfrm>
+            <a:off x="2022591" y="589612"/>
+            <a:ext cx="6848788" cy="768477"/>
+          </a:xfrm>
+        </p:spPr>
+        <p:txBody>
+          <a:bodyPr>
+            <a:normAutofit fontScale="90000"/>
+          </a:bodyPr>
+          <a:lstStyle/>
+          <a:p>
+            <a:r>
+              <a:rPr lang="es-CO" sz="2500" b="1" dirty="0">
+                <a:solidFill>
+                  <a:schemeClr val="bg1"/>
+                </a:solidFill>
+                <a:latin typeface="Arial" panose="020B0604020202020204" pitchFamily="34" charset="0"/>
+                <a:cs typeface="Arial" panose="020B0604020202020204" pitchFamily="34" charset="0"/>
+              </a:rPr>
+              <a:t>Desarrollo (3/8) – Resultados de la verificación</a:t>
+            </a:r>
+            <a:endParaRPr lang="es-ES" sz="2500" b="1" dirty="0">
+              <a:solidFill>
+                <a:schemeClr val="bg1"/>
+              </a:solidFill>
+              <a:latin typeface="Arial" panose="020B0604020202020204" pitchFamily="34" charset="0"/>
+              <a:cs typeface="Arial" panose="020B0604020202020204" pitchFamily="34" charset="0"/>
+            </a:endParaRPr>
+          </a:p>
+        </p:txBody>
+      </p:sp>
+      <p:sp>
+        <p:nvSpPr>
+          <p:cNvPr id="5" name="CuadroTexto 4">
+            <a:extLst>
+              <a:ext uri="{FF2B5EF4-FFF2-40B4-BE49-F238E27FC236}">
+                <a16:creationId xmlns:a16="http://schemas.microsoft.com/office/drawing/2014/main" id="{0407966B-CEA6-4EC7-85CA-80EBB5EEF849}"/>
+              </a:ext>
+            </a:extLst>
+          </p:cNvPr>
+          <p:cNvSpPr txBox="1"/>
+          <p:nvPr/>
+        </p:nvSpPr>
+        <p:spPr>
+          <a:xfrm>
+            <a:off x="397977" y="2975154"/>
+            <a:ext cx="1624614" cy="1015663"/>
+          </a:xfrm>
+          <a:prstGeom prst="rect">
+            <a:avLst/>
+          </a:prstGeom>
+          <a:noFill/>
+        </p:spPr>
+        <p:txBody>
+          <a:bodyPr wrap="square" rtlCol="0">
+            <a:spAutoFit/>
+          </a:bodyPr>
+          <a:lstStyle/>
+          <a:p>
+            <a:r>
+              <a:rPr lang="es-CO" sz="2000" b="1" dirty="0">
+                <a:latin typeface="Arial" panose="020B0604020202020204" pitchFamily="34" charset="0"/>
+                <a:cs typeface="Arial" panose="020B0604020202020204" pitchFamily="34" charset="0"/>
+              </a:rPr>
+              <a:t>Fase 1: </a:t>
+            </a:r>
+            <a:r>
+              <a:rPr lang="es-CO" sz="2000" dirty="0">
+                <a:latin typeface="Arial" panose="020B0604020202020204" pitchFamily="34" charset="0"/>
+                <a:cs typeface="Arial" panose="020B0604020202020204" pitchFamily="34" charset="0"/>
+              </a:rPr>
+              <a:t>Planificación del proyecto</a:t>
+            </a:r>
+          </a:p>
+        </p:txBody>
+      </p:sp>
       <p:pic>
         <p:nvPicPr>
-          <p:cNvPr id="4" name="Imagen 3">
+          <p:cNvPr id="10" name="Imagen 9">
             <a:extLst>
               <a:ext uri="{FF2B5EF4-FFF2-40B4-BE49-F238E27FC236}">
-                <a16:creationId xmlns:a16="http://schemas.microsoft.com/office/drawing/2014/main" id="{9DDD1DBB-2D52-4D22-ACF0-F952620A2084}"/>
+                <a16:creationId xmlns:a16="http://schemas.microsoft.com/office/drawing/2014/main" id="{DA07CCCD-9CD8-4F09-810F-899AA08C45B4}"/>
               </a:ext>
             </a:extLst>
           </p:cNvPr>
@@ -12877,154 +12869,31 @@
           <p:nvPr/>
         </p:nvPicPr>
         <p:blipFill>
-          <a:blip r:embed="rId3"/>
+          <a:blip r:embed="rId3">
+            <a:extLst>
+              <a:ext uri="{28A0092B-C50C-407E-A947-70E740481C1C}">
+                <a14:useLocalDpi xmlns:a14="http://schemas.microsoft.com/office/drawing/2010/main" val="0"/>
+              </a:ext>
+            </a:extLst>
+          </a:blip>
           <a:stretch>
             <a:fillRect/>
           </a:stretch>
         </p:blipFill>
         <p:spPr>
           <a:xfrm>
-            <a:off x="177041" y="2256731"/>
-            <a:ext cx="5041732" cy="3306261"/>
+            <a:off x="2805288" y="1524426"/>
+            <a:ext cx="4367871" cy="4932783"/>
           </a:xfrm>
           <a:prstGeom prst="rect">
             <a:avLst/>
           </a:prstGeom>
-          <a:ln>
-            <a:solidFill>
-              <a:schemeClr val="tx1"/>
-            </a:solidFill>
-          </a:ln>
         </p:spPr>
       </p:pic>
-      <p:pic>
-        <p:nvPicPr>
-          <p:cNvPr id="7" name="Marcador de contenido 12">
-            <a:extLst>
-              <a:ext uri="{FF2B5EF4-FFF2-40B4-BE49-F238E27FC236}">
-                <a16:creationId xmlns:a16="http://schemas.microsoft.com/office/drawing/2014/main" id="{2D0E1776-6CB8-4537-AB06-865A760471B4}"/>
-              </a:ext>
-            </a:extLst>
-          </p:cNvPr>
-          <p:cNvPicPr>
-            <a:picLocks noGrp="1" noChangeAspect="1"/>
-          </p:cNvPicPr>
-          <p:nvPr>
-            <p:ph idx="1"/>
-          </p:nvPr>
-        </p:nvPicPr>
-        <p:blipFill>
-          <a:blip r:embed="rId4"/>
-          <a:stretch>
-            <a:fillRect/>
-          </a:stretch>
-        </p:blipFill>
-        <p:spPr>
-          <a:xfrm>
-            <a:off x="5313499" y="1979732"/>
-            <a:ext cx="3653460" cy="3583260"/>
-          </a:xfrm>
-          <a:ln w="6350">
-            <a:noFill/>
-          </a:ln>
-        </p:spPr>
-      </p:pic>
-      <p:sp>
-        <p:nvSpPr>
-          <p:cNvPr id="9" name="CuadroTexto 8">
-            <a:extLst>
-              <a:ext uri="{FF2B5EF4-FFF2-40B4-BE49-F238E27FC236}">
-                <a16:creationId xmlns:a16="http://schemas.microsoft.com/office/drawing/2014/main" id="{79D8F414-9DD2-4E1F-8522-B5413B3CB1F7}"/>
-              </a:ext>
-            </a:extLst>
-          </p:cNvPr>
-          <p:cNvSpPr txBox="1"/>
-          <p:nvPr/>
-        </p:nvSpPr>
-        <p:spPr>
-          <a:xfrm>
-            <a:off x="177041" y="1979732"/>
-            <a:ext cx="5041732" cy="276999"/>
-          </a:xfrm>
-          <a:prstGeom prst="rect">
-            <a:avLst/>
-          </a:prstGeom>
-          <a:noFill/>
-          <a:ln>
-            <a:solidFill>
-              <a:schemeClr val="tx1"/>
-            </a:solidFill>
-          </a:ln>
-        </p:spPr>
-        <p:txBody>
-          <a:bodyPr wrap="square" rtlCol="0">
-            <a:spAutoFit/>
-          </a:bodyPr>
-          <a:lstStyle/>
-          <a:p>
-            <a:pPr algn="ctr"/>
-            <a:r>
-              <a:rPr lang="es-CO" sz="1200" b="1" dirty="0">
-                <a:latin typeface="Arial" panose="020B0604020202020204" pitchFamily="34" charset="0"/>
-                <a:cs typeface="Arial" panose="020B0604020202020204" pitchFamily="34" charset="0"/>
-              </a:rPr>
-              <a:t>Repositorio del proyecto, visto desde la aplicación web de GitHub</a:t>
-            </a:r>
-          </a:p>
-        </p:txBody>
-      </p:sp>
-      <p:sp>
-        <p:nvSpPr>
-          <p:cNvPr id="8" name="Título 5">
-            <a:extLst>
-              <a:ext uri="{FF2B5EF4-FFF2-40B4-BE49-F238E27FC236}">
-                <a16:creationId xmlns:a16="http://schemas.microsoft.com/office/drawing/2014/main" id="{24E20B76-5489-4691-AAAB-982771810931}"/>
-              </a:ext>
-            </a:extLst>
-          </p:cNvPr>
-          <p:cNvSpPr>
-            <a:spLocks noGrp="1"/>
-          </p:cNvSpPr>
-          <p:nvPr>
-            <p:ph type="title"/>
-          </p:nvPr>
-        </p:nvSpPr>
-        <p:spPr>
-          <a:xfrm>
-            <a:off x="2022591" y="589610"/>
-            <a:ext cx="6848788" cy="768477"/>
-          </a:xfrm>
-        </p:spPr>
-        <p:txBody>
-          <a:bodyPr>
-            <a:normAutofit/>
-          </a:bodyPr>
-          <a:lstStyle/>
-          <a:p>
-            <a:r>
-              <a:rPr lang="es-CO" sz="2500" b="1" dirty="0">
-                <a:solidFill>
-                  <a:schemeClr val="bg1"/>
-                </a:solidFill>
-                <a:latin typeface="Arial" panose="020B0604020202020204" pitchFamily="34" charset="0"/>
-                <a:cs typeface="Arial" panose="020B0604020202020204" pitchFamily="34" charset="0"/>
-              </a:rPr>
-              <a:t>Resultados (2/2)</a:t>
-            </a:r>
-            <a:endParaRPr lang="es-ES" sz="2500" b="1" dirty="0">
-              <a:solidFill>
-                <a:schemeClr val="bg1"/>
-              </a:solidFill>
-              <a:latin typeface="Arial" panose="020B0604020202020204" pitchFamily="34" charset="0"/>
-              <a:cs typeface="Arial" panose="020B0604020202020204" pitchFamily="34" charset="0"/>
-            </a:endParaRPr>
-          </a:p>
-        </p:txBody>
-      </p:sp>
     </p:spTree>
     <p:extLst>
       <p:ext uri="{BB962C8B-B14F-4D97-AF65-F5344CB8AC3E}">
-        <p14:creationId xmlns:p14="http://schemas.microsoft.com/office/powerpoint/2010/main" val="2494307130"/>
+        <p14:creationId xmlns:p14="http://schemas.microsoft.com/office/powerpoint/2010/main" val="2377295306"/>
       </p:ext>
     </p:extLst>
   </p:cSld>
@@ -13074,13 +12943,13 @@
         </p:nvSpPr>
         <p:spPr>
           <a:xfrm>
-            <a:off x="2056147" y="589610"/>
+            <a:off x="2022591" y="589612"/>
             <a:ext cx="6848788" cy="768477"/>
           </a:xfrm>
         </p:spPr>
         <p:txBody>
           <a:bodyPr>
-            <a:normAutofit/>
+            <a:normAutofit fontScale="90000"/>
           </a:bodyPr>
           <a:lstStyle/>
           <a:p>
@@ -13092,7 +12961,7 @@
                 <a:latin typeface="Arial" panose="020B0604020202020204" pitchFamily="34" charset="0"/>
                 <a:cs typeface="Arial" panose="020B0604020202020204" pitchFamily="34" charset="0"/>
               </a:rPr>
-              <a:t>Conclusiones</a:t>
+              <a:t>Desarrollo (4/8) – Resultados de la verificación</a:t>
             </a:r>
             <a:endParaRPr lang="es-ES" sz="2500" b="1" dirty="0">
               <a:solidFill>
@@ -13106,64 +12975,89 @@
       </p:sp>
       <p:sp>
         <p:nvSpPr>
-          <p:cNvPr id="2" name="Marcador de contenido 1"/>
-          <p:cNvSpPr>
-            <a:spLocks noGrp="1"/>
-          </p:cNvSpPr>
-          <p:nvPr>
-            <p:ph idx="1"/>
-          </p:nvPr>
+          <p:cNvPr id="5" name="CuadroTexto 4">
+            <a:extLst>
+              <a:ext uri="{FF2B5EF4-FFF2-40B4-BE49-F238E27FC236}">
+                <a16:creationId xmlns:a16="http://schemas.microsoft.com/office/drawing/2014/main" id="{0407966B-CEA6-4EC7-85CA-80EBB5EEF849}"/>
+              </a:ext>
+            </a:extLst>
+          </p:cNvPr>
+          <p:cNvSpPr txBox="1"/>
+          <p:nvPr/>
         </p:nvSpPr>
         <p:spPr>
           <a:xfrm>
-            <a:off x="628650" y="1917052"/>
-            <a:ext cx="7886700" cy="4351338"/>
+            <a:off x="397977" y="3021762"/>
+            <a:ext cx="1714908" cy="1323439"/>
           </a:xfrm>
+          <a:prstGeom prst="rect">
+            <a:avLst/>
+          </a:prstGeom>
+          <a:noFill/>
         </p:spPr>
         <p:txBody>
-          <a:bodyPr>
-            <a:normAutofit fontScale="62500" lnSpcReduction="20000"/>
+          <a:bodyPr wrap="square" rtlCol="0">
+            <a:spAutoFit/>
           </a:bodyPr>
           <a:lstStyle/>
           <a:p>
             <a:r>
-              <a:rPr lang="es-CO" dirty="0">
+              <a:rPr lang="es-CO" sz="2000" b="1" dirty="0">
                 <a:latin typeface="Arial" panose="020B0604020202020204" pitchFamily="34" charset="0"/>
                 <a:cs typeface="Arial" panose="020B0604020202020204" pitchFamily="34" charset="0"/>
               </a:rPr>
-              <a:t>La ISO/IEC 29110 como base para la elaboración de este diseño fue de gran apoyo, puesto que proporcionó los pasos y artefactos necesarios para llevar a cabo el seguimiento y control adecuado de todos los recursos que intervinieron en el proyecto.</a:t>
-            </a:r>
-          </a:p>
-          <a:p>
-            <a:r>
-              <a:rPr lang="es-CO" dirty="0">
+              <a:t>Fase 2: </a:t>
+            </a:r>
+            <a:r>
+              <a:rPr lang="es-CO" sz="2000" dirty="0">
                 <a:latin typeface="Arial" panose="020B0604020202020204" pitchFamily="34" charset="0"/>
                 <a:cs typeface="Arial" panose="020B0604020202020204" pitchFamily="34" charset="0"/>
               </a:rPr>
-              <a:t>A lo largo del seguimiento y control del proyecto de la empresa Sanambiente, se han evidenciado algunos contratiempos en tema de entrega de tareas por parte de los equipos, ya sea porque carecían de conocimientos para realizarlas y tuvieron que apartar un tiempo para saber cómo se hacían, o dependían de otras tareas de otro equipo para poder ejecutar las suyas. En este caso se optó por tomar un plan de contingencia que consistía en adecuar las fechas de entrega de las tareas de cada equipo, de manera que no causaran contratiempo alguno a aquellos que estaban implicados en estas.</a:t>
-            </a:r>
-          </a:p>
-          <a:p>
-            <a:r>
-              <a:rPr lang="es-CO" dirty="0">
-                <a:latin typeface="Arial" panose="020B0604020202020204" pitchFamily="34" charset="0"/>
-                <a:cs typeface="Arial" panose="020B0604020202020204" pitchFamily="34" charset="0"/>
-              </a:rPr>
-              <a:t>El estándar ISO/IEC 29110 ayuda a las VSE de software a mejorar la calidad de sus productos y/o servicios y el rendimiento de sus procesos, proporcionando los lineamientos idóneos para que estas los apliquen sin problemas sobre cualquier proyecto que posean.</a:t>
-            </a:r>
-          </a:p>
-          <a:p>
-            <a:endParaRPr lang="es-CO" u="sng" dirty="0">
-              <a:latin typeface="Arial" panose="020B0604020202020204" pitchFamily="34" charset="0"/>
-              <a:cs typeface="Arial" panose="020B0604020202020204" pitchFamily="34" charset="0"/>
-            </a:endParaRPr>
-          </a:p>
-        </p:txBody>
-      </p:sp>
+              <a:t>Ejecución del plan del proyecto</a:t>
+            </a:r>
+          </a:p>
+        </p:txBody>
+      </p:sp>
+      <p:pic>
+        <p:nvPicPr>
+          <p:cNvPr id="3" name="Imagen 2">
+            <a:extLst>
+              <a:ext uri="{FF2B5EF4-FFF2-40B4-BE49-F238E27FC236}">
+                <a16:creationId xmlns:a16="http://schemas.microsoft.com/office/drawing/2014/main" id="{8750A135-BBE5-4628-BC4B-CB1037C6A3C0}"/>
+              </a:ext>
+            </a:extLst>
+          </p:cNvPr>
+          <p:cNvPicPr>
+            <a:picLocks noChangeAspect="1"/>
+          </p:cNvPicPr>
+          <p:nvPr/>
+        </p:nvPicPr>
+        <p:blipFill>
+          <a:blip r:embed="rId3">
+            <a:extLst>
+              <a:ext uri="{28A0092B-C50C-407E-A947-70E740481C1C}">
+                <a14:useLocalDpi xmlns:a14="http://schemas.microsoft.com/office/drawing/2010/main" val="0"/>
+              </a:ext>
+            </a:extLst>
+          </a:blip>
+          <a:stretch>
+            <a:fillRect/>
+          </a:stretch>
+        </p:blipFill>
+        <p:spPr>
+          <a:xfrm>
+            <a:off x="3052937" y="1490995"/>
+            <a:ext cx="3676337" cy="4989733"/>
+          </a:xfrm>
+          <a:prstGeom prst="rect">
+            <a:avLst/>
+          </a:prstGeom>
+        </p:spPr>
+      </p:pic>
     </p:spTree>
     <p:extLst>
       <p:ext uri="{BB962C8B-B14F-4D97-AF65-F5344CB8AC3E}">
-        <p14:creationId xmlns:p14="http://schemas.microsoft.com/office/powerpoint/2010/main" val="2391272462"/>
+        <p14:creationId xmlns:p14="http://schemas.microsoft.com/office/powerpoint/2010/main" val="2481547083"/>
       </p:ext>
     </p:extLst>
   </p:cSld>
@@ -13213,13 +13107,13 @@
         </p:nvSpPr>
         <p:spPr>
           <a:xfrm>
-            <a:off x="2056147" y="589610"/>
-            <a:ext cx="6848788" cy="768477"/>
+            <a:off x="2022590" y="589612"/>
+            <a:ext cx="7121409" cy="768477"/>
           </a:xfrm>
         </p:spPr>
         <p:txBody>
           <a:bodyPr>
-            <a:normAutofit/>
+            <a:normAutofit fontScale="90000"/>
           </a:bodyPr>
           <a:lstStyle/>
           <a:p>
@@ -13231,7 +13125,7 @@
                 <a:latin typeface="Arial" panose="020B0604020202020204" pitchFamily="34" charset="0"/>
                 <a:cs typeface="Arial" panose="020B0604020202020204" pitchFamily="34" charset="0"/>
               </a:rPr>
-              <a:t>8. Bibliografía</a:t>
+              <a:t>Desarrollo (5/8) – Registro de estado de progreso</a:t>
             </a:r>
             <a:endParaRPr lang="es-ES" sz="2500" b="1" dirty="0">
               <a:solidFill>
@@ -13245,83 +13139,89 @@
       </p:sp>
       <p:sp>
         <p:nvSpPr>
-          <p:cNvPr id="3" name="Marcador de contenido 2"/>
-          <p:cNvSpPr>
-            <a:spLocks noGrp="1"/>
-          </p:cNvSpPr>
-          <p:nvPr>
-            <p:ph idx="1"/>
-          </p:nvPr>
+          <p:cNvPr id="5" name="CuadroTexto 4">
+            <a:extLst>
+              <a:ext uri="{FF2B5EF4-FFF2-40B4-BE49-F238E27FC236}">
+                <a16:creationId xmlns:a16="http://schemas.microsoft.com/office/drawing/2014/main" id="{0407966B-CEA6-4EC7-85CA-80EBB5EEF849}"/>
+              </a:ext>
+            </a:extLst>
+          </p:cNvPr>
+          <p:cNvSpPr txBox="1"/>
+          <p:nvPr/>
         </p:nvSpPr>
         <p:spPr>
           <a:xfrm>
-            <a:off x="628650" y="1951460"/>
-            <a:ext cx="7886700" cy="4013112"/>
+            <a:off x="238186" y="3191210"/>
+            <a:ext cx="1492967" cy="1323439"/>
           </a:xfrm>
+          <a:prstGeom prst="rect">
+            <a:avLst/>
+          </a:prstGeom>
+          <a:noFill/>
         </p:spPr>
         <p:txBody>
-          <a:bodyPr>
-            <a:noAutofit/>
+          <a:bodyPr wrap="square" rtlCol="0">
+            <a:spAutoFit/>
           </a:bodyPr>
           <a:lstStyle/>
           <a:p>
             <a:r>
-              <a:rPr lang="en-US" sz="1800" dirty="0">
+              <a:rPr lang="es-CO" sz="2000" b="1" dirty="0">
                 <a:latin typeface="Arial" panose="020B0604020202020204" pitchFamily="34" charset="0"/>
                 <a:cs typeface="Arial" panose="020B0604020202020204" pitchFamily="34" charset="0"/>
               </a:rPr>
-              <a:t>ISO/IEC. (2011). </a:t>
-            </a:r>
-            <a:r>
-              <a:rPr lang="en-US" sz="1800" i="1" dirty="0">
+              <a:t>Fase 2: </a:t>
+            </a:r>
+            <a:r>
+              <a:rPr lang="es-CO" sz="2000" dirty="0">
                 <a:latin typeface="Arial" panose="020B0604020202020204" pitchFamily="34" charset="0"/>
                 <a:cs typeface="Arial" panose="020B0604020202020204" pitchFamily="34" charset="0"/>
               </a:rPr>
-              <a:t>Software engineering - Lifecycle profiles for Very Small Entities (VSEs) Part 5-1-2: Management and engineering guide: Generic profile group: Basic profile</a:t>
-            </a:r>
-            <a:r>
-              <a:rPr lang="en-US" sz="1800" dirty="0">
-                <a:latin typeface="Arial" panose="020B0604020202020204" pitchFamily="34" charset="0"/>
-                <a:cs typeface="Arial" panose="020B0604020202020204" pitchFamily="34" charset="0"/>
-              </a:rPr>
-              <a:t>.</a:t>
-            </a:r>
-          </a:p>
-          <a:p>
-            <a:r>
-              <a:rPr lang="es-CO" sz="1800" dirty="0">
-                <a:latin typeface="Arial" panose="020B0604020202020204" pitchFamily="34" charset="0"/>
-                <a:cs typeface="Arial" panose="020B0604020202020204" pitchFamily="34" charset="0"/>
-              </a:rPr>
-              <a:t>Sanambiente. (s. f.). </a:t>
-            </a:r>
-            <a:r>
-              <a:rPr lang="es-CO" sz="1800" i="1" dirty="0">
-                <a:latin typeface="Arial" panose="020B0604020202020204" pitchFamily="34" charset="0"/>
-                <a:cs typeface="Arial" panose="020B0604020202020204" pitchFamily="34" charset="0"/>
-              </a:rPr>
-              <a:t>Sanambiente</a:t>
-            </a:r>
-            <a:r>
-              <a:rPr lang="es-CO" sz="1800" dirty="0">
-                <a:latin typeface="Arial" panose="020B0604020202020204" pitchFamily="34" charset="0"/>
-                <a:cs typeface="Arial" panose="020B0604020202020204" pitchFamily="34" charset="0"/>
-              </a:rPr>
-              <a:t>. Recuperado 19 de marzo de 2019, de https://www.sanambiente.com.co/index.php/nosotros</a:t>
-            </a:r>
-          </a:p>
-          <a:p>
-            <a:endParaRPr lang="es-MX" sz="1700" dirty="0">
-              <a:latin typeface="Times New Roman" panose="02020603050405020304" pitchFamily="18" charset="0"/>
-              <a:cs typeface="Times New Roman" panose="02020603050405020304" pitchFamily="18" charset="0"/>
-            </a:endParaRPr>
-          </a:p>
-        </p:txBody>
-      </p:sp>
+              <a:t>Ejecución del plan del proyecto</a:t>
+            </a:r>
+          </a:p>
+        </p:txBody>
+      </p:sp>
+      <p:pic>
+        <p:nvPicPr>
+          <p:cNvPr id="7" name="Imagen 6">
+            <a:extLst>
+              <a:ext uri="{FF2B5EF4-FFF2-40B4-BE49-F238E27FC236}">
+                <a16:creationId xmlns:a16="http://schemas.microsoft.com/office/drawing/2014/main" id="{47DA4048-F9C4-4B52-93C7-1FFEC6C3E7AB}"/>
+              </a:ext>
+            </a:extLst>
+          </p:cNvPr>
+          <p:cNvPicPr>
+            <a:picLocks noChangeAspect="1"/>
+          </p:cNvPicPr>
+          <p:nvPr/>
+        </p:nvPicPr>
+        <p:blipFill>
+          <a:blip r:embed="rId3">
+            <a:extLst>
+              <a:ext uri="{28A0092B-C50C-407E-A947-70E740481C1C}">
+                <a14:useLocalDpi xmlns:a14="http://schemas.microsoft.com/office/drawing/2010/main" val="0"/>
+              </a:ext>
+            </a:extLst>
+          </a:blip>
+          <a:stretch>
+            <a:fillRect/>
+          </a:stretch>
+        </p:blipFill>
+        <p:spPr>
+          <a:xfrm>
+            <a:off x="1731153" y="2095172"/>
+            <a:ext cx="7302898" cy="3524393"/>
+          </a:xfrm>
+          <a:prstGeom prst="rect">
+            <a:avLst/>
+          </a:prstGeom>
+        </p:spPr>
+      </p:pic>
     </p:spTree>
     <p:extLst>
       <p:ext uri="{BB962C8B-B14F-4D97-AF65-F5344CB8AC3E}">
-        <p14:creationId xmlns:p14="http://schemas.microsoft.com/office/powerpoint/2010/main" val="3846946407"/>
+        <p14:creationId xmlns:p14="http://schemas.microsoft.com/office/powerpoint/2010/main" val="2838545341"/>
       </p:ext>
     </p:extLst>
   </p:cSld>
@@ -13361,7 +13261,7 @@
       </p:grpSpPr>
       <p:sp>
         <p:nvSpPr>
-          <p:cNvPr id="4" name="Título 3"/>
+          <p:cNvPr id="6" name="Título 5"/>
           <p:cNvSpPr>
             <a:spLocks noGrp="1"/>
           </p:cNvSpPr>
@@ -13371,7 +13271,1165 @@
         </p:nvSpPr>
         <p:spPr>
           <a:xfrm>
-            <a:off x="156443" y="2981277"/>
+            <a:off x="2022591" y="589612"/>
+            <a:ext cx="6848788" cy="768477"/>
+          </a:xfrm>
+        </p:spPr>
+        <p:txBody>
+          <a:bodyPr>
+            <a:normAutofit/>
+          </a:bodyPr>
+          <a:lstStyle/>
+          <a:p>
+            <a:r>
+              <a:rPr lang="es-CO" sz="2500" b="1" dirty="0">
+                <a:solidFill>
+                  <a:schemeClr val="bg1"/>
+                </a:solidFill>
+                <a:latin typeface="Arial" panose="020B0604020202020204" pitchFamily="34" charset="0"/>
+                <a:cs typeface="Arial" panose="020B0604020202020204" pitchFamily="34" charset="0"/>
+              </a:rPr>
+              <a:t>Desarrollo (6/8) – Solicitud de cambio</a:t>
+            </a:r>
+            <a:endParaRPr lang="es-ES" sz="2500" b="1" dirty="0">
+              <a:solidFill>
+                <a:schemeClr val="bg1"/>
+              </a:solidFill>
+              <a:latin typeface="Arial" panose="020B0604020202020204" pitchFamily="34" charset="0"/>
+              <a:cs typeface="Arial" panose="020B0604020202020204" pitchFamily="34" charset="0"/>
+            </a:endParaRPr>
+          </a:p>
+        </p:txBody>
+      </p:sp>
+      <p:sp>
+        <p:nvSpPr>
+          <p:cNvPr id="5" name="CuadroTexto 4">
+            <a:extLst>
+              <a:ext uri="{FF2B5EF4-FFF2-40B4-BE49-F238E27FC236}">
+                <a16:creationId xmlns:a16="http://schemas.microsoft.com/office/drawing/2014/main" id="{0407966B-CEA6-4EC7-85CA-80EBB5EEF849}"/>
+              </a:ext>
+            </a:extLst>
+          </p:cNvPr>
+          <p:cNvSpPr txBox="1"/>
+          <p:nvPr/>
+        </p:nvSpPr>
+        <p:spPr>
+          <a:xfrm>
+            <a:off x="522264" y="2986251"/>
+            <a:ext cx="1714908" cy="1323439"/>
+          </a:xfrm>
+          <a:prstGeom prst="rect">
+            <a:avLst/>
+          </a:prstGeom>
+          <a:noFill/>
+        </p:spPr>
+        <p:txBody>
+          <a:bodyPr wrap="square" rtlCol="0">
+            <a:spAutoFit/>
+          </a:bodyPr>
+          <a:lstStyle/>
+          <a:p>
+            <a:r>
+              <a:rPr lang="es-CO" sz="2000" b="1" dirty="0">
+                <a:latin typeface="Arial" panose="020B0604020202020204" pitchFamily="34" charset="0"/>
+                <a:cs typeface="Arial" panose="020B0604020202020204" pitchFamily="34" charset="0"/>
+              </a:rPr>
+              <a:t>Fase 2: </a:t>
+            </a:r>
+            <a:r>
+              <a:rPr lang="es-CO" sz="2000" dirty="0">
+                <a:latin typeface="Arial" panose="020B0604020202020204" pitchFamily="34" charset="0"/>
+                <a:cs typeface="Arial" panose="020B0604020202020204" pitchFamily="34" charset="0"/>
+              </a:rPr>
+              <a:t>Ejecución del plan del proyecto</a:t>
+            </a:r>
+          </a:p>
+        </p:txBody>
+      </p:sp>
+      <p:pic>
+        <p:nvPicPr>
+          <p:cNvPr id="9" name="Imagen 8">
+            <a:extLst>
+              <a:ext uri="{FF2B5EF4-FFF2-40B4-BE49-F238E27FC236}">
+                <a16:creationId xmlns:a16="http://schemas.microsoft.com/office/drawing/2014/main" id="{00F2C38D-CFE8-4214-A406-5CBF9A1FAA93}"/>
+              </a:ext>
+            </a:extLst>
+          </p:cNvPr>
+          <p:cNvPicPr>
+            <a:picLocks noChangeAspect="1"/>
+          </p:cNvPicPr>
+          <p:nvPr/>
+        </p:nvPicPr>
+        <p:blipFill>
+          <a:blip r:embed="rId3">
+            <a:extLst>
+              <a:ext uri="{28A0092B-C50C-407E-A947-70E740481C1C}">
+                <a14:useLocalDpi xmlns:a14="http://schemas.microsoft.com/office/drawing/2010/main" val="0"/>
+              </a:ext>
+            </a:extLst>
+          </a:blip>
+          <a:stretch>
+            <a:fillRect/>
+          </a:stretch>
+        </p:blipFill>
+        <p:spPr>
+          <a:xfrm>
+            <a:off x="3049366" y="1511229"/>
+            <a:ext cx="4123791" cy="4961345"/>
+          </a:xfrm>
+          <a:prstGeom prst="rect">
+            <a:avLst/>
+          </a:prstGeom>
+        </p:spPr>
+      </p:pic>
+    </p:spTree>
+    <p:extLst>
+      <p:ext uri="{BB962C8B-B14F-4D97-AF65-F5344CB8AC3E}">
+        <p14:creationId xmlns:p14="http://schemas.microsoft.com/office/powerpoint/2010/main" val="2307950092"/>
+      </p:ext>
+    </p:extLst>
+  </p:cSld>
+  <p:clrMapOvr>
+    <a:masterClrMapping/>
+  </p:clrMapOvr>
+</p:sld>
+</file>
+
+<file path=ppt/slides/slide19.xml><?xml version="1.0" encoding="utf-8"?>
+<p:sld xmlns:a="http://schemas.openxmlformats.org/drawingml/2006/main" xmlns:r="http://schemas.openxmlformats.org/officeDocument/2006/relationships" xmlns:p="http://schemas.openxmlformats.org/presentationml/2006/main">
+  <p:cSld>
+    <p:bg>
+      <p:bgPr>
+        <a:blipFill rotWithShape="1">
+          <a:blip r:embed="rId2"/>
+          <a:stretch>
+            <a:fillRect/>
+          </a:stretch>
+        </a:blipFill>
+        <a:effectLst/>
+      </p:bgPr>
+    </p:bg>
+    <p:spTree>
+      <p:nvGrpSpPr>
+        <p:cNvPr id="1" name=""/>
+        <p:cNvGrpSpPr/>
+        <p:nvPr/>
+      </p:nvGrpSpPr>
+      <p:grpSpPr>
+        <a:xfrm>
+          <a:off x="0" y="0"/>
+          <a:ext cx="0" cy="0"/>
+          <a:chOff x="0" y="0"/>
+          <a:chExt cx="0" cy="0"/>
+        </a:xfrm>
+      </p:grpSpPr>
+      <p:sp>
+        <p:nvSpPr>
+          <p:cNvPr id="6" name="Título 5"/>
+          <p:cNvSpPr>
+            <a:spLocks noGrp="1"/>
+          </p:cNvSpPr>
+          <p:nvPr>
+            <p:ph type="title"/>
+          </p:nvPr>
+        </p:nvSpPr>
+        <p:spPr>
+          <a:xfrm>
+            <a:off x="2022591" y="589612"/>
+            <a:ext cx="6848788" cy="768477"/>
+          </a:xfrm>
+        </p:spPr>
+        <p:txBody>
+          <a:bodyPr>
+            <a:normAutofit/>
+          </a:bodyPr>
+          <a:lstStyle/>
+          <a:p>
+            <a:r>
+              <a:rPr lang="es-CO" sz="2500" b="1" dirty="0">
+                <a:solidFill>
+                  <a:schemeClr val="bg1"/>
+                </a:solidFill>
+                <a:latin typeface="Arial" panose="020B0604020202020204" pitchFamily="34" charset="0"/>
+                <a:cs typeface="Arial" panose="020B0604020202020204" pitchFamily="34" charset="0"/>
+              </a:rPr>
+              <a:t>Desarrollo (7/8) – Registro de corrección</a:t>
+            </a:r>
+            <a:endParaRPr lang="es-ES" sz="2500" b="1" dirty="0">
+              <a:solidFill>
+                <a:schemeClr val="bg1"/>
+              </a:solidFill>
+              <a:latin typeface="Arial" panose="020B0604020202020204" pitchFamily="34" charset="0"/>
+              <a:cs typeface="Arial" panose="020B0604020202020204" pitchFamily="34" charset="0"/>
+            </a:endParaRPr>
+          </a:p>
+        </p:txBody>
+      </p:sp>
+      <p:sp>
+        <p:nvSpPr>
+          <p:cNvPr id="5" name="CuadroTexto 4">
+            <a:extLst>
+              <a:ext uri="{FF2B5EF4-FFF2-40B4-BE49-F238E27FC236}">
+                <a16:creationId xmlns:a16="http://schemas.microsoft.com/office/drawing/2014/main" id="{0407966B-CEA6-4EC7-85CA-80EBB5EEF849}"/>
+              </a:ext>
+            </a:extLst>
+          </p:cNvPr>
+          <p:cNvSpPr txBox="1"/>
+          <p:nvPr/>
+        </p:nvSpPr>
+        <p:spPr>
+          <a:xfrm>
+            <a:off x="397977" y="3021762"/>
+            <a:ext cx="1624614" cy="1323439"/>
+          </a:xfrm>
+          <a:prstGeom prst="rect">
+            <a:avLst/>
+          </a:prstGeom>
+          <a:noFill/>
+        </p:spPr>
+        <p:txBody>
+          <a:bodyPr wrap="square" rtlCol="0">
+            <a:spAutoFit/>
+          </a:bodyPr>
+          <a:lstStyle/>
+          <a:p>
+            <a:r>
+              <a:rPr lang="es-CO" sz="2000" b="1" dirty="0">
+                <a:latin typeface="Arial" panose="020B0604020202020204" pitchFamily="34" charset="0"/>
+                <a:cs typeface="Arial" panose="020B0604020202020204" pitchFamily="34" charset="0"/>
+              </a:rPr>
+              <a:t>Fase 3: </a:t>
+            </a:r>
+            <a:r>
+              <a:rPr lang="es-CO" sz="2000" dirty="0">
+                <a:latin typeface="Arial" panose="020B0604020202020204" pitchFamily="34" charset="0"/>
+                <a:cs typeface="Arial" panose="020B0604020202020204" pitchFamily="34" charset="0"/>
+              </a:rPr>
+              <a:t>Evaluación y control del proyecto</a:t>
+            </a:r>
+          </a:p>
+        </p:txBody>
+      </p:sp>
+      <p:pic>
+        <p:nvPicPr>
+          <p:cNvPr id="3" name="Imagen 2">
+            <a:extLst>
+              <a:ext uri="{FF2B5EF4-FFF2-40B4-BE49-F238E27FC236}">
+                <a16:creationId xmlns:a16="http://schemas.microsoft.com/office/drawing/2014/main" id="{F31ED79A-85C3-4F98-8091-460F2A4A88AE}"/>
+              </a:ext>
+            </a:extLst>
+          </p:cNvPr>
+          <p:cNvPicPr>
+            <a:picLocks noChangeAspect="1"/>
+          </p:cNvPicPr>
+          <p:nvPr/>
+        </p:nvPicPr>
+        <p:blipFill>
+          <a:blip r:embed="rId3">
+            <a:extLst>
+              <a:ext uri="{28A0092B-C50C-407E-A947-70E740481C1C}">
+                <a14:useLocalDpi xmlns:a14="http://schemas.microsoft.com/office/drawing/2010/main" val="0"/>
+              </a:ext>
+            </a:extLst>
+          </a:blip>
+          <a:stretch>
+            <a:fillRect/>
+          </a:stretch>
+        </p:blipFill>
+        <p:spPr>
+          <a:xfrm>
+            <a:off x="2394141" y="1628246"/>
+            <a:ext cx="5284709" cy="4720042"/>
+          </a:xfrm>
+          <a:prstGeom prst="rect">
+            <a:avLst/>
+          </a:prstGeom>
+        </p:spPr>
+      </p:pic>
+    </p:spTree>
+    <p:extLst>
+      <p:ext uri="{BB962C8B-B14F-4D97-AF65-F5344CB8AC3E}">
+        <p14:creationId xmlns:p14="http://schemas.microsoft.com/office/powerpoint/2010/main" val="3061872153"/>
+      </p:ext>
+    </p:extLst>
+  </p:cSld>
+  <p:clrMapOvr>
+    <a:masterClrMapping/>
+  </p:clrMapOvr>
+</p:sld>
+</file>
+
+<file path=ppt/slides/slide2.xml><?xml version="1.0" encoding="utf-8"?>
+<p:sld xmlns:a="http://schemas.openxmlformats.org/drawingml/2006/main" xmlns:r="http://schemas.openxmlformats.org/officeDocument/2006/relationships" xmlns:p="http://schemas.openxmlformats.org/presentationml/2006/main">
+  <p:cSld>
+    <p:bg>
+      <p:bgPr>
+        <a:blipFill rotWithShape="1">
+          <a:blip r:embed="rId2"/>
+          <a:stretch>
+            <a:fillRect/>
+          </a:stretch>
+        </a:blipFill>
+        <a:effectLst/>
+      </p:bgPr>
+    </p:bg>
+    <p:spTree>
+      <p:nvGrpSpPr>
+        <p:cNvPr id="1" name=""/>
+        <p:cNvGrpSpPr/>
+        <p:nvPr/>
+      </p:nvGrpSpPr>
+      <p:grpSpPr>
+        <a:xfrm>
+          <a:off x="0" y="0"/>
+          <a:ext cx="0" cy="0"/>
+          <a:chOff x="0" y="0"/>
+          <a:chExt cx="0" cy="0"/>
+        </a:xfrm>
+      </p:grpSpPr>
+      <p:sp>
+        <p:nvSpPr>
+          <p:cNvPr id="4" name="Título 3"/>
+          <p:cNvSpPr>
+            <a:spLocks noGrp="1"/>
+          </p:cNvSpPr>
+          <p:nvPr>
+            <p:ph type="title"/>
+          </p:nvPr>
+        </p:nvSpPr>
+        <p:spPr>
+          <a:xfrm>
+            <a:off x="244367" y="290148"/>
+            <a:ext cx="8768866" cy="6145823"/>
+          </a:xfrm>
+        </p:spPr>
+        <p:txBody>
+          <a:bodyPr>
+            <a:noAutofit/>
+          </a:bodyPr>
+          <a:lstStyle/>
+          <a:p>
+            <a:pPr algn="ctr"/>
+            <a:r>
+              <a:rPr lang="es-CO" sz="2500" b="1" dirty="0">
+                <a:solidFill>
+                  <a:schemeClr val="bg1"/>
+                </a:solidFill>
+                <a:latin typeface="Arial" panose="020B0604020202020204" pitchFamily="34" charset="0"/>
+                <a:cs typeface="Arial" panose="020B0604020202020204" pitchFamily="34" charset="0"/>
+              </a:rPr>
+              <a:t>Desarrollo de un marco de trabajo siguiendo el estándar ISO/IEC 29110 para el caso de estudio de integración de procesos del proyecto </a:t>
+            </a:r>
+            <a:r>
+              <a:rPr lang="es-CO" sz="2500" b="1" dirty="0" err="1">
+                <a:solidFill>
+                  <a:schemeClr val="bg1"/>
+                </a:solidFill>
+                <a:latin typeface="Arial" panose="020B0604020202020204" pitchFamily="34" charset="0"/>
+                <a:cs typeface="Arial" panose="020B0604020202020204" pitchFamily="34" charset="0"/>
+              </a:rPr>
+              <a:t>sanambiente</a:t>
+            </a:r>
+            <a:r>
+              <a:rPr lang="es-CO" sz="2500" b="1" dirty="0">
+                <a:solidFill>
+                  <a:schemeClr val="bg1"/>
+                </a:solidFill>
+                <a:latin typeface="Arial" panose="020B0604020202020204" pitchFamily="34" charset="0"/>
+                <a:cs typeface="Arial" panose="020B0604020202020204" pitchFamily="34" charset="0"/>
+              </a:rPr>
+              <a:t>.</a:t>
+            </a:r>
+            <a:br>
+              <a:rPr lang="es-CO" sz="2500" dirty="0">
+                <a:solidFill>
+                  <a:schemeClr val="bg1"/>
+                </a:solidFill>
+                <a:latin typeface="Arial" panose="020B0604020202020204" pitchFamily="34" charset="0"/>
+                <a:cs typeface="Arial" panose="020B0604020202020204" pitchFamily="34" charset="0"/>
+              </a:rPr>
+            </a:br>
+            <a:br>
+              <a:rPr lang="es-ES" sz="2500" b="1" dirty="0">
+                <a:solidFill>
+                  <a:schemeClr val="bg1"/>
+                </a:solidFill>
+                <a:latin typeface="Arial" panose="020B0604020202020204" pitchFamily="34" charset="0"/>
+                <a:cs typeface="Arial" panose="020B0604020202020204" pitchFamily="34" charset="0"/>
+              </a:rPr>
+            </a:br>
+            <a:r>
+              <a:rPr lang="es-ES" sz="2500" b="1" dirty="0">
+                <a:solidFill>
+                  <a:schemeClr val="bg1"/>
+                </a:solidFill>
+                <a:latin typeface="Arial" panose="020B0604020202020204" pitchFamily="34" charset="0"/>
+                <a:cs typeface="Arial" panose="020B0604020202020204" pitchFamily="34" charset="0"/>
+              </a:rPr>
+              <a:t>Integrantes:</a:t>
+            </a:r>
+            <a:br>
+              <a:rPr lang="es-ES" sz="2500" dirty="0">
+                <a:solidFill>
+                  <a:schemeClr val="bg1"/>
+                </a:solidFill>
+                <a:latin typeface="Arial" panose="020B0604020202020204" pitchFamily="34" charset="0"/>
+                <a:cs typeface="Arial" panose="020B0604020202020204" pitchFamily="34" charset="0"/>
+              </a:rPr>
+            </a:br>
+            <a:r>
+              <a:rPr lang="es-ES" sz="2500" dirty="0">
+                <a:solidFill>
+                  <a:schemeClr val="bg1"/>
+                </a:solidFill>
+                <a:latin typeface="Arial" panose="020B0604020202020204" pitchFamily="34" charset="0"/>
+                <a:cs typeface="Arial" panose="020B0604020202020204" pitchFamily="34" charset="0"/>
+              </a:rPr>
+              <a:t>Aarón Levi Grajales Gómez </a:t>
+            </a:r>
+            <a:br>
+              <a:rPr lang="es-ES" sz="2500" dirty="0">
+                <a:solidFill>
+                  <a:schemeClr val="bg1"/>
+                </a:solidFill>
+                <a:latin typeface="Arial" panose="020B0604020202020204" pitchFamily="34" charset="0"/>
+                <a:cs typeface="Arial" panose="020B0604020202020204" pitchFamily="34" charset="0"/>
+              </a:rPr>
+            </a:br>
+            <a:r>
+              <a:rPr lang="es-ES" sz="2500" dirty="0">
+                <a:solidFill>
+                  <a:schemeClr val="bg1"/>
+                </a:solidFill>
+                <a:latin typeface="Arial" panose="020B0604020202020204" pitchFamily="34" charset="0"/>
+                <a:cs typeface="Arial" panose="020B0604020202020204" pitchFamily="34" charset="0"/>
+              </a:rPr>
+              <a:t>Cristhian Fernando Balanta Pazú</a:t>
+            </a:r>
+            <a:br>
+              <a:rPr lang="es-ES" sz="2500" dirty="0">
+                <a:solidFill>
+                  <a:schemeClr val="bg1"/>
+                </a:solidFill>
+                <a:latin typeface="Arial" panose="020B0604020202020204" pitchFamily="34" charset="0"/>
+                <a:cs typeface="Arial" panose="020B0604020202020204" pitchFamily="34" charset="0"/>
+              </a:rPr>
+            </a:br>
+            <a:br>
+              <a:rPr lang="es-ES" sz="2500" dirty="0">
+                <a:solidFill>
+                  <a:schemeClr val="bg1"/>
+                </a:solidFill>
+                <a:latin typeface="Arial" panose="020B0604020202020204" pitchFamily="34" charset="0"/>
+                <a:cs typeface="Arial" panose="020B0604020202020204" pitchFamily="34" charset="0"/>
+              </a:rPr>
+            </a:br>
+            <a:br>
+              <a:rPr lang="es-ES" sz="2500" dirty="0">
+                <a:solidFill>
+                  <a:schemeClr val="bg1"/>
+                </a:solidFill>
+                <a:latin typeface="Arial" panose="020B0604020202020204" pitchFamily="34" charset="0"/>
+                <a:cs typeface="Arial" panose="020B0604020202020204" pitchFamily="34" charset="0"/>
+              </a:rPr>
+            </a:br>
+            <a:r>
+              <a:rPr lang="es-CO" sz="2500" b="1" dirty="0">
+                <a:solidFill>
+                  <a:schemeClr val="bg1"/>
+                </a:solidFill>
+                <a:latin typeface="Arial" panose="020B0604020202020204" pitchFamily="34" charset="0"/>
+                <a:cs typeface="Arial" panose="020B0604020202020204" pitchFamily="34" charset="0"/>
+              </a:rPr>
+              <a:t>Semillero ITMedia - grupo de investigación GRINTIC</a:t>
+            </a:r>
+            <a:br>
+              <a:rPr lang="es-CO" sz="2500" b="1" dirty="0">
+                <a:solidFill>
+                  <a:schemeClr val="bg1"/>
+                </a:solidFill>
+                <a:latin typeface="Arial" panose="020B0604020202020204" pitchFamily="34" charset="0"/>
+                <a:cs typeface="Arial" panose="020B0604020202020204" pitchFamily="34" charset="0"/>
+              </a:rPr>
+            </a:br>
+            <a:r>
+              <a:rPr lang="es-CO" sz="2500" b="1" dirty="0">
+                <a:solidFill>
+                  <a:schemeClr val="bg1"/>
+                </a:solidFill>
+                <a:latin typeface="Arial" panose="020B0604020202020204" pitchFamily="34" charset="0"/>
+                <a:cs typeface="Arial" panose="020B0604020202020204" pitchFamily="34" charset="0"/>
+              </a:rPr>
+              <a:t>Tutora: </a:t>
+            </a:r>
+            <a:r>
+              <a:rPr lang="es-CO" sz="2500" dirty="0">
+                <a:solidFill>
+                  <a:schemeClr val="bg1"/>
+                </a:solidFill>
+                <a:latin typeface="Arial" panose="020B0604020202020204" pitchFamily="34" charset="0"/>
+                <a:cs typeface="Arial" panose="020B0604020202020204" pitchFamily="34" charset="0"/>
+              </a:rPr>
+              <a:t>Beatriz E. Marín</a:t>
+            </a:r>
+            <a:br>
+              <a:rPr lang="es-CO" sz="2500" b="1" dirty="0">
+                <a:solidFill>
+                  <a:schemeClr val="bg1"/>
+                </a:solidFill>
+                <a:latin typeface="Arial" panose="020B0604020202020204" pitchFamily="34" charset="0"/>
+                <a:cs typeface="Arial" panose="020B0604020202020204" pitchFamily="34" charset="0"/>
+              </a:rPr>
+            </a:br>
+            <a:br>
+              <a:rPr lang="es-ES" sz="2500" dirty="0">
+                <a:solidFill>
+                  <a:schemeClr val="bg1"/>
+                </a:solidFill>
+                <a:latin typeface="Arial" panose="020B0604020202020204" pitchFamily="34" charset="0"/>
+                <a:cs typeface="Arial" panose="020B0604020202020204" pitchFamily="34" charset="0"/>
+              </a:rPr>
+            </a:br>
+            <a:r>
+              <a:rPr lang="es-ES" sz="2500" dirty="0">
+                <a:solidFill>
+                  <a:schemeClr val="bg1"/>
+                </a:solidFill>
+                <a:latin typeface="Arial" panose="020B0604020202020204" pitchFamily="34" charset="0"/>
+                <a:cs typeface="Arial" panose="020B0604020202020204" pitchFamily="34" charset="0"/>
+              </a:rPr>
+              <a:t>Institución Universitaria Antonio José Camacho</a:t>
+            </a:r>
+            <a:br>
+              <a:rPr lang="es-ES" sz="2500" dirty="0">
+                <a:solidFill>
+                  <a:schemeClr val="bg1"/>
+                </a:solidFill>
+                <a:latin typeface="Arial" panose="020B0604020202020204" pitchFamily="34" charset="0"/>
+                <a:cs typeface="Arial" panose="020B0604020202020204" pitchFamily="34" charset="0"/>
+              </a:rPr>
+            </a:br>
+            <a:r>
+              <a:rPr lang="es-ES" sz="2500" dirty="0">
+                <a:solidFill>
+                  <a:schemeClr val="bg1"/>
+                </a:solidFill>
+                <a:latin typeface="Arial" panose="020B0604020202020204" pitchFamily="34" charset="0"/>
+                <a:cs typeface="Arial" panose="020B0604020202020204" pitchFamily="34" charset="0"/>
+              </a:rPr>
+              <a:t>Facultad de Ingenierías</a:t>
+            </a:r>
+            <a:br>
+              <a:rPr lang="es-ES" sz="2500" dirty="0">
+                <a:solidFill>
+                  <a:schemeClr val="bg1"/>
+                </a:solidFill>
+                <a:latin typeface="Arial" panose="020B0604020202020204" pitchFamily="34" charset="0"/>
+                <a:cs typeface="Arial" panose="020B0604020202020204" pitchFamily="34" charset="0"/>
+              </a:rPr>
+            </a:br>
+            <a:r>
+              <a:rPr lang="es-ES" sz="2500" dirty="0">
+                <a:solidFill>
+                  <a:schemeClr val="bg1"/>
+                </a:solidFill>
+                <a:latin typeface="Arial" panose="020B0604020202020204" pitchFamily="34" charset="0"/>
+                <a:cs typeface="Arial" panose="020B0604020202020204" pitchFamily="34" charset="0"/>
+              </a:rPr>
+              <a:t>Ingeniería de sistemas</a:t>
+            </a:r>
+            <a:br>
+              <a:rPr lang="es-ES" sz="2500" dirty="0">
+                <a:solidFill>
+                  <a:schemeClr val="bg1"/>
+                </a:solidFill>
+                <a:latin typeface="Arial" panose="020B0604020202020204" pitchFamily="34" charset="0"/>
+                <a:cs typeface="Arial" panose="020B0604020202020204" pitchFamily="34" charset="0"/>
+              </a:rPr>
+            </a:br>
+            <a:r>
+              <a:rPr lang="es-ES" sz="2500" dirty="0">
+                <a:solidFill>
+                  <a:schemeClr val="bg1"/>
+                </a:solidFill>
+                <a:latin typeface="Arial" panose="020B0604020202020204" pitchFamily="34" charset="0"/>
+                <a:cs typeface="Arial" panose="020B0604020202020204" pitchFamily="34" charset="0"/>
+              </a:rPr>
+              <a:t>Santiago de Cali</a:t>
+            </a:r>
+            <a:br>
+              <a:rPr lang="es-ES" sz="2500" dirty="0">
+                <a:solidFill>
+                  <a:schemeClr val="bg1"/>
+                </a:solidFill>
+                <a:latin typeface="Arial" panose="020B0604020202020204" pitchFamily="34" charset="0"/>
+                <a:cs typeface="Arial" panose="020B0604020202020204" pitchFamily="34" charset="0"/>
+              </a:rPr>
+            </a:br>
+            <a:r>
+              <a:rPr lang="es-ES" sz="2500" dirty="0">
+                <a:solidFill>
+                  <a:schemeClr val="bg1"/>
+                </a:solidFill>
+                <a:latin typeface="Arial" panose="020B0604020202020204" pitchFamily="34" charset="0"/>
+                <a:cs typeface="Arial" panose="020B0604020202020204" pitchFamily="34" charset="0"/>
+              </a:rPr>
+              <a:t>2020</a:t>
+            </a:r>
+          </a:p>
+        </p:txBody>
+      </p:sp>
+    </p:spTree>
+    <p:extLst>
+      <p:ext uri="{BB962C8B-B14F-4D97-AF65-F5344CB8AC3E}">
+        <p14:creationId xmlns:p14="http://schemas.microsoft.com/office/powerpoint/2010/main" val="2354637152"/>
+      </p:ext>
+    </p:extLst>
+  </p:cSld>
+  <p:clrMapOvr>
+    <a:masterClrMapping/>
+  </p:clrMapOvr>
+</p:sld>
+</file>
+
+<file path=ppt/slides/slide20.xml><?xml version="1.0" encoding="utf-8"?>
+<p:sld xmlns:a="http://schemas.openxmlformats.org/drawingml/2006/main" xmlns:r="http://schemas.openxmlformats.org/officeDocument/2006/relationships" xmlns:p="http://schemas.openxmlformats.org/presentationml/2006/main">
+  <p:cSld>
+    <p:bg>
+      <p:bgPr>
+        <a:blipFill rotWithShape="1">
+          <a:blip r:embed="rId2"/>
+          <a:stretch>
+            <a:fillRect/>
+          </a:stretch>
+        </a:blipFill>
+        <a:effectLst/>
+      </p:bgPr>
+    </p:bg>
+    <p:spTree>
+      <p:nvGrpSpPr>
+        <p:cNvPr id="1" name=""/>
+        <p:cNvGrpSpPr/>
+        <p:nvPr/>
+      </p:nvGrpSpPr>
+      <p:grpSpPr>
+        <a:xfrm>
+          <a:off x="0" y="0"/>
+          <a:ext cx="0" cy="0"/>
+          <a:chOff x="0" y="0"/>
+          <a:chExt cx="0" cy="0"/>
+        </a:xfrm>
+      </p:grpSpPr>
+      <p:sp>
+        <p:nvSpPr>
+          <p:cNvPr id="6" name="Título 5"/>
+          <p:cNvSpPr>
+            <a:spLocks noGrp="1"/>
+          </p:cNvSpPr>
+          <p:nvPr>
+            <p:ph type="title"/>
+          </p:nvPr>
+        </p:nvSpPr>
+        <p:spPr>
+          <a:xfrm>
+            <a:off x="2022591" y="589612"/>
+            <a:ext cx="6848788" cy="768477"/>
+          </a:xfrm>
+        </p:spPr>
+        <p:txBody>
+          <a:bodyPr>
+            <a:normAutofit/>
+          </a:bodyPr>
+          <a:lstStyle/>
+          <a:p>
+            <a:r>
+              <a:rPr lang="es-CO" sz="2500" b="1" dirty="0">
+                <a:solidFill>
+                  <a:schemeClr val="bg1"/>
+                </a:solidFill>
+                <a:latin typeface="Arial" panose="020B0604020202020204" pitchFamily="34" charset="0"/>
+                <a:cs typeface="Arial" panose="020B0604020202020204" pitchFamily="34" charset="0"/>
+              </a:rPr>
+              <a:t>Desarrollo (8/8) – Registro de aceptación</a:t>
+            </a:r>
+            <a:endParaRPr lang="es-ES" sz="2500" b="1" dirty="0">
+              <a:solidFill>
+                <a:schemeClr val="bg1"/>
+              </a:solidFill>
+              <a:latin typeface="Arial" panose="020B0604020202020204" pitchFamily="34" charset="0"/>
+              <a:cs typeface="Arial" panose="020B0604020202020204" pitchFamily="34" charset="0"/>
+            </a:endParaRPr>
+          </a:p>
+        </p:txBody>
+      </p:sp>
+      <p:sp>
+        <p:nvSpPr>
+          <p:cNvPr id="5" name="CuadroTexto 4">
+            <a:extLst>
+              <a:ext uri="{FF2B5EF4-FFF2-40B4-BE49-F238E27FC236}">
+                <a16:creationId xmlns:a16="http://schemas.microsoft.com/office/drawing/2014/main" id="{0407966B-CEA6-4EC7-85CA-80EBB5EEF849}"/>
+              </a:ext>
+            </a:extLst>
+          </p:cNvPr>
+          <p:cNvSpPr txBox="1"/>
+          <p:nvPr/>
+        </p:nvSpPr>
+        <p:spPr>
+          <a:xfrm>
+            <a:off x="195309" y="2980508"/>
+            <a:ext cx="1340530" cy="1015663"/>
+          </a:xfrm>
+          <a:prstGeom prst="rect">
+            <a:avLst/>
+          </a:prstGeom>
+          <a:noFill/>
+        </p:spPr>
+        <p:txBody>
+          <a:bodyPr wrap="square" rtlCol="0">
+            <a:spAutoFit/>
+          </a:bodyPr>
+          <a:lstStyle/>
+          <a:p>
+            <a:r>
+              <a:rPr lang="es-CO" sz="2000" b="1" dirty="0">
+                <a:latin typeface="Arial" panose="020B0604020202020204" pitchFamily="34" charset="0"/>
+                <a:cs typeface="Arial" panose="020B0604020202020204" pitchFamily="34" charset="0"/>
+              </a:rPr>
+              <a:t>Fase 4: </a:t>
+            </a:r>
+            <a:r>
+              <a:rPr lang="es-CO" sz="2000" dirty="0">
+                <a:latin typeface="Arial" panose="020B0604020202020204" pitchFamily="34" charset="0"/>
+                <a:cs typeface="Arial" panose="020B0604020202020204" pitchFamily="34" charset="0"/>
+              </a:rPr>
+              <a:t>Cierre del proyecto</a:t>
+            </a:r>
+          </a:p>
+        </p:txBody>
+      </p:sp>
+      <p:pic>
+        <p:nvPicPr>
+          <p:cNvPr id="10" name="Imagen 9">
+            <a:extLst>
+              <a:ext uri="{FF2B5EF4-FFF2-40B4-BE49-F238E27FC236}">
+                <a16:creationId xmlns:a16="http://schemas.microsoft.com/office/drawing/2014/main" id="{4A0E7F5A-465E-4A33-9F9E-6F47D7BA1AE7}"/>
+              </a:ext>
+            </a:extLst>
+          </p:cNvPr>
+          <p:cNvPicPr>
+            <a:picLocks noChangeAspect="1"/>
+          </p:cNvPicPr>
+          <p:nvPr/>
+        </p:nvPicPr>
+        <p:blipFill>
+          <a:blip r:embed="rId3">
+            <a:extLst>
+              <a:ext uri="{28A0092B-C50C-407E-A947-70E740481C1C}">
+                <a14:useLocalDpi xmlns:a14="http://schemas.microsoft.com/office/drawing/2010/main" val="0"/>
+              </a:ext>
+            </a:extLst>
+          </a:blip>
+          <a:stretch>
+            <a:fillRect/>
+          </a:stretch>
+        </p:blipFill>
+        <p:spPr>
+          <a:xfrm>
+            <a:off x="1677881" y="1510911"/>
+            <a:ext cx="3693110" cy="4970520"/>
+          </a:xfrm>
+          <a:prstGeom prst="rect">
+            <a:avLst/>
+          </a:prstGeom>
+        </p:spPr>
+      </p:pic>
+      <p:pic>
+        <p:nvPicPr>
+          <p:cNvPr id="14" name="Imagen 13">
+            <a:extLst>
+              <a:ext uri="{FF2B5EF4-FFF2-40B4-BE49-F238E27FC236}">
+                <a16:creationId xmlns:a16="http://schemas.microsoft.com/office/drawing/2014/main" id="{3E379A49-64DD-44BF-8E23-94A61A0AC0AB}"/>
+              </a:ext>
+            </a:extLst>
+          </p:cNvPr>
+          <p:cNvPicPr>
+            <a:picLocks noChangeAspect="1"/>
+          </p:cNvPicPr>
+          <p:nvPr/>
+        </p:nvPicPr>
+        <p:blipFill>
+          <a:blip r:embed="rId4">
+            <a:extLst>
+              <a:ext uri="{28A0092B-C50C-407E-A947-70E740481C1C}">
+                <a14:useLocalDpi xmlns:a14="http://schemas.microsoft.com/office/drawing/2010/main" val="0"/>
+              </a:ext>
+            </a:extLst>
+          </a:blip>
+          <a:stretch>
+            <a:fillRect/>
+          </a:stretch>
+        </p:blipFill>
+        <p:spPr>
+          <a:xfrm>
+            <a:off x="5370990" y="3293471"/>
+            <a:ext cx="3773009" cy="1435804"/>
+          </a:xfrm>
+          <a:prstGeom prst="rect">
+            <a:avLst/>
+          </a:prstGeom>
+        </p:spPr>
+      </p:pic>
+    </p:spTree>
+    <p:extLst>
+      <p:ext uri="{BB962C8B-B14F-4D97-AF65-F5344CB8AC3E}">
+        <p14:creationId xmlns:p14="http://schemas.microsoft.com/office/powerpoint/2010/main" val="97627626"/>
+      </p:ext>
+    </p:extLst>
+  </p:cSld>
+  <p:clrMapOvr>
+    <a:masterClrMapping/>
+  </p:clrMapOvr>
+</p:sld>
+</file>
+
+<file path=ppt/slides/slide21.xml><?xml version="1.0" encoding="utf-8"?>
+<p:sld xmlns:a="http://schemas.openxmlformats.org/drawingml/2006/main" xmlns:r="http://schemas.openxmlformats.org/officeDocument/2006/relationships" xmlns:p="http://schemas.openxmlformats.org/presentationml/2006/main">
+  <p:cSld>
+    <p:bg>
+      <p:bgPr>
+        <a:blipFill rotWithShape="1">
+          <a:blip r:embed="rId2"/>
+          <a:stretch>
+            <a:fillRect/>
+          </a:stretch>
+        </a:blipFill>
+        <a:effectLst/>
+      </p:bgPr>
+    </p:bg>
+    <p:spTree>
+      <p:nvGrpSpPr>
+        <p:cNvPr id="1" name=""/>
+        <p:cNvGrpSpPr/>
+        <p:nvPr/>
+      </p:nvGrpSpPr>
+      <p:grpSpPr>
+        <a:xfrm>
+          <a:off x="0" y="0"/>
+          <a:ext cx="0" cy="0"/>
+          <a:chOff x="0" y="0"/>
+          <a:chExt cx="0" cy="0"/>
+        </a:xfrm>
+      </p:grpSpPr>
+      <p:sp>
+        <p:nvSpPr>
+          <p:cNvPr id="6" name="Título 5"/>
+          <p:cNvSpPr>
+            <a:spLocks noGrp="1"/>
+          </p:cNvSpPr>
+          <p:nvPr>
+            <p:ph type="title"/>
+          </p:nvPr>
+        </p:nvSpPr>
+        <p:spPr>
+          <a:xfrm>
+            <a:off x="2056147" y="589612"/>
+            <a:ext cx="6848788" cy="768477"/>
+          </a:xfrm>
+        </p:spPr>
+        <p:txBody>
+          <a:bodyPr>
+            <a:normAutofit/>
+          </a:bodyPr>
+          <a:lstStyle/>
+          <a:p>
+            <a:r>
+              <a:rPr lang="es-CO" sz="2500" b="1" dirty="0">
+                <a:solidFill>
+                  <a:schemeClr val="bg1"/>
+                </a:solidFill>
+                <a:latin typeface="Arial" panose="020B0604020202020204" pitchFamily="34" charset="0"/>
+                <a:cs typeface="Arial" panose="020B0604020202020204" pitchFamily="34" charset="0"/>
+              </a:rPr>
+              <a:t>Conclusiones</a:t>
+            </a:r>
+            <a:endParaRPr lang="es-ES" sz="2500" b="1" dirty="0">
+              <a:solidFill>
+                <a:schemeClr val="bg1"/>
+              </a:solidFill>
+              <a:latin typeface="Arial" panose="020B0604020202020204" pitchFamily="34" charset="0"/>
+              <a:cs typeface="Arial" panose="020B0604020202020204" pitchFamily="34" charset="0"/>
+            </a:endParaRPr>
+          </a:p>
+        </p:txBody>
+      </p:sp>
+      <p:sp>
+        <p:nvSpPr>
+          <p:cNvPr id="2" name="Marcador de contenido 1"/>
+          <p:cNvSpPr>
+            <a:spLocks noGrp="1"/>
+          </p:cNvSpPr>
+          <p:nvPr>
+            <p:ph idx="1"/>
+          </p:nvPr>
+        </p:nvSpPr>
+        <p:spPr>
+          <a:xfrm>
+            <a:off x="628650" y="1917052"/>
+            <a:ext cx="7886700" cy="4351338"/>
+          </a:xfrm>
+        </p:spPr>
+        <p:txBody>
+          <a:bodyPr>
+            <a:normAutofit fontScale="62500" lnSpcReduction="20000"/>
+          </a:bodyPr>
+          <a:lstStyle/>
+          <a:p>
+            <a:r>
+              <a:rPr lang="es-CO" dirty="0">
+                <a:latin typeface="Arial" panose="020B0604020202020204" pitchFamily="34" charset="0"/>
+                <a:cs typeface="Arial" panose="020B0604020202020204" pitchFamily="34" charset="0"/>
+              </a:rPr>
+              <a:t>La ISO/IEC 29110 como base para la elaboración de este diseño fue de gran apoyo, puesto que proporcionó los pasos y artefactos necesarios para llevar a cabo el seguimiento y control adecuado de todos los recursos que intervinieron en el proyecto.</a:t>
+            </a:r>
+          </a:p>
+          <a:p>
+            <a:r>
+              <a:rPr lang="es-CO" dirty="0">
+                <a:latin typeface="Arial" panose="020B0604020202020204" pitchFamily="34" charset="0"/>
+                <a:cs typeface="Arial" panose="020B0604020202020204" pitchFamily="34" charset="0"/>
+              </a:rPr>
+              <a:t>A lo largo del seguimiento y control del proyecto de la empresa Sanambiente, se han evidenciado algunos contratiempos en tema de entrega de tareas por parte de los equipos, ya sea porque carecían de conocimientos para realizarlas y tuvieron que apartar un tiempo para saber cómo se hacían, o dependían de otras tareas de otro equipo para poder ejecutar las suyas. En este caso se optó por tomar un plan de contingencia que consistía en adecuar las fechas de entrega de las tareas de cada equipo, de manera que no causaran contratiempo alguno a aquellos que estaban implicados en estas.</a:t>
+            </a:r>
+          </a:p>
+          <a:p>
+            <a:r>
+              <a:rPr lang="es-CO" dirty="0">
+                <a:latin typeface="Arial" panose="020B0604020202020204" pitchFamily="34" charset="0"/>
+                <a:cs typeface="Arial" panose="020B0604020202020204" pitchFamily="34" charset="0"/>
+              </a:rPr>
+              <a:t>El estándar ISO/IEC 29110 ayuda a las VSE de software a mejorar la calidad de sus productos y/o servicios y el rendimiento de sus procesos, proporcionando los lineamientos idóneos para que estas los apliquen sin problemas sobre cualquier proyecto que posean.</a:t>
+            </a:r>
+          </a:p>
+          <a:p>
+            <a:endParaRPr lang="es-CO" u="sng" dirty="0">
+              <a:latin typeface="Arial" panose="020B0604020202020204" pitchFamily="34" charset="0"/>
+              <a:cs typeface="Arial" panose="020B0604020202020204" pitchFamily="34" charset="0"/>
+            </a:endParaRPr>
+          </a:p>
+        </p:txBody>
+      </p:sp>
+    </p:spTree>
+    <p:extLst>
+      <p:ext uri="{BB962C8B-B14F-4D97-AF65-F5344CB8AC3E}">
+        <p14:creationId xmlns:p14="http://schemas.microsoft.com/office/powerpoint/2010/main" val="2391272462"/>
+      </p:ext>
+    </p:extLst>
+  </p:cSld>
+  <p:clrMapOvr>
+    <a:masterClrMapping/>
+  </p:clrMapOvr>
+</p:sld>
+</file>
+
+<file path=ppt/slides/slide22.xml><?xml version="1.0" encoding="utf-8"?>
+<p:sld xmlns:a="http://schemas.openxmlformats.org/drawingml/2006/main" xmlns:r="http://schemas.openxmlformats.org/officeDocument/2006/relationships" xmlns:p="http://schemas.openxmlformats.org/presentationml/2006/main">
+  <p:cSld>
+    <p:bg>
+      <p:bgPr>
+        <a:blipFill rotWithShape="1">
+          <a:blip r:embed="rId2"/>
+          <a:stretch>
+            <a:fillRect/>
+          </a:stretch>
+        </a:blipFill>
+        <a:effectLst/>
+      </p:bgPr>
+    </p:bg>
+    <p:spTree>
+      <p:nvGrpSpPr>
+        <p:cNvPr id="1" name=""/>
+        <p:cNvGrpSpPr/>
+        <p:nvPr/>
+      </p:nvGrpSpPr>
+      <p:grpSpPr>
+        <a:xfrm>
+          <a:off x="0" y="0"/>
+          <a:ext cx="0" cy="0"/>
+          <a:chOff x="0" y="0"/>
+          <a:chExt cx="0" cy="0"/>
+        </a:xfrm>
+      </p:grpSpPr>
+      <p:sp>
+        <p:nvSpPr>
+          <p:cNvPr id="6" name="Título 5"/>
+          <p:cNvSpPr>
+            <a:spLocks noGrp="1"/>
+          </p:cNvSpPr>
+          <p:nvPr>
+            <p:ph type="title"/>
+          </p:nvPr>
+        </p:nvSpPr>
+        <p:spPr>
+          <a:xfrm>
+            <a:off x="2056147" y="589612"/>
+            <a:ext cx="6848788" cy="768477"/>
+          </a:xfrm>
+        </p:spPr>
+        <p:txBody>
+          <a:bodyPr>
+            <a:normAutofit/>
+          </a:bodyPr>
+          <a:lstStyle/>
+          <a:p>
+            <a:r>
+              <a:rPr lang="es-CO" sz="2500" b="1" dirty="0">
+                <a:solidFill>
+                  <a:schemeClr val="bg1"/>
+                </a:solidFill>
+                <a:latin typeface="Arial" panose="020B0604020202020204" pitchFamily="34" charset="0"/>
+                <a:cs typeface="Arial" panose="020B0604020202020204" pitchFamily="34" charset="0"/>
+              </a:rPr>
+              <a:t>8. Bibliografía</a:t>
+            </a:r>
+            <a:endParaRPr lang="es-ES" sz="2500" b="1" dirty="0">
+              <a:solidFill>
+                <a:schemeClr val="bg1"/>
+              </a:solidFill>
+              <a:latin typeface="Arial" panose="020B0604020202020204" pitchFamily="34" charset="0"/>
+              <a:cs typeface="Arial" panose="020B0604020202020204" pitchFamily="34" charset="0"/>
+            </a:endParaRPr>
+          </a:p>
+        </p:txBody>
+      </p:sp>
+      <p:sp>
+        <p:nvSpPr>
+          <p:cNvPr id="3" name="Marcador de contenido 2"/>
+          <p:cNvSpPr>
+            <a:spLocks noGrp="1"/>
+          </p:cNvSpPr>
+          <p:nvPr>
+            <p:ph idx="1"/>
+          </p:nvPr>
+        </p:nvSpPr>
+        <p:spPr>
+          <a:xfrm>
+            <a:off x="628650" y="1951460"/>
+            <a:ext cx="7886700" cy="4013112"/>
+          </a:xfrm>
+        </p:spPr>
+        <p:txBody>
+          <a:bodyPr>
+            <a:noAutofit/>
+          </a:bodyPr>
+          <a:lstStyle/>
+          <a:p>
+            <a:r>
+              <a:rPr lang="en-US" sz="1800" dirty="0">
+                <a:latin typeface="Arial" panose="020B0604020202020204" pitchFamily="34" charset="0"/>
+                <a:cs typeface="Arial" panose="020B0604020202020204" pitchFamily="34" charset="0"/>
+              </a:rPr>
+              <a:t>ISO/IEC. (2011). </a:t>
+            </a:r>
+            <a:r>
+              <a:rPr lang="en-US" sz="1800" i="1" dirty="0">
+                <a:latin typeface="Arial" panose="020B0604020202020204" pitchFamily="34" charset="0"/>
+                <a:cs typeface="Arial" panose="020B0604020202020204" pitchFamily="34" charset="0"/>
+              </a:rPr>
+              <a:t>Software engineering - Lifecycle profiles for Very Small Entities (VSEs) Part 5-1-2: Management and engineering guide: Generic profile group: Basic profile</a:t>
+            </a:r>
+            <a:r>
+              <a:rPr lang="en-US" sz="1800" dirty="0">
+                <a:latin typeface="Arial" panose="020B0604020202020204" pitchFamily="34" charset="0"/>
+                <a:cs typeface="Arial" panose="020B0604020202020204" pitchFamily="34" charset="0"/>
+              </a:rPr>
+              <a:t>.</a:t>
+            </a:r>
+          </a:p>
+          <a:p>
+            <a:r>
+              <a:rPr lang="es-CO" sz="1800" dirty="0">
+                <a:latin typeface="Arial" panose="020B0604020202020204" pitchFamily="34" charset="0"/>
+                <a:cs typeface="Arial" panose="020B0604020202020204" pitchFamily="34" charset="0"/>
+              </a:rPr>
+              <a:t>Sanambiente. (s. f.). </a:t>
+            </a:r>
+            <a:r>
+              <a:rPr lang="es-CO" sz="1800" i="1" dirty="0">
+                <a:latin typeface="Arial" panose="020B0604020202020204" pitchFamily="34" charset="0"/>
+                <a:cs typeface="Arial" panose="020B0604020202020204" pitchFamily="34" charset="0"/>
+              </a:rPr>
+              <a:t>Sanambiente</a:t>
+            </a:r>
+            <a:r>
+              <a:rPr lang="es-CO" sz="1800" dirty="0">
+                <a:latin typeface="Arial" panose="020B0604020202020204" pitchFamily="34" charset="0"/>
+                <a:cs typeface="Arial" panose="020B0604020202020204" pitchFamily="34" charset="0"/>
+              </a:rPr>
+              <a:t>. Recuperado 19 de marzo de 2019, de https://www.sanambiente.com.co/index.php/nosotros</a:t>
+            </a:r>
+          </a:p>
+          <a:p>
+            <a:endParaRPr lang="es-MX" sz="1700" dirty="0">
+              <a:latin typeface="Times New Roman" panose="02020603050405020304" pitchFamily="18" charset="0"/>
+              <a:cs typeface="Times New Roman" panose="02020603050405020304" pitchFamily="18" charset="0"/>
+            </a:endParaRPr>
+          </a:p>
+        </p:txBody>
+      </p:sp>
+    </p:spTree>
+    <p:extLst>
+      <p:ext uri="{BB962C8B-B14F-4D97-AF65-F5344CB8AC3E}">
+        <p14:creationId xmlns:p14="http://schemas.microsoft.com/office/powerpoint/2010/main" val="3846946407"/>
+      </p:ext>
+    </p:extLst>
+  </p:cSld>
+  <p:clrMapOvr>
+    <a:masterClrMapping/>
+  </p:clrMapOvr>
+</p:sld>
+</file>
+
+<file path=ppt/slides/slide23.xml><?xml version="1.0" encoding="utf-8"?>
+<p:sld xmlns:a="http://schemas.openxmlformats.org/drawingml/2006/main" xmlns:r="http://schemas.openxmlformats.org/officeDocument/2006/relationships" xmlns:p="http://schemas.openxmlformats.org/presentationml/2006/main">
+  <p:cSld>
+    <p:bg>
+      <p:bgPr>
+        <a:blipFill rotWithShape="1">
+          <a:blip r:embed="rId2"/>
+          <a:stretch>
+            <a:fillRect/>
+          </a:stretch>
+        </a:blipFill>
+        <a:effectLst/>
+      </p:bgPr>
+    </p:bg>
+    <p:spTree>
+      <p:nvGrpSpPr>
+        <p:cNvPr id="1" name=""/>
+        <p:cNvGrpSpPr/>
+        <p:nvPr/>
+      </p:nvGrpSpPr>
+      <p:grpSpPr>
+        <a:xfrm>
+          <a:off x="0" y="0"/>
+          <a:ext cx="0" cy="0"/>
+          <a:chOff x="0" y="0"/>
+          <a:chExt cx="0" cy="0"/>
+        </a:xfrm>
+      </p:grpSpPr>
+      <p:sp>
+        <p:nvSpPr>
+          <p:cNvPr id="4" name="Título 3"/>
+          <p:cNvSpPr>
+            <a:spLocks noGrp="1"/>
+          </p:cNvSpPr>
+          <p:nvPr>
+            <p:ph type="title"/>
+          </p:nvPr>
+        </p:nvSpPr>
+        <p:spPr>
+          <a:xfrm>
+            <a:off x="156443" y="2981279"/>
             <a:ext cx="8768866" cy="1048165"/>
           </a:xfrm>
         </p:spPr>
@@ -13408,7 +14466,7 @@
 </p:sld>
 </file>
 
-<file path=ppt/slides/slide19.xml><?xml version="1.0" encoding="utf-8"?>
+<file path=ppt/slides/slide24.xml><?xml version="1.0" encoding="utf-8"?>
 <p:sld xmlns:a="http://schemas.openxmlformats.org/drawingml/2006/main" xmlns:r="http://schemas.openxmlformats.org/officeDocument/2006/relationships" xmlns:p="http://schemas.openxmlformats.org/presentationml/2006/main">
   <p:cSld>
     <p:bg>
@@ -13449,339 +14507,6 @@
 </p:sld>
 </file>
 
-<file path=ppt/slides/slide2.xml><?xml version="1.0" encoding="utf-8"?>
-<p:sld xmlns:a="http://schemas.openxmlformats.org/drawingml/2006/main" xmlns:r="http://schemas.openxmlformats.org/officeDocument/2006/relationships" xmlns:p="http://schemas.openxmlformats.org/presentationml/2006/main">
-  <p:cSld>
-    <p:bg>
-      <p:bgPr>
-        <a:blipFill rotWithShape="1">
-          <a:blip r:embed="rId2"/>
-          <a:stretch>
-            <a:fillRect/>
-          </a:stretch>
-        </a:blipFill>
-        <a:effectLst/>
-      </p:bgPr>
-    </p:bg>
-    <p:spTree>
-      <p:nvGrpSpPr>
-        <p:cNvPr id="1" name=""/>
-        <p:cNvGrpSpPr/>
-        <p:nvPr/>
-      </p:nvGrpSpPr>
-      <p:grpSpPr>
-        <a:xfrm>
-          <a:off x="0" y="0"/>
-          <a:ext cx="0" cy="0"/>
-          <a:chOff x="0" y="0"/>
-          <a:chExt cx="0" cy="0"/>
-        </a:xfrm>
-      </p:grpSpPr>
-      <p:sp>
-        <p:nvSpPr>
-          <p:cNvPr id="4" name="Título 3"/>
-          <p:cNvSpPr>
-            <a:spLocks noGrp="1"/>
-          </p:cNvSpPr>
-          <p:nvPr>
-            <p:ph type="title"/>
-          </p:nvPr>
-        </p:nvSpPr>
-        <p:spPr>
-          <a:xfrm>
-            <a:off x="244367" y="290146"/>
-            <a:ext cx="8768866" cy="6145823"/>
-          </a:xfrm>
-        </p:spPr>
-        <p:txBody>
-          <a:bodyPr>
-            <a:noAutofit/>
-          </a:bodyPr>
-          <a:lstStyle/>
-          <a:p>
-            <a:pPr algn="ctr"/>
-            <a:r>
-              <a:rPr lang="es-CO" sz="2500" b="1" dirty="0">
-                <a:solidFill>
-                  <a:schemeClr val="bg1"/>
-                </a:solidFill>
-                <a:latin typeface="Arial" panose="020B0604020202020204" pitchFamily="34" charset="0"/>
-                <a:cs typeface="Arial" panose="020B0604020202020204" pitchFamily="34" charset="0"/>
-              </a:rPr>
-              <a:t>Desarrollo de un marco de trabajo siguiendo el estándar ISO/IEC 29110 para el caso de estudio de integración de procesos del proyecto </a:t>
-            </a:r>
-            <a:r>
-              <a:rPr lang="es-CO" sz="2500" b="1" dirty="0" err="1">
-                <a:solidFill>
-                  <a:schemeClr val="bg1"/>
-                </a:solidFill>
-                <a:latin typeface="Arial" panose="020B0604020202020204" pitchFamily="34" charset="0"/>
-                <a:cs typeface="Arial" panose="020B0604020202020204" pitchFamily="34" charset="0"/>
-              </a:rPr>
-              <a:t>sanambiente</a:t>
-            </a:r>
-            <a:r>
-              <a:rPr lang="es-CO" sz="2500" b="1" dirty="0">
-                <a:solidFill>
-                  <a:schemeClr val="bg1"/>
-                </a:solidFill>
-                <a:latin typeface="Arial" panose="020B0604020202020204" pitchFamily="34" charset="0"/>
-                <a:cs typeface="Arial" panose="020B0604020202020204" pitchFamily="34" charset="0"/>
-              </a:rPr>
-              <a:t>.</a:t>
-            </a:r>
-            <a:br>
-              <a:rPr lang="es-CO" sz="2500" dirty="0">
-                <a:solidFill>
-                  <a:schemeClr val="bg1"/>
-                </a:solidFill>
-                <a:latin typeface="Arial" panose="020B0604020202020204" pitchFamily="34" charset="0"/>
-                <a:cs typeface="Arial" panose="020B0604020202020204" pitchFamily="34" charset="0"/>
-              </a:rPr>
-            </a:br>
-            <a:br>
-              <a:rPr lang="es-ES" sz="2500" b="1" dirty="0">
-                <a:solidFill>
-                  <a:schemeClr val="bg1"/>
-                </a:solidFill>
-                <a:latin typeface="Arial" panose="020B0604020202020204" pitchFamily="34" charset="0"/>
-                <a:cs typeface="Arial" panose="020B0604020202020204" pitchFamily="34" charset="0"/>
-              </a:rPr>
-            </a:br>
-            <a:r>
-              <a:rPr lang="es-ES" sz="2500" b="1" dirty="0">
-                <a:solidFill>
-                  <a:schemeClr val="bg1"/>
-                </a:solidFill>
-                <a:latin typeface="Arial" panose="020B0604020202020204" pitchFamily="34" charset="0"/>
-                <a:cs typeface="Arial" panose="020B0604020202020204" pitchFamily="34" charset="0"/>
-              </a:rPr>
-              <a:t>Integrantes:</a:t>
-            </a:r>
-            <a:br>
-              <a:rPr lang="es-ES" sz="2500" dirty="0">
-                <a:solidFill>
-                  <a:schemeClr val="bg1"/>
-                </a:solidFill>
-                <a:latin typeface="Arial" panose="020B0604020202020204" pitchFamily="34" charset="0"/>
-                <a:cs typeface="Arial" panose="020B0604020202020204" pitchFamily="34" charset="0"/>
-              </a:rPr>
-            </a:br>
-            <a:r>
-              <a:rPr lang="es-ES" sz="2500" dirty="0">
-                <a:solidFill>
-                  <a:schemeClr val="bg1"/>
-                </a:solidFill>
-                <a:latin typeface="Arial" panose="020B0604020202020204" pitchFamily="34" charset="0"/>
-                <a:cs typeface="Arial" panose="020B0604020202020204" pitchFamily="34" charset="0"/>
-              </a:rPr>
-              <a:t>Aarón Levi Grajales Gómez </a:t>
-            </a:r>
-            <a:br>
-              <a:rPr lang="es-ES" sz="2500" dirty="0">
-                <a:solidFill>
-                  <a:schemeClr val="bg1"/>
-                </a:solidFill>
-                <a:latin typeface="Arial" panose="020B0604020202020204" pitchFamily="34" charset="0"/>
-                <a:cs typeface="Arial" panose="020B0604020202020204" pitchFamily="34" charset="0"/>
-              </a:rPr>
-            </a:br>
-            <a:r>
-              <a:rPr lang="es-ES" sz="2500" dirty="0">
-                <a:solidFill>
-                  <a:schemeClr val="bg1"/>
-                </a:solidFill>
-                <a:latin typeface="Arial" panose="020B0604020202020204" pitchFamily="34" charset="0"/>
-                <a:cs typeface="Arial" panose="020B0604020202020204" pitchFamily="34" charset="0"/>
-              </a:rPr>
-              <a:t>Cristhian Fernando Balanta Pazú</a:t>
-            </a:r>
-            <a:br>
-              <a:rPr lang="es-ES" sz="2500" dirty="0">
-                <a:solidFill>
-                  <a:schemeClr val="bg1"/>
-                </a:solidFill>
-                <a:latin typeface="Arial" panose="020B0604020202020204" pitchFamily="34" charset="0"/>
-                <a:cs typeface="Arial" panose="020B0604020202020204" pitchFamily="34" charset="0"/>
-              </a:rPr>
-            </a:br>
-            <a:br>
-              <a:rPr lang="es-ES" sz="2500" dirty="0">
-                <a:solidFill>
-                  <a:schemeClr val="bg1"/>
-                </a:solidFill>
-                <a:latin typeface="Arial" panose="020B0604020202020204" pitchFamily="34" charset="0"/>
-                <a:cs typeface="Arial" panose="020B0604020202020204" pitchFamily="34" charset="0"/>
-              </a:rPr>
-            </a:br>
-            <a:br>
-              <a:rPr lang="es-ES" sz="2500" dirty="0">
-                <a:solidFill>
-                  <a:schemeClr val="bg1"/>
-                </a:solidFill>
-                <a:latin typeface="Arial" panose="020B0604020202020204" pitchFamily="34" charset="0"/>
-                <a:cs typeface="Arial" panose="020B0604020202020204" pitchFamily="34" charset="0"/>
-              </a:rPr>
-            </a:br>
-            <a:r>
-              <a:rPr lang="es-CO" sz="2500" b="1" dirty="0">
-                <a:solidFill>
-                  <a:schemeClr val="bg1"/>
-                </a:solidFill>
-                <a:latin typeface="Arial" panose="020B0604020202020204" pitchFamily="34" charset="0"/>
-                <a:cs typeface="Arial" panose="020B0604020202020204" pitchFamily="34" charset="0"/>
-              </a:rPr>
-              <a:t>Semillero ITMedia - grupo de investigación GRINTIC</a:t>
-            </a:r>
-            <a:br>
-              <a:rPr lang="es-CO" sz="2500" b="1" dirty="0">
-                <a:solidFill>
-                  <a:schemeClr val="bg1"/>
-                </a:solidFill>
-                <a:latin typeface="Arial" panose="020B0604020202020204" pitchFamily="34" charset="0"/>
-                <a:cs typeface="Arial" panose="020B0604020202020204" pitchFamily="34" charset="0"/>
-              </a:rPr>
-            </a:br>
-            <a:r>
-              <a:rPr lang="es-CO" sz="2500" b="1" dirty="0">
-                <a:solidFill>
-                  <a:schemeClr val="bg1"/>
-                </a:solidFill>
-                <a:latin typeface="Arial" panose="020B0604020202020204" pitchFamily="34" charset="0"/>
-                <a:cs typeface="Arial" panose="020B0604020202020204" pitchFamily="34" charset="0"/>
-              </a:rPr>
-              <a:t>Tutora: </a:t>
-            </a:r>
-            <a:r>
-              <a:rPr lang="es-CO" sz="2500" dirty="0">
-                <a:solidFill>
-                  <a:schemeClr val="bg1"/>
-                </a:solidFill>
-                <a:latin typeface="Arial" panose="020B0604020202020204" pitchFamily="34" charset="0"/>
-                <a:cs typeface="Arial" panose="020B0604020202020204" pitchFamily="34" charset="0"/>
-              </a:rPr>
-              <a:t>Beatriz E. Marín</a:t>
-            </a:r>
-            <a:br>
-              <a:rPr lang="es-CO" sz="2500" b="1" dirty="0">
-                <a:solidFill>
-                  <a:schemeClr val="bg1"/>
-                </a:solidFill>
-                <a:latin typeface="Arial" panose="020B0604020202020204" pitchFamily="34" charset="0"/>
-                <a:cs typeface="Arial" panose="020B0604020202020204" pitchFamily="34" charset="0"/>
-              </a:rPr>
-            </a:br>
-            <a:br>
-              <a:rPr lang="es-ES" sz="2500" dirty="0">
-                <a:solidFill>
-                  <a:schemeClr val="bg1"/>
-                </a:solidFill>
-                <a:latin typeface="Arial" panose="020B0604020202020204" pitchFamily="34" charset="0"/>
-                <a:cs typeface="Arial" panose="020B0604020202020204" pitchFamily="34" charset="0"/>
-              </a:rPr>
-            </a:br>
-            <a:r>
-              <a:rPr lang="es-ES" sz="2500" dirty="0">
-                <a:solidFill>
-                  <a:schemeClr val="bg1"/>
-                </a:solidFill>
-                <a:latin typeface="Arial" panose="020B0604020202020204" pitchFamily="34" charset="0"/>
-                <a:cs typeface="Arial" panose="020B0604020202020204" pitchFamily="34" charset="0"/>
-              </a:rPr>
-              <a:t>Institución Universitaria Antonio José Camacho</a:t>
-            </a:r>
-            <a:br>
-              <a:rPr lang="es-ES" sz="2500" dirty="0">
-                <a:solidFill>
-                  <a:schemeClr val="bg1"/>
-                </a:solidFill>
-                <a:latin typeface="Arial" panose="020B0604020202020204" pitchFamily="34" charset="0"/>
-                <a:cs typeface="Arial" panose="020B0604020202020204" pitchFamily="34" charset="0"/>
-              </a:rPr>
-            </a:br>
-            <a:r>
-              <a:rPr lang="es-ES" sz="2500" dirty="0">
-                <a:solidFill>
-                  <a:schemeClr val="bg1"/>
-                </a:solidFill>
-                <a:latin typeface="Arial" panose="020B0604020202020204" pitchFamily="34" charset="0"/>
-                <a:cs typeface="Arial" panose="020B0604020202020204" pitchFamily="34" charset="0"/>
-              </a:rPr>
-              <a:t>Facultad de Ingenierías</a:t>
-            </a:r>
-            <a:br>
-              <a:rPr lang="es-ES" sz="2500" dirty="0">
-                <a:solidFill>
-                  <a:schemeClr val="bg1"/>
-                </a:solidFill>
-                <a:latin typeface="Arial" panose="020B0604020202020204" pitchFamily="34" charset="0"/>
-                <a:cs typeface="Arial" panose="020B0604020202020204" pitchFamily="34" charset="0"/>
-              </a:rPr>
-            </a:br>
-            <a:r>
-              <a:rPr lang="es-ES" sz="2500" dirty="0">
-                <a:solidFill>
-                  <a:schemeClr val="bg1"/>
-                </a:solidFill>
-                <a:latin typeface="Arial" panose="020B0604020202020204" pitchFamily="34" charset="0"/>
-                <a:cs typeface="Arial" panose="020B0604020202020204" pitchFamily="34" charset="0"/>
-              </a:rPr>
-              <a:t>Ingeniería de sistemas</a:t>
-            </a:r>
-            <a:br>
-              <a:rPr lang="es-ES" sz="2500" dirty="0">
-                <a:solidFill>
-                  <a:schemeClr val="bg1"/>
-                </a:solidFill>
-                <a:latin typeface="Arial" panose="020B0604020202020204" pitchFamily="34" charset="0"/>
-                <a:cs typeface="Arial" panose="020B0604020202020204" pitchFamily="34" charset="0"/>
-              </a:rPr>
-            </a:br>
-            <a:r>
-              <a:rPr lang="es-ES" sz="2500" dirty="0">
-                <a:solidFill>
-                  <a:schemeClr val="bg1"/>
-                </a:solidFill>
-                <a:latin typeface="Arial" panose="020B0604020202020204" pitchFamily="34" charset="0"/>
-                <a:cs typeface="Arial" panose="020B0604020202020204" pitchFamily="34" charset="0"/>
-              </a:rPr>
-              <a:t>Santiago de Cali</a:t>
-            </a:r>
-            <a:br>
-              <a:rPr lang="es-ES" sz="2500" dirty="0">
-                <a:solidFill>
-                  <a:schemeClr val="bg1"/>
-                </a:solidFill>
-                <a:latin typeface="Arial" panose="020B0604020202020204" pitchFamily="34" charset="0"/>
-                <a:cs typeface="Arial" panose="020B0604020202020204" pitchFamily="34" charset="0"/>
-              </a:rPr>
-            </a:br>
-            <a:r>
-              <a:rPr lang="es-ES" sz="2500" dirty="0">
-                <a:solidFill>
-                  <a:schemeClr val="bg1"/>
-                </a:solidFill>
-                <a:latin typeface="Arial" panose="020B0604020202020204" pitchFamily="34" charset="0"/>
-                <a:cs typeface="Arial" panose="020B0604020202020204" pitchFamily="34" charset="0"/>
-              </a:rPr>
-              <a:t>2020</a:t>
-            </a:r>
-          </a:p>
-        </p:txBody>
-      </p:sp>
-    </p:spTree>
-    <p:extLst>
-      <p:ext uri="{BB962C8B-B14F-4D97-AF65-F5344CB8AC3E}">
-        <p14:creationId xmlns:p14="http://schemas.microsoft.com/office/powerpoint/2010/main" val="2354637152"/>
-      </p:ext>
-    </p:extLst>
-  </p:cSld>
-  <p:clrMapOvr>
-    <a:masterClrMapping/>
-  </p:clrMapOvr>
-</p:sld>
-</file>
-
 <file path=ppt/slides/slide3.xml><?xml version="1.0" encoding="utf-8"?>
 <p:sld xmlns:a="http://schemas.openxmlformats.org/drawingml/2006/main" xmlns:r="http://schemas.openxmlformats.org/officeDocument/2006/relationships" xmlns:p="http://schemas.openxmlformats.org/presentationml/2006/main">
   <p:cSld>
@@ -13822,7 +14547,7 @@
         </p:nvSpPr>
         <p:spPr>
           <a:xfrm>
-            <a:off x="462127" y="1889060"/>
+            <a:off x="462127" y="1889062"/>
             <a:ext cx="6848788" cy="3930927"/>
           </a:xfrm>
         </p:spPr>
@@ -13924,7 +14649,7 @@
               <a:rPr lang="es-CO" sz="1800" dirty="0">
                 <a:latin typeface="Arial" panose="020B0604020202020204" pitchFamily="34" charset="0"/>
                 <a:cs typeface="Arial" panose="020B0604020202020204" pitchFamily="34" charset="0"/>
-                <a:hlinkClick r:id="rId8" action="ppaction://hlinksldjump"/>
+                <a:hlinkClick r:id="rId6" action="ppaction://hlinksldjump"/>
               </a:rPr>
               <a:t>6. Resultados</a:t>
             </a:r>
@@ -13941,7 +14666,7 @@
               <a:rPr lang="es-CO" sz="1800" dirty="0">
                 <a:latin typeface="Arial" panose="020B0604020202020204" pitchFamily="34" charset="0"/>
                 <a:cs typeface="Arial" panose="020B0604020202020204" pitchFamily="34" charset="0"/>
-                <a:hlinkClick r:id="rId9" action="ppaction://hlinksldjump"/>
+                <a:hlinkClick r:id="rId8" action="ppaction://hlinksldjump"/>
               </a:rPr>
               <a:t>7. Conclusiones</a:t>
             </a:r>
@@ -13958,7 +14683,7 @@
               <a:rPr lang="es-CO" sz="1800" dirty="0">
                 <a:latin typeface="Arial" panose="020B0604020202020204" pitchFamily="34" charset="0"/>
                 <a:cs typeface="Arial" panose="020B0604020202020204" pitchFamily="34" charset="0"/>
-                <a:hlinkClick r:id="rId10" action="ppaction://hlinksldjump"/>
+                <a:hlinkClick r:id="rId9" action="ppaction://hlinksldjump"/>
               </a:rPr>
               <a:t>8. Bibliografía</a:t>
             </a:r>
@@ -14011,7 +14736,7 @@
         </p:nvSpPr>
         <p:spPr>
           <a:xfrm>
-            <a:off x="2056147" y="589610"/>
+            <a:off x="2056147" y="589612"/>
             <a:ext cx="6848788" cy="768477"/>
           </a:xfrm>
         </p:spPr>
@@ -14127,7 +14852,7 @@
         </p:nvSpPr>
         <p:spPr>
           <a:xfrm>
-            <a:off x="2056147" y="589610"/>
+            <a:off x="2056147" y="589612"/>
             <a:ext cx="6848788" cy="768477"/>
           </a:xfrm>
         </p:spPr>
@@ -14255,7 +14980,7 @@
         </p:nvSpPr>
         <p:spPr>
           <a:xfrm>
-            <a:off x="327170" y="1878899"/>
+            <a:off x="327172" y="1878899"/>
             <a:ext cx="8599023" cy="2124930"/>
           </a:xfrm>
         </p:spPr>
@@ -14292,7 +15017,7 @@
         </p:nvSpPr>
         <p:spPr>
           <a:xfrm>
-            <a:off x="2056147" y="589610"/>
+            <a:off x="2056147" y="589612"/>
             <a:ext cx="6848788" cy="768477"/>
           </a:xfrm>
         </p:spPr>
@@ -14337,7 +15062,7 @@
         </p:blipFill>
         <p:spPr>
           <a:xfrm>
-            <a:off x="3057721" y="4245524"/>
+            <a:off x="3057723" y="4245526"/>
             <a:ext cx="3028557" cy="1893075"/>
           </a:xfrm>
           <a:prstGeom prst="rect">
@@ -14404,7 +15129,7 @@
         </p:nvSpPr>
         <p:spPr>
           <a:xfrm>
-            <a:off x="327170" y="1878899"/>
+            <a:off x="327172" y="1878899"/>
             <a:ext cx="8599023" cy="3341172"/>
           </a:xfrm>
         </p:spPr>
@@ -14454,7 +15179,7 @@
         </p:nvSpPr>
         <p:spPr>
           <a:xfrm>
-            <a:off x="2056147" y="589610"/>
+            <a:off x="2056147" y="589612"/>
             <a:ext cx="6848788" cy="768477"/>
           </a:xfrm>
         </p:spPr>
@@ -14530,7 +15255,7 @@
         </p:nvSpPr>
         <p:spPr>
           <a:xfrm>
-            <a:off x="164957" y="2503502"/>
+            <a:off x="164957" y="2503504"/>
             <a:ext cx="3242970" cy="833217"/>
           </a:xfrm>
         </p:spPr>
@@ -14566,7 +15291,7 @@
         </p:nvSpPr>
         <p:spPr>
           <a:xfrm>
-            <a:off x="3932807" y="2352418"/>
+            <a:off x="3932809" y="2352418"/>
             <a:ext cx="4838329" cy="1241918"/>
           </a:xfrm>
         </p:spPr>
@@ -14611,7 +15336,7 @@
         </p:blipFill>
         <p:spPr>
           <a:xfrm>
-            <a:off x="1165484" y="3336721"/>
+            <a:off x="1165486" y="3336723"/>
             <a:ext cx="1241917" cy="1241917"/>
           </a:xfrm>
           <a:prstGeom prst="rect">
@@ -14672,7 +15397,7 @@
         </p:nvSpPr>
         <p:spPr>
           <a:xfrm>
-            <a:off x="160854" y="2494624"/>
+            <a:off x="160854" y="2494626"/>
             <a:ext cx="3242970" cy="842097"/>
           </a:xfrm>
         </p:spPr>
@@ -14708,7 +15433,7 @@
         </p:nvSpPr>
         <p:spPr>
           <a:xfrm>
-            <a:off x="3737600" y="903002"/>
+            <a:off x="3737602" y="903004"/>
             <a:ext cx="5178167" cy="4114117"/>
           </a:xfrm>
         </p:spPr>
@@ -14781,7 +15506,7 @@
         </p:blipFill>
         <p:spPr>
           <a:xfrm>
-            <a:off x="1165484" y="3336721"/>
+            <a:off x="1165486" y="3336723"/>
             <a:ext cx="1241917" cy="1241917"/>
           </a:xfrm>
           <a:prstGeom prst="rect">
@@ -14930,7 +15655,7 @@
         </p:nvSpPr>
         <p:spPr>
           <a:xfrm>
-            <a:off x="319697" y="2752739"/>
+            <a:off x="319699" y="2752741"/>
             <a:ext cx="5178167" cy="1145851"/>
           </a:xfrm>
         </p:spPr>

</xml_diff>

<commit_message>
Se terminó de llenar las diapositivas para la sustentación del proyecto
Nota: Falta esperar las correcciones de la profesora.
</commit_message>
<xml_diff>
--- a/Documento(s) de proyecto de grado/Presentación del proyecto de grado.pptx
+++ b/Documento(s) de proyecto de grado/Presentación del proyecto de grado.pptx
@@ -14180,35 +14180,41 @@
         </p:spPr>
         <p:txBody>
           <a:bodyPr>
-            <a:normAutofit fontScale="62500" lnSpcReduction="20000"/>
+            <a:normAutofit lnSpcReduction="10000"/>
           </a:bodyPr>
           <a:lstStyle/>
           <a:p>
             <a:r>
-              <a:rPr lang="es-CO" dirty="0">
+              <a:rPr lang="es-CO" sz="2000" dirty="0">
                 <a:latin typeface="Arial" panose="020B0604020202020204" pitchFamily="34" charset="0"/>
                 <a:cs typeface="Arial" panose="020B0604020202020204" pitchFamily="34" charset="0"/>
               </a:rPr>
-              <a:t>La ISO/IEC 29110 como base para la elaboración de este diseño fue de gran apoyo, puesto que proporcionó los pasos y artefactos necesarios para llevar a cabo el seguimiento y control adecuado de todos los recursos que intervinieron en el proyecto.</a:t>
-            </a:r>
-          </a:p>
-          <a:p>
-            <a:r>
-              <a:rPr lang="es-CO" dirty="0">
+              <a:t>La ISO/IEC 29110 como base para la elaboración de este trabajo fue de gran apoyo, puesto que proporcionó los pasos y artefactos necesarios para llevar a cabo el seguimiento y control adecuado de todos los recursos que intervinieron.</a:t>
+            </a:r>
+          </a:p>
+          <a:p>
+            <a:r>
+              <a:rPr lang="es-MX" sz="2000" dirty="0">
                 <a:latin typeface="Arial" panose="020B0604020202020204" pitchFamily="34" charset="0"/>
                 <a:cs typeface="Arial" panose="020B0604020202020204" pitchFamily="34" charset="0"/>
               </a:rPr>
-              <a:t>A lo largo del seguimiento y control del proyecto de la empresa Sanambiente, se han evidenciado algunos contratiempos en tema de entrega de tareas por parte de los equipos, ya sea porque carecían de conocimientos para realizarlas y tuvieron que apartar un tiempo para saber cómo se hacían, o dependían de otras tareas de otro equipo para poder ejecutar las suyas. En este caso se optó por tomar un plan de contingencia que consistía en adecuar las fechas de entrega de las tareas de cada equipo, de manera que no causaran contratiempo alguno a aquellos que estaban implicados en estas.</a:t>
-            </a:r>
-          </a:p>
-          <a:p>
-            <a:r>
-              <a:rPr lang="es-CO" dirty="0">
+              <a:t>A pesar de todas las dificultades que se presentaron durante la aplicación del presente marco de trabajo al proyecto propuesto por la empresa Sanambiente, se logró que fuera el adecuado para ser seguido por todos los integrantes que estaban implicados en su desarrollo, alcanzando la finalización y cierre del mismo con satisfacción y cumpliendo con lo requerido por el cliente.</a:t>
+            </a:r>
+          </a:p>
+          <a:p>
+            <a:r>
+              <a:rPr lang="es-CO" sz="2000" dirty="0">
                 <a:latin typeface="Arial" panose="020B0604020202020204" pitchFamily="34" charset="0"/>
                 <a:cs typeface="Arial" panose="020B0604020202020204" pitchFamily="34" charset="0"/>
               </a:rPr>
-              <a:t>El estándar ISO/IEC 29110 ayuda a las VSE de software a mejorar la calidad de sus productos y/o servicios y el rendimiento de sus procesos, proporcionando los lineamientos idóneos para que estas los apliquen sin problemas sobre cualquier proyecto que posean.</a:t>
-            </a:r>
+              <a:t>El desarrollo de este proyecto permitió a todos los miembros del equipo de trabajo reconocer la importancia de cada uno de los roles dentro del ciclo de vida y el impacto del trabajo individual frente al trabajo grupal.</a:t>
+            </a:r>
+          </a:p>
+          <a:p>
+            <a:endParaRPr lang="es-CO" sz="2000" dirty="0">
+              <a:latin typeface="Arial" panose="020B0604020202020204" pitchFamily="34" charset="0"/>
+              <a:cs typeface="Arial" panose="020B0604020202020204" pitchFamily="34" charset="0"/>
+            </a:endParaRPr>
           </a:p>
           <a:p>
             <a:endParaRPr lang="es-CO" u="sng" dirty="0">
@@ -14324,21 +14330,21 @@
           <a:lstStyle/>
           <a:p>
             <a:r>
-              <a:rPr lang="en-US" sz="1800" dirty="0">
+              <a:rPr lang="en-US" sz="2000" dirty="0">
                 <a:latin typeface="Arial" panose="020B0604020202020204" pitchFamily="34" charset="0"/>
                 <a:cs typeface="Arial" panose="020B0604020202020204" pitchFamily="34" charset="0"/>
               </a:rPr>
               <a:t>ISO/IEC. (2011). </a:t>
             </a:r>
             <a:r>
-              <a:rPr lang="en-US" sz="1800" i="1" dirty="0">
+              <a:rPr lang="en-US" sz="2000" i="1" dirty="0">
                 <a:latin typeface="Arial" panose="020B0604020202020204" pitchFamily="34" charset="0"/>
                 <a:cs typeface="Arial" panose="020B0604020202020204" pitchFamily="34" charset="0"/>
               </a:rPr>
               <a:t>Software engineering - Lifecycle profiles for Very Small Entities (VSEs) Part 5-1-2: Management and engineering guide: Generic profile group: Basic profile</a:t>
             </a:r>
             <a:r>
-              <a:rPr lang="en-US" sz="1800" dirty="0">
+              <a:rPr lang="en-US" sz="2000" dirty="0">
                 <a:latin typeface="Arial" panose="020B0604020202020204" pitchFamily="34" charset="0"/>
                 <a:cs typeface="Arial" panose="020B0604020202020204" pitchFamily="34" charset="0"/>
               </a:rPr>
@@ -14347,21 +14353,21 @@
           </a:p>
           <a:p>
             <a:r>
-              <a:rPr lang="es-CO" sz="1800" dirty="0">
+              <a:rPr lang="es-CO" sz="2000" dirty="0">
                 <a:latin typeface="Arial" panose="020B0604020202020204" pitchFamily="34" charset="0"/>
                 <a:cs typeface="Arial" panose="020B0604020202020204" pitchFamily="34" charset="0"/>
               </a:rPr>
               <a:t>Sanambiente. (s. f.). </a:t>
             </a:r>
             <a:r>
-              <a:rPr lang="es-CO" sz="1800" i="1" dirty="0">
+              <a:rPr lang="es-CO" sz="2000" i="1" dirty="0">
                 <a:latin typeface="Arial" panose="020B0604020202020204" pitchFamily="34" charset="0"/>
                 <a:cs typeface="Arial" panose="020B0604020202020204" pitchFamily="34" charset="0"/>
               </a:rPr>
               <a:t>Sanambiente</a:t>
             </a:r>
             <a:r>
-              <a:rPr lang="es-CO" sz="1800" dirty="0">
+              <a:rPr lang="es-CO" sz="2000" dirty="0">
                 <a:latin typeface="Arial" panose="020B0604020202020204" pitchFamily="34" charset="0"/>
                 <a:cs typeface="Arial" panose="020B0604020202020204" pitchFamily="34" charset="0"/>
               </a:rPr>

</xml_diff>

<commit_message>
Cambios en las diapositivas de la sustentación
</commit_message>
<xml_diff>
--- a/Documento(s) de proyecto de grado/Presentación del proyecto de grado.pptx
+++ b/Documento(s) de proyecto de grado/Presentación del proyecto de grado.pptx
@@ -6,7 +6,7 @@
     <p:sldMasterId id="2147483672" r:id="rId2"/>
   </p:sldMasterIdLst>
   <p:notesMasterIdLst>
-    <p:notesMasterId r:id="rId27"/>
+    <p:notesMasterId r:id="rId32"/>
   </p:notesMasterIdLst>
   <p:sldIdLst>
     <p:sldId id="256" r:id="rId3"/>
@@ -21,18 +21,23 @@
     <p:sldId id="334" r:id="rId12"/>
     <p:sldId id="312" r:id="rId13"/>
     <p:sldId id="324" r:id="rId14"/>
-    <p:sldId id="325" r:id="rId15"/>
-    <p:sldId id="336" r:id="rId16"/>
-    <p:sldId id="337" r:id="rId17"/>
-    <p:sldId id="338" r:id="rId18"/>
-    <p:sldId id="343" r:id="rId19"/>
-    <p:sldId id="342" r:id="rId20"/>
-    <p:sldId id="341" r:id="rId21"/>
-    <p:sldId id="344" r:id="rId22"/>
-    <p:sldId id="330" r:id="rId23"/>
-    <p:sldId id="317" r:id="rId24"/>
-    <p:sldId id="318" r:id="rId25"/>
-    <p:sldId id="297" r:id="rId26"/>
+    <p:sldId id="345" r:id="rId15"/>
+    <p:sldId id="325" r:id="rId16"/>
+    <p:sldId id="347" r:id="rId17"/>
+    <p:sldId id="348" r:id="rId18"/>
+    <p:sldId id="349" r:id="rId19"/>
+    <p:sldId id="346" r:id="rId20"/>
+    <p:sldId id="336" r:id="rId21"/>
+    <p:sldId id="337" r:id="rId22"/>
+    <p:sldId id="338" r:id="rId23"/>
+    <p:sldId id="343" r:id="rId24"/>
+    <p:sldId id="342" r:id="rId25"/>
+    <p:sldId id="341" r:id="rId26"/>
+    <p:sldId id="344" r:id="rId27"/>
+    <p:sldId id="330" r:id="rId28"/>
+    <p:sldId id="317" r:id="rId29"/>
+    <p:sldId id="318" r:id="rId30"/>
+    <p:sldId id="297" r:id="rId31"/>
   </p:sldIdLst>
   <p:sldSz cx="9144000" cy="6858000" type="screen4x3"/>
   <p:notesSz cx="6858000" cy="9144000"/>
@@ -11035,7 +11040,7 @@
         </p:nvSpPr>
         <p:spPr>
           <a:xfrm>
-            <a:off x="239799" y="964608"/>
+            <a:off x="239799" y="840320"/>
             <a:ext cx="5178167" cy="4928787"/>
           </a:xfrm>
         </p:spPr>
@@ -11051,7 +11056,7 @@
                 <a:latin typeface="Arial" panose="020B0604020202020204" pitchFamily="34" charset="0"/>
                 <a:cs typeface="Arial" panose="020B0604020202020204" pitchFamily="34" charset="0"/>
               </a:rPr>
-              <a:t>Identificar los procesos y medidas propuestas por la ISO/IEC 29110 que se adecúen a las características del gestor de datos ambientales de la empresa Sanambiente.</a:t>
+              <a:t>Identificar los procesos y medidas propuestas por la ISO/IEC 29110 que se adecúen a las características del gestor de datos ambientales de la empresa Sanambiente S.AS.</a:t>
             </a:r>
           </a:p>
           <a:p>
@@ -11061,7 +11066,7 @@
                 <a:latin typeface="Arial" panose="020B0604020202020204" pitchFamily="34" charset="0"/>
                 <a:cs typeface="Arial" panose="020B0604020202020204" pitchFamily="34" charset="0"/>
               </a:rPr>
-              <a:t>Establecer la ruta de procesos y herramientas que permitan la integración de los equipos del proyecto de Sanambiente de acuerdo a la ISO/IEC 29110.</a:t>
+              <a:t>Establecer la ruta de procesos y herramientas que permitan la integración de los equipos del proyecto de Sanambiente S.A.S de acuerdo a la ISO/IEC 29110.</a:t>
             </a:r>
           </a:p>
           <a:p>
@@ -11071,7 +11076,7 @@
                 <a:latin typeface="Arial" panose="020B0604020202020204" pitchFamily="34" charset="0"/>
                 <a:cs typeface="Arial" panose="020B0604020202020204" pitchFamily="34" charset="0"/>
               </a:rPr>
-              <a:t>Aplicar el marco de trabajo identificado en la ISO/IEC 29110 al proyecto Sanambiente.</a:t>
+              <a:t>Aplicar el marco de trabajo identificado en la ISO/IEC 29110 al proyecto Sanambiente S.A.S.</a:t>
             </a:r>
           </a:p>
           <a:p>
@@ -11156,7 +11161,7 @@
                 <a:latin typeface="Arial" panose="020B0604020202020204" pitchFamily="34" charset="0"/>
                 <a:cs typeface="Arial" panose="020B0604020202020204" pitchFamily="34" charset="0"/>
               </a:rPr>
-              <a:t>Marco teórico (1/2) </a:t>
+              <a:t>Marco teórico (1/6) </a:t>
             </a:r>
             <a:r>
               <a:rPr lang="es-ES" sz="2500" b="1" dirty="0">
@@ -11210,21 +11215,21 @@
           </a:p>
           <a:p>
             <a:r>
-              <a:rPr lang="es-CO" sz="1800" dirty="0">
+              <a:rPr lang="es-CO" sz="2000" dirty="0">
                 <a:latin typeface="Arial" panose="020B0604020202020204" pitchFamily="34" charset="0"/>
                 <a:cs typeface="Arial" panose="020B0604020202020204" pitchFamily="34" charset="0"/>
               </a:rPr>
               <a:t>Es una norma bajo el título “</a:t>
             </a:r>
             <a:r>
-              <a:rPr lang="es-CO" sz="1800" i="1" dirty="0">
+              <a:rPr lang="es-CO" sz="2000" i="1" dirty="0">
                 <a:latin typeface="Arial" panose="020B0604020202020204" pitchFamily="34" charset="0"/>
                 <a:cs typeface="Arial" panose="020B0604020202020204" pitchFamily="34" charset="0"/>
               </a:rPr>
               <a:t>Ingeniería de Software – Perfiles del ciclo de vida para entidades muy pequeñas</a:t>
             </a:r>
             <a:r>
-              <a:rPr lang="es-CO" sz="1800" dirty="0">
+              <a:rPr lang="es-CO" sz="2000" dirty="0">
                 <a:latin typeface="Arial" panose="020B0604020202020204" pitchFamily="34" charset="0"/>
                 <a:cs typeface="Arial" panose="020B0604020202020204" pitchFamily="34" charset="0"/>
               </a:rPr>
@@ -11233,7 +11238,7 @@
           </a:p>
           <a:p>
             <a:r>
-              <a:rPr lang="es-CO" sz="1800" dirty="0">
+              <a:rPr lang="es-CO" sz="2000" dirty="0">
                 <a:latin typeface="Arial" panose="020B0604020202020204" pitchFamily="34" charset="0"/>
                 <a:cs typeface="Arial" panose="020B0604020202020204" pitchFamily="34" charset="0"/>
               </a:rPr>
@@ -11264,8 +11269,8 @@
         </p:blipFill>
         <p:spPr>
           <a:xfrm>
-            <a:off x="2812009" y="4733089"/>
-            <a:ext cx="3519982" cy="1759991"/>
+            <a:off x="2846229" y="4802819"/>
+            <a:ext cx="3451542" cy="1725771"/>
           </a:xfrm>
           <a:prstGeom prst="rect">
             <a:avLst/>
@@ -11343,7 +11348,7 @@
                 <a:latin typeface="Arial" panose="020B0604020202020204" pitchFamily="34" charset="0"/>
                 <a:cs typeface="Arial" panose="020B0604020202020204" pitchFamily="34" charset="0"/>
               </a:rPr>
-              <a:t>Marco teórico (2/2</a:t>
+              <a:t>Marco teórico (2/6</a:t>
             </a:r>
             <a:r>
               <a:rPr lang="es-ES" sz="2500" b="1" dirty="0">
@@ -11376,18 +11381,18 @@
         </p:spPr>
         <p:txBody>
           <a:bodyPr>
-            <a:normAutofit/>
+            <a:normAutofit lnSpcReduction="10000"/>
           </a:bodyPr>
           <a:lstStyle/>
           <a:p>
             <a:r>
-              <a:rPr lang="es-CO" sz="1800" dirty="0">
+              <a:rPr lang="es-CO" sz="2000" dirty="0">
                 <a:latin typeface="Arial" panose="020B0604020202020204" pitchFamily="34" charset="0"/>
                 <a:cs typeface="Arial" panose="020B0604020202020204" pitchFamily="34" charset="0"/>
               </a:rPr>
               <a:t>El estándar define los procesos de gestión de proyectos e implementación de software, junto con sus fases y artefactos correspondientes (ISO/IEC, 2011, p. 3).</a:t>
             </a:r>
-            <a:endParaRPr lang="es-ES" sz="1800" dirty="0">
+            <a:endParaRPr lang="es-ES" sz="2000" dirty="0">
               <a:latin typeface="Arial" panose="020B0604020202020204" pitchFamily="34" charset="0"/>
               <a:cs typeface="Arial" panose="020B0604020202020204" pitchFamily="34" charset="0"/>
             </a:endParaRPr>
@@ -12475,7 +12480,7 @@
                 <a:latin typeface="Arial" panose="020B0604020202020204" pitchFamily="34" charset="0"/>
                 <a:cs typeface="Arial" panose="020B0604020202020204" pitchFamily="34" charset="0"/>
               </a:rPr>
-              <a:t>Desarrollo (1/8) - Fases</a:t>
+              <a:t>Marco teórico (3/6)</a:t>
             </a:r>
             <a:endParaRPr lang="es-ES" sz="2500" b="1" dirty="0">
               <a:solidFill>
@@ -12500,7 +12505,7 @@
         <p:spPr>
           <a:xfrm>
             <a:off x="1627202" y="2089179"/>
-            <a:ext cx="5889596" cy="385575"/>
+            <a:ext cx="6389334" cy="458712"/>
           </a:xfrm>
         </p:spPr>
         <p:txBody>
@@ -12519,10 +12524,6 @@
               </a:rPr>
               <a:t>Proceso de gestión del proyecto (fases y artefactos)</a:t>
             </a:r>
-            <a:endParaRPr lang="es-ES" sz="1800" b="1" dirty="0">
-              <a:latin typeface="Arial" panose="020B0604020202020204" pitchFamily="34" charset="0"/>
-              <a:cs typeface="Arial" panose="020B0604020202020204" pitchFamily="34" charset="0"/>
-            </a:endParaRPr>
           </a:p>
           <a:p>
             <a:pPr algn="ctr"/>
@@ -12545,13 +12546,7 @@
           <p:cNvGraphicFramePr>
             <a:graphicFrameLocks/>
           </p:cNvGraphicFramePr>
-          <p:nvPr>
-            <p:extLst>
-              <p:ext uri="{D42A27DB-BD31-4B8C-83A1-F6EECF244321}">
-                <p14:modId xmlns:p14="http://schemas.microsoft.com/office/powerpoint/2010/main" val="3160411312"/>
-              </p:ext>
-            </p:extLst>
-          </p:nvPr>
+          <p:nvPr/>
         </p:nvGraphicFramePr>
         <p:xfrm>
           <a:off x="434009" y="2672070"/>
@@ -12566,7 +12561,7 @@
     </p:spTree>
     <p:extLst>
       <p:ext uri="{BB962C8B-B14F-4D97-AF65-F5344CB8AC3E}">
-        <p14:creationId xmlns:p14="http://schemas.microsoft.com/office/powerpoint/2010/main" val="181302240"/>
+        <p14:creationId xmlns:p14="http://schemas.microsoft.com/office/powerpoint/2010/main" val="4249658684"/>
       </p:ext>
     </p:extLst>
   </p:cSld>
@@ -12634,7 +12629,7 @@
                 <a:latin typeface="Arial" panose="020B0604020202020204" pitchFamily="34" charset="0"/>
                 <a:cs typeface="Arial" panose="020B0604020202020204" pitchFamily="34" charset="0"/>
               </a:rPr>
-              <a:t>Desarrollo (2/8) – Repositorio del proyecto</a:t>
+              <a:t>Marco teórico (4/6)</a:t>
             </a:r>
             <a:endParaRPr lang="es-ES" sz="2500" b="1" dirty="0">
               <a:solidFill>
@@ -12646,24 +12641,75 @@
           </a:p>
         </p:txBody>
       </p:sp>
+      <p:sp>
+        <p:nvSpPr>
+          <p:cNvPr id="3" name="Marcador de contenido 2"/>
+          <p:cNvSpPr>
+            <a:spLocks noGrp="1"/>
+          </p:cNvSpPr>
+          <p:nvPr>
+            <p:ph idx="1"/>
+          </p:nvPr>
+        </p:nvSpPr>
+        <p:spPr>
+          <a:xfrm>
+            <a:off x="1600569" y="1504213"/>
+            <a:ext cx="6848787" cy="395608"/>
+          </a:xfrm>
+        </p:spPr>
+        <p:txBody>
+          <a:bodyPr>
+            <a:normAutofit/>
+          </a:bodyPr>
+          <a:lstStyle/>
+          <a:p>
+            <a:pPr marL="0" indent="0" algn="ctr">
+              <a:buNone/>
+            </a:pPr>
+            <a:r>
+              <a:rPr lang="es-CO" sz="1800" b="1" dirty="0">
+                <a:latin typeface="Arial" panose="020B0604020202020204" pitchFamily="34" charset="0"/>
+                <a:cs typeface="Arial" panose="020B0604020202020204" pitchFamily="34" charset="0"/>
+              </a:rPr>
+              <a:t>Proceso de implementación de software (fases y artefactos)</a:t>
+            </a:r>
+            <a:endParaRPr lang="es-ES" sz="1800" b="1" dirty="0">
+              <a:latin typeface="Arial" panose="020B0604020202020204" pitchFamily="34" charset="0"/>
+              <a:cs typeface="Arial" panose="020B0604020202020204" pitchFamily="34" charset="0"/>
+            </a:endParaRPr>
+          </a:p>
+          <a:p>
+            <a:pPr marL="0" indent="0" algn="ctr">
+              <a:buNone/>
+            </a:pPr>
+            <a:endParaRPr lang="es-ES" sz="1800" b="1" dirty="0">
+              <a:latin typeface="Arial" panose="020B0604020202020204" pitchFamily="34" charset="0"/>
+              <a:cs typeface="Arial" panose="020B0604020202020204" pitchFamily="34" charset="0"/>
+            </a:endParaRPr>
+          </a:p>
+          <a:p>
+            <a:pPr algn="ctr"/>
+            <a:endParaRPr lang="es-CO" sz="1800" b="1" dirty="0">
+              <a:latin typeface="Arial" panose="020B0604020202020204" pitchFamily="34" charset="0"/>
+              <a:cs typeface="Arial" panose="020B0604020202020204" pitchFamily="34" charset="0"/>
+            </a:endParaRPr>
+          </a:p>
+        </p:txBody>
+      </p:sp>
       <p:pic>
         <p:nvPicPr>
-          <p:cNvPr id="8" name="Marcador de contenido 7">
+          <p:cNvPr id="5" name="Imagen 4">
             <a:extLst>
               <a:ext uri="{FF2B5EF4-FFF2-40B4-BE49-F238E27FC236}">
-                <a16:creationId xmlns:a16="http://schemas.microsoft.com/office/drawing/2014/main" id="{107943BD-451F-4968-A1EF-AD32F3367205}"/>
+                <a16:creationId xmlns:a16="http://schemas.microsoft.com/office/drawing/2014/main" id="{3D23E89A-038B-4C23-8E76-5EB2D6D93165}"/>
               </a:ext>
             </a:extLst>
           </p:cNvPr>
-          <p:cNvPicPr>
-            <a:picLocks noGrp="1" noChangeAspect="1"/>
-          </p:cNvPicPr>
-          <p:nvPr>
-            <p:ph idx="1"/>
-          </p:nvPr>
+          <p:cNvPicPr/>
+          <p:nvPr/>
         </p:nvPicPr>
         <p:blipFill>
-          <a:blip r:embed="rId3">
+          <a:blip r:embed="rId3" cstate="print">
             <a:extLst>
               <a:ext uri="{28A0092B-C50C-407E-A947-70E740481C1C}">
                 <a14:useLocalDpi xmlns:a14="http://schemas.microsoft.com/office/drawing/2010/main" val="0"/>
@@ -12676,17 +12722,20 @@
         </p:blipFill>
         <p:spPr>
           <a:xfrm>
-            <a:off x="2022593" y="1585928"/>
-            <a:ext cx="6521963" cy="4476368"/>
+            <a:off x="2467992" y="1793289"/>
+            <a:ext cx="4563124" cy="4625266"/>
           </a:xfrm>
+          <a:prstGeom prst="rect">
+            <a:avLst/>
+          </a:prstGeom>
         </p:spPr>
       </p:pic>
       <p:sp>
         <p:nvSpPr>
-          <p:cNvPr id="5" name="CuadroTexto 4">
+          <p:cNvPr id="7" name="CuadroTexto 6">
             <a:extLst>
               <a:ext uri="{FF2B5EF4-FFF2-40B4-BE49-F238E27FC236}">
-                <a16:creationId xmlns:a16="http://schemas.microsoft.com/office/drawing/2014/main" id="{0407966B-CEA6-4EC7-85CA-80EBB5EEF849}"/>
+                <a16:creationId xmlns:a16="http://schemas.microsoft.com/office/drawing/2014/main" id="{1A7C1F12-4EF5-4B37-BC5B-544EA503C799}"/>
               </a:ext>
             </a:extLst>
           </p:cNvPr>
@@ -12695,8 +12744,8 @@
         </p:nvSpPr>
         <p:spPr>
           <a:xfrm>
-            <a:off x="301841" y="2921168"/>
-            <a:ext cx="1624614" cy="1015663"/>
+            <a:off x="124287" y="6582484"/>
+            <a:ext cx="8457765" cy="400110"/>
           </a:xfrm>
           <a:prstGeom prst="rect">
             <a:avLst/>
@@ -12710,26 +12759,32 @@
           <a:lstStyle/>
           <a:p>
             <a:r>
-              <a:rPr lang="es-CO" sz="2000" b="1" dirty="0">
-                <a:latin typeface="Arial" panose="020B0604020202020204" pitchFamily="34" charset="0"/>
-                <a:cs typeface="Arial" panose="020B0604020202020204" pitchFamily="34" charset="0"/>
-              </a:rPr>
-              <a:t>Fase 1: </a:t>
-            </a:r>
-            <a:r>
-              <a:rPr lang="es-CO" sz="2000" dirty="0">
-                <a:latin typeface="Arial" panose="020B0604020202020204" pitchFamily="34" charset="0"/>
-                <a:cs typeface="Arial" panose="020B0604020202020204" pitchFamily="34" charset="0"/>
-              </a:rPr>
-              <a:t>Planificación del proyecto</a:t>
-            </a:r>
+              <a:rPr lang="en-US" sz="1000" i="1" dirty="0"/>
+              <a:t>Nota: </a:t>
+            </a:r>
+            <a:r>
+              <a:rPr lang="en-US" sz="1000" dirty="0"/>
+              <a:t>ISO/IEC. (2011). </a:t>
+            </a:r>
+            <a:r>
+              <a:rPr lang="en-US" sz="1000" i="1" dirty="0"/>
+              <a:t>Software engineering - Lifecycle profiles for Very Small Entities (VSEs) Part 5-1-2: Management and engineering guide: Generic profile group: Basic profile</a:t>
+            </a:r>
+            <a:r>
+              <a:rPr lang="en-US" sz="1000" dirty="0"/>
+              <a:t>.</a:t>
+            </a:r>
+            <a:endParaRPr lang="es-CO" sz="1000" dirty="0"/>
+          </a:p>
+          <a:p>
+            <a:endParaRPr lang="es-CO" sz="1000" dirty="0"/>
           </a:p>
         </p:txBody>
       </p:sp>
     </p:spTree>
     <p:extLst>
       <p:ext uri="{BB962C8B-B14F-4D97-AF65-F5344CB8AC3E}">
-        <p14:creationId xmlns:p14="http://schemas.microsoft.com/office/powerpoint/2010/main" val="3201176488"/>
+        <p14:creationId xmlns:p14="http://schemas.microsoft.com/office/powerpoint/2010/main" val="181302240"/>
       </p:ext>
     </p:extLst>
   </p:cSld>
@@ -12785,7 +12840,7 @@
         </p:spPr>
         <p:txBody>
           <a:bodyPr>
-            <a:normAutofit fontScale="90000"/>
+            <a:normAutofit/>
           </a:bodyPr>
           <a:lstStyle/>
           <a:p>
@@ -12797,7 +12852,1457 @@
                 <a:latin typeface="Arial" panose="020B0604020202020204" pitchFamily="34" charset="0"/>
                 <a:cs typeface="Arial" panose="020B0604020202020204" pitchFamily="34" charset="0"/>
               </a:rPr>
-              <a:t>Desarrollo (3/8) – Resultados de la verificación</a:t>
+              <a:t>Marco teórico (5/6) </a:t>
+            </a:r>
+            <a:r>
+              <a:rPr lang="es-ES" sz="2500" b="1" dirty="0">
+                <a:solidFill>
+                  <a:schemeClr val="bg1"/>
+                </a:solidFill>
+                <a:latin typeface="Arial" panose="020B0604020202020204" pitchFamily="34" charset="0"/>
+                <a:cs typeface="Arial" panose="020B0604020202020204" pitchFamily="34" charset="0"/>
+              </a:rPr>
+              <a:t> </a:t>
+            </a:r>
+          </a:p>
+        </p:txBody>
+      </p:sp>
+      <p:sp>
+        <p:nvSpPr>
+          <p:cNvPr id="3" name="Marcador de contenido 2"/>
+          <p:cNvSpPr>
+            <a:spLocks noGrp="1"/>
+          </p:cNvSpPr>
+          <p:nvPr>
+            <p:ph idx="1"/>
+          </p:nvPr>
+        </p:nvSpPr>
+        <p:spPr>
+          <a:xfrm>
+            <a:off x="628650" y="1825627"/>
+            <a:ext cx="7886700" cy="3081935"/>
+          </a:xfrm>
+        </p:spPr>
+        <p:txBody>
+          <a:bodyPr>
+            <a:normAutofit/>
+          </a:bodyPr>
+          <a:lstStyle/>
+          <a:p>
+            <a:pPr marL="0" indent="0">
+              <a:buNone/>
+            </a:pPr>
+            <a:r>
+              <a:rPr lang="es-CO" sz="1800" b="1" dirty="0">
+                <a:latin typeface="Arial" panose="020B0604020202020204" pitchFamily="34" charset="0"/>
+                <a:cs typeface="Arial" panose="020B0604020202020204" pitchFamily="34" charset="0"/>
+              </a:rPr>
+              <a:t>Metodología ICONIX</a:t>
+            </a:r>
+            <a:endParaRPr lang="es-CO" sz="1800" dirty="0">
+              <a:latin typeface="Arial" panose="020B0604020202020204" pitchFamily="34" charset="0"/>
+              <a:cs typeface="Arial" panose="020B0604020202020204" pitchFamily="34" charset="0"/>
+            </a:endParaRPr>
+          </a:p>
+          <a:p>
+            <a:r>
+              <a:rPr lang="es-CO" sz="2000" dirty="0">
+                <a:latin typeface="Arial" panose="020B0604020202020204" pitchFamily="34" charset="0"/>
+                <a:cs typeface="Arial" panose="020B0604020202020204" pitchFamily="34" charset="0"/>
+              </a:rPr>
+              <a:t>Metodología de desarrollo de software de proporción media, en la que el análisis y capacidad de su diseño se basa en UML (</a:t>
+            </a:r>
+            <a:r>
+              <a:rPr lang="es-CO" sz="2000" dirty="0" err="1">
+                <a:latin typeface="Arial" panose="020B0604020202020204" pitchFamily="34" charset="0"/>
+                <a:cs typeface="Arial" panose="020B0604020202020204" pitchFamily="34" charset="0"/>
+              </a:rPr>
+              <a:t>Unified</a:t>
+            </a:r>
+            <a:r>
+              <a:rPr lang="es-CO" sz="2000" dirty="0">
+                <a:latin typeface="Arial" panose="020B0604020202020204" pitchFamily="34" charset="0"/>
+                <a:cs typeface="Arial" panose="020B0604020202020204" pitchFamily="34" charset="0"/>
+              </a:rPr>
+              <a:t> </a:t>
+            </a:r>
+            <a:r>
+              <a:rPr lang="es-CO" sz="2000" dirty="0" err="1">
+                <a:latin typeface="Arial" panose="020B0604020202020204" pitchFamily="34" charset="0"/>
+                <a:cs typeface="Arial" panose="020B0604020202020204" pitchFamily="34" charset="0"/>
+              </a:rPr>
+              <a:t>Modeling</a:t>
+            </a:r>
+            <a:r>
+              <a:rPr lang="es-CO" sz="2000" dirty="0">
+                <a:latin typeface="Arial" panose="020B0604020202020204" pitchFamily="34" charset="0"/>
+                <a:cs typeface="Arial" panose="020B0604020202020204" pitchFamily="34" charset="0"/>
+              </a:rPr>
+              <a:t> </a:t>
+            </a:r>
+            <a:r>
+              <a:rPr lang="es-CO" sz="2000" dirty="0" err="1">
+                <a:latin typeface="Arial" panose="020B0604020202020204" pitchFamily="34" charset="0"/>
+                <a:cs typeface="Arial" panose="020B0604020202020204" pitchFamily="34" charset="0"/>
+              </a:rPr>
+              <a:t>Language</a:t>
+            </a:r>
+            <a:r>
+              <a:rPr lang="es-CO" sz="2000" dirty="0">
+                <a:latin typeface="Arial" panose="020B0604020202020204" pitchFamily="34" charset="0"/>
+                <a:cs typeface="Arial" panose="020B0604020202020204" pitchFamily="34" charset="0"/>
+              </a:rPr>
+              <a:t>) (</a:t>
+            </a:r>
+            <a:r>
+              <a:rPr lang="es-CO" sz="2000" dirty="0" err="1">
+                <a:latin typeface="Arial" panose="020B0604020202020204" pitchFamily="34" charset="0"/>
+                <a:cs typeface="Arial" panose="020B0604020202020204" pitchFamily="34" charset="0"/>
+              </a:rPr>
+              <a:t>Mnkandla</a:t>
+            </a:r>
+            <a:r>
+              <a:rPr lang="es-CO" sz="2000" dirty="0">
+                <a:latin typeface="Arial" panose="020B0604020202020204" pitchFamily="34" charset="0"/>
+                <a:cs typeface="Arial" panose="020B0604020202020204" pitchFamily="34" charset="0"/>
+              </a:rPr>
+              <a:t> &amp; </a:t>
+            </a:r>
+            <a:r>
+              <a:rPr lang="es-CO" sz="2000" dirty="0" err="1">
+                <a:latin typeface="Arial" panose="020B0604020202020204" pitchFamily="34" charset="0"/>
+                <a:cs typeface="Arial" panose="020B0604020202020204" pitchFamily="34" charset="0"/>
+              </a:rPr>
+              <a:t>Dwolatzky</a:t>
+            </a:r>
+            <a:r>
+              <a:rPr lang="es-CO" sz="2000" dirty="0">
+                <a:latin typeface="Arial" panose="020B0604020202020204" pitchFamily="34" charset="0"/>
+                <a:cs typeface="Arial" panose="020B0604020202020204" pitchFamily="34" charset="0"/>
+              </a:rPr>
+              <a:t>, 2004, p. 1). </a:t>
+            </a:r>
+          </a:p>
+          <a:p>
+            <a:r>
+              <a:rPr lang="es-CO" sz="2000" dirty="0">
+                <a:latin typeface="Arial" panose="020B0604020202020204" pitchFamily="34" charset="0"/>
+                <a:cs typeface="Arial" panose="020B0604020202020204" pitchFamily="34" charset="0"/>
+              </a:rPr>
+              <a:t>La esencia de ICONIX está en que un 80% de los casos pueden ser resueltos tan solo con un uso del 20% del UML, lo cual simplifica en gran medida el proceso, al dejar solo aquella documentación necesaria (ICONIX Brand </a:t>
+            </a:r>
+            <a:r>
+              <a:rPr lang="es-CO" sz="2000" dirty="0" err="1">
+                <a:latin typeface="Arial" panose="020B0604020202020204" pitchFamily="34" charset="0"/>
+                <a:cs typeface="Arial" panose="020B0604020202020204" pitchFamily="34" charset="0"/>
+              </a:rPr>
+              <a:t>Group</a:t>
+            </a:r>
+            <a:r>
+              <a:rPr lang="es-CO" sz="2000" dirty="0">
+                <a:latin typeface="Arial" panose="020B0604020202020204" pitchFamily="34" charset="0"/>
+                <a:cs typeface="Arial" panose="020B0604020202020204" pitchFamily="34" charset="0"/>
+              </a:rPr>
+              <a:t>, 2016, p. 1).</a:t>
+            </a:r>
+          </a:p>
+          <a:p>
+            <a:endParaRPr lang="es-CO" sz="2000" dirty="0">
+              <a:latin typeface="Arial" panose="020B0604020202020204" pitchFamily="34" charset="0"/>
+              <a:cs typeface="Arial" panose="020B0604020202020204" pitchFamily="34" charset="0"/>
+            </a:endParaRPr>
+          </a:p>
+        </p:txBody>
+      </p:sp>
+      <p:pic>
+        <p:nvPicPr>
+          <p:cNvPr id="5" name="Imagen 9">
+            <a:extLst>
+              <a:ext uri="{FF2B5EF4-FFF2-40B4-BE49-F238E27FC236}">
+                <a16:creationId xmlns:a16="http://schemas.microsoft.com/office/drawing/2014/main" id="{58FA662B-3FBF-451A-9AC4-1C61B55F4FDB}"/>
+              </a:ext>
+            </a:extLst>
+          </p:cNvPr>
+          <p:cNvPicPr>
+            <a:picLocks noChangeAspect="1" noChangeArrowheads="1"/>
+          </p:cNvPicPr>
+          <p:nvPr/>
+        </p:nvPicPr>
+        <p:blipFill>
+          <a:blip r:embed="rId3">
+            <a:extLst>
+              <a:ext uri="{28A0092B-C50C-407E-A947-70E740481C1C}">
+                <a14:useLocalDpi xmlns:a14="http://schemas.microsoft.com/office/drawing/2010/main" val="0"/>
+              </a:ext>
+            </a:extLst>
+          </a:blip>
+          <a:srcRect/>
+          <a:stretch>
+            <a:fillRect/>
+          </a:stretch>
+        </p:blipFill>
+        <p:spPr bwMode="auto">
+          <a:xfrm>
+            <a:off x="3938860" y="4907562"/>
+            <a:ext cx="1508125" cy="304800"/>
+          </a:xfrm>
+          <a:prstGeom prst="rect">
+            <a:avLst/>
+          </a:prstGeom>
+          <a:noFill/>
+          <a:ln>
+            <a:noFill/>
+          </a:ln>
+          <a:extLst>
+            <a:ext uri="{909E8E84-426E-40DD-AFC4-6F175D3DCCD1}">
+              <a14:hiddenFill xmlns:a14="http://schemas.microsoft.com/office/drawing/2010/main">
+                <a:solidFill>
+                  <a:srgbClr val="FFFFFF"/>
+                </a:solidFill>
+              </a14:hiddenFill>
+            </a:ext>
+            <a:ext uri="{91240B29-F687-4F45-9708-019B960494DF}">
+              <a14:hiddenLine xmlns:a14="http://schemas.microsoft.com/office/drawing/2010/main" w="9525">
+                <a:solidFill>
+                  <a:srgbClr val="000000"/>
+                </a:solidFill>
+                <a:miter lim="800000"/>
+                <a:headEnd/>
+                <a:tailEnd/>
+              </a14:hiddenLine>
+            </a:ext>
+          </a:extLst>
+        </p:spPr>
+      </p:pic>
+    </p:spTree>
+    <p:extLst>
+      <p:ext uri="{BB962C8B-B14F-4D97-AF65-F5344CB8AC3E}">
+        <p14:creationId xmlns:p14="http://schemas.microsoft.com/office/powerpoint/2010/main" val="4048376680"/>
+      </p:ext>
+    </p:extLst>
+  </p:cSld>
+  <p:clrMapOvr>
+    <a:masterClrMapping/>
+  </p:clrMapOvr>
+</p:sld>
+</file>
+
+<file path=ppt/slides/slide16.xml><?xml version="1.0" encoding="utf-8"?>
+<p:sld xmlns:a="http://schemas.openxmlformats.org/drawingml/2006/main" xmlns:r="http://schemas.openxmlformats.org/officeDocument/2006/relationships" xmlns:p="http://schemas.openxmlformats.org/presentationml/2006/main">
+  <p:cSld>
+    <p:bg>
+      <p:bgPr>
+        <a:blipFill rotWithShape="1">
+          <a:blip r:embed="rId2"/>
+          <a:stretch>
+            <a:fillRect/>
+          </a:stretch>
+        </a:blipFill>
+        <a:effectLst/>
+      </p:bgPr>
+    </p:bg>
+    <p:spTree>
+      <p:nvGrpSpPr>
+        <p:cNvPr id="1" name=""/>
+        <p:cNvGrpSpPr/>
+        <p:nvPr/>
+      </p:nvGrpSpPr>
+      <p:grpSpPr>
+        <a:xfrm>
+          <a:off x="0" y="0"/>
+          <a:ext cx="0" cy="0"/>
+          <a:chOff x="0" y="0"/>
+          <a:chExt cx="0" cy="0"/>
+        </a:xfrm>
+      </p:grpSpPr>
+      <p:sp>
+        <p:nvSpPr>
+          <p:cNvPr id="6" name="Título 5"/>
+          <p:cNvSpPr>
+            <a:spLocks noGrp="1"/>
+          </p:cNvSpPr>
+          <p:nvPr>
+            <p:ph type="title"/>
+          </p:nvPr>
+        </p:nvSpPr>
+        <p:spPr>
+          <a:xfrm>
+            <a:off x="2022591" y="589612"/>
+            <a:ext cx="6848788" cy="768477"/>
+          </a:xfrm>
+        </p:spPr>
+        <p:txBody>
+          <a:bodyPr>
+            <a:normAutofit/>
+          </a:bodyPr>
+          <a:lstStyle/>
+          <a:p>
+            <a:r>
+              <a:rPr lang="es-CO" sz="2500" b="1" dirty="0">
+                <a:solidFill>
+                  <a:schemeClr val="bg1"/>
+                </a:solidFill>
+                <a:latin typeface="Arial" panose="020B0604020202020204" pitchFamily="34" charset="0"/>
+                <a:cs typeface="Arial" panose="020B0604020202020204" pitchFamily="34" charset="0"/>
+              </a:rPr>
+              <a:t>Marco teórico (6/6) </a:t>
+            </a:r>
+            <a:r>
+              <a:rPr lang="es-ES" sz="2500" b="1" dirty="0">
+                <a:solidFill>
+                  <a:schemeClr val="bg1"/>
+                </a:solidFill>
+                <a:latin typeface="Arial" panose="020B0604020202020204" pitchFamily="34" charset="0"/>
+                <a:cs typeface="Arial" panose="020B0604020202020204" pitchFamily="34" charset="0"/>
+              </a:rPr>
+              <a:t> </a:t>
+            </a:r>
+          </a:p>
+        </p:txBody>
+      </p:sp>
+      <p:sp>
+        <p:nvSpPr>
+          <p:cNvPr id="3" name="Marcador de contenido 2"/>
+          <p:cNvSpPr>
+            <a:spLocks noGrp="1"/>
+          </p:cNvSpPr>
+          <p:nvPr>
+            <p:ph idx="1"/>
+          </p:nvPr>
+        </p:nvSpPr>
+        <p:spPr>
+          <a:xfrm>
+            <a:off x="628650" y="1825628"/>
+            <a:ext cx="7886700" cy="2284734"/>
+          </a:xfrm>
+        </p:spPr>
+        <p:txBody>
+          <a:bodyPr>
+            <a:normAutofit/>
+          </a:bodyPr>
+          <a:lstStyle/>
+          <a:p>
+            <a:pPr marL="0" indent="0">
+              <a:buNone/>
+            </a:pPr>
+            <a:r>
+              <a:rPr lang="es-CO" sz="2000" dirty="0">
+                <a:latin typeface="Arial" panose="020B0604020202020204" pitchFamily="34" charset="0"/>
+                <a:cs typeface="Arial" panose="020B0604020202020204" pitchFamily="34" charset="0"/>
+              </a:rPr>
+              <a:t>Las fases de la metodología ICONIX son:</a:t>
+            </a:r>
+          </a:p>
+          <a:p>
+            <a:pPr marL="457200" indent="-457200">
+              <a:buAutoNum type="arabicPeriod"/>
+            </a:pPr>
+            <a:r>
+              <a:rPr lang="es-CO" sz="2000" dirty="0">
+                <a:latin typeface="Arial" panose="020B0604020202020204" pitchFamily="34" charset="0"/>
+                <a:cs typeface="Arial" panose="020B0604020202020204" pitchFamily="34" charset="0"/>
+              </a:rPr>
+              <a:t>Análisis de requerimientos CU, proto, </a:t>
+            </a:r>
+            <a:r>
+              <a:rPr lang="es-CO" sz="2000" dirty="0" err="1">
+                <a:latin typeface="Arial" panose="020B0604020202020204" pitchFamily="34" charset="0"/>
+                <a:cs typeface="Arial" panose="020B0604020202020204" pitchFamily="34" charset="0"/>
+              </a:rPr>
+              <a:t>levant</a:t>
+            </a:r>
+            <a:r>
+              <a:rPr lang="es-CO" sz="2000" dirty="0">
+                <a:latin typeface="Arial" panose="020B0604020202020204" pitchFamily="34" charset="0"/>
+                <a:cs typeface="Arial" panose="020B0604020202020204" pitchFamily="34" charset="0"/>
+              </a:rPr>
+              <a:t> </a:t>
+            </a:r>
+            <a:r>
+              <a:rPr lang="es-CO" sz="2000" dirty="0" err="1">
+                <a:latin typeface="Arial" panose="020B0604020202020204" pitchFamily="34" charset="0"/>
+                <a:cs typeface="Arial" panose="020B0604020202020204" pitchFamily="34" charset="0"/>
+              </a:rPr>
+              <a:t>requ</a:t>
+            </a:r>
+            <a:endParaRPr lang="es-CO" sz="2000" dirty="0">
+              <a:latin typeface="Arial" panose="020B0604020202020204" pitchFamily="34" charset="0"/>
+              <a:cs typeface="Arial" panose="020B0604020202020204" pitchFamily="34" charset="0"/>
+            </a:endParaRPr>
+          </a:p>
+          <a:p>
+            <a:pPr marL="457200" indent="-457200">
+              <a:buAutoNum type="arabicPeriod"/>
+            </a:pPr>
+            <a:r>
+              <a:rPr lang="es-CO" sz="2000" dirty="0">
+                <a:latin typeface="Arial" panose="020B0604020202020204" pitchFamily="34" charset="0"/>
+                <a:cs typeface="Arial" panose="020B0604020202020204" pitchFamily="34" charset="0"/>
+              </a:rPr>
+              <a:t>Análisis y diseño preliminar diagrama clases, robustez</a:t>
+            </a:r>
+          </a:p>
+          <a:p>
+            <a:pPr marL="457200" indent="-457200">
+              <a:buAutoNum type="arabicPeriod"/>
+            </a:pPr>
+            <a:r>
+              <a:rPr lang="es-CO" sz="2000" dirty="0">
+                <a:latin typeface="Arial" panose="020B0604020202020204" pitchFamily="34" charset="0"/>
+                <a:cs typeface="Arial" panose="020B0604020202020204" pitchFamily="34" charset="0"/>
+              </a:rPr>
+              <a:t>Diseño detallado </a:t>
+            </a:r>
+            <a:r>
+              <a:rPr lang="es-CO" sz="2000" dirty="0" err="1">
+                <a:latin typeface="Arial" panose="020B0604020202020204" pitchFamily="34" charset="0"/>
+                <a:cs typeface="Arial" panose="020B0604020202020204" pitchFamily="34" charset="0"/>
+              </a:rPr>
+              <a:t>diagram</a:t>
+            </a:r>
+            <a:r>
+              <a:rPr lang="es-CO" sz="2000" dirty="0">
+                <a:latin typeface="Arial" panose="020B0604020202020204" pitchFamily="34" charset="0"/>
+                <a:cs typeface="Arial" panose="020B0604020202020204" pitchFamily="34" charset="0"/>
+              </a:rPr>
+              <a:t> </a:t>
+            </a:r>
+            <a:r>
+              <a:rPr lang="es-CO" sz="2000" dirty="0" err="1">
+                <a:latin typeface="Arial" panose="020B0604020202020204" pitchFamily="34" charset="0"/>
+                <a:cs typeface="Arial" panose="020B0604020202020204" pitchFamily="34" charset="0"/>
+              </a:rPr>
+              <a:t>sec</a:t>
+            </a:r>
+            <a:r>
+              <a:rPr lang="es-CO" sz="2000" dirty="0">
+                <a:latin typeface="Arial" panose="020B0604020202020204" pitchFamily="34" charset="0"/>
+                <a:cs typeface="Arial" panose="020B0604020202020204" pitchFamily="34" charset="0"/>
+              </a:rPr>
+              <a:t>, ultimar </a:t>
+            </a:r>
+            <a:r>
+              <a:rPr lang="es-CO" sz="2000" dirty="0" err="1">
+                <a:latin typeface="Arial" panose="020B0604020202020204" pitchFamily="34" charset="0"/>
+                <a:cs typeface="Arial" panose="020B0604020202020204" pitchFamily="34" charset="0"/>
+              </a:rPr>
+              <a:t>detall</a:t>
+            </a:r>
+            <a:r>
+              <a:rPr lang="es-CO" sz="2000" dirty="0">
+                <a:latin typeface="Arial" panose="020B0604020202020204" pitchFamily="34" charset="0"/>
+                <a:cs typeface="Arial" panose="020B0604020202020204" pitchFamily="34" charset="0"/>
+              </a:rPr>
+              <a:t> </a:t>
+            </a:r>
+            <a:r>
+              <a:rPr lang="es-CO" sz="2000" dirty="0" err="1">
+                <a:latin typeface="Arial" panose="020B0604020202020204" pitchFamily="34" charset="0"/>
+                <a:cs typeface="Arial" panose="020B0604020202020204" pitchFamily="34" charset="0"/>
+              </a:rPr>
+              <a:t>dia</a:t>
+            </a:r>
+            <a:r>
+              <a:rPr lang="es-CO" sz="2000" dirty="0">
+                <a:latin typeface="Arial" panose="020B0604020202020204" pitchFamily="34" charset="0"/>
+                <a:cs typeface="Arial" panose="020B0604020202020204" pitchFamily="34" charset="0"/>
+              </a:rPr>
+              <a:t> clases</a:t>
+            </a:r>
+          </a:p>
+          <a:p>
+            <a:pPr marL="457200" indent="-457200">
+              <a:buAutoNum type="arabicPeriod"/>
+            </a:pPr>
+            <a:r>
+              <a:rPr lang="es-CO" sz="2000" dirty="0">
+                <a:latin typeface="Arial" panose="020B0604020202020204" pitchFamily="34" charset="0"/>
+                <a:cs typeface="Arial" panose="020B0604020202020204" pitchFamily="34" charset="0"/>
+              </a:rPr>
+              <a:t>Implementación escribe código, pruebas unitarias y pruebas de </a:t>
+            </a:r>
+            <a:r>
+              <a:rPr lang="es-CO" sz="2000" dirty="0" err="1">
+                <a:latin typeface="Arial" panose="020B0604020202020204" pitchFamily="34" charset="0"/>
+                <a:cs typeface="Arial" panose="020B0604020202020204" pitchFamily="34" charset="0"/>
+              </a:rPr>
+              <a:t>aceptac</a:t>
+            </a:r>
+            <a:r>
+              <a:rPr lang="es-CO" sz="2000" dirty="0">
+                <a:latin typeface="Arial" panose="020B0604020202020204" pitchFamily="34" charset="0"/>
+                <a:cs typeface="Arial" panose="020B0604020202020204" pitchFamily="34" charset="0"/>
+              </a:rPr>
+              <a:t> del </a:t>
+            </a:r>
+            <a:r>
+              <a:rPr lang="es-CO" sz="2000" dirty="0" err="1">
+                <a:latin typeface="Arial" panose="020B0604020202020204" pitchFamily="34" charset="0"/>
+                <a:cs typeface="Arial" panose="020B0604020202020204" pitchFamily="34" charset="0"/>
+              </a:rPr>
+              <a:t>user</a:t>
+            </a:r>
+            <a:r>
+              <a:rPr lang="es-CO" sz="2000" dirty="0">
+                <a:latin typeface="Arial" panose="020B0604020202020204" pitchFamily="34" charset="0"/>
+                <a:cs typeface="Arial" panose="020B0604020202020204" pitchFamily="34" charset="0"/>
+              </a:rPr>
+              <a:t> (Rosenberg &amp; Scott, 2001, p. 23)</a:t>
+            </a:r>
+          </a:p>
+          <a:p>
+            <a:pPr marL="0" indent="0">
+              <a:buNone/>
+            </a:pPr>
+            <a:endParaRPr lang="es-CO" sz="1600" dirty="0">
+              <a:latin typeface="Arial" panose="020B0604020202020204" pitchFamily="34" charset="0"/>
+              <a:cs typeface="Arial" panose="020B0604020202020204" pitchFamily="34" charset="0"/>
+            </a:endParaRPr>
+          </a:p>
+        </p:txBody>
+      </p:sp>
+    </p:spTree>
+    <p:extLst>
+      <p:ext uri="{BB962C8B-B14F-4D97-AF65-F5344CB8AC3E}">
+        <p14:creationId xmlns:p14="http://schemas.microsoft.com/office/powerpoint/2010/main" val="2068720888"/>
+      </p:ext>
+    </p:extLst>
+  </p:cSld>
+  <p:clrMapOvr>
+    <a:masterClrMapping/>
+  </p:clrMapOvr>
+</p:sld>
+</file>
+
+<file path=ppt/slides/slide17.xml><?xml version="1.0" encoding="utf-8"?>
+<p:sld xmlns:a="http://schemas.openxmlformats.org/drawingml/2006/main" xmlns:r="http://schemas.openxmlformats.org/officeDocument/2006/relationships" xmlns:p="http://schemas.openxmlformats.org/presentationml/2006/main">
+  <p:cSld>
+    <p:bg>
+      <p:bgPr>
+        <a:blipFill rotWithShape="1">
+          <a:blip r:embed="rId2"/>
+          <a:stretch>
+            <a:fillRect/>
+          </a:stretch>
+        </a:blipFill>
+        <a:effectLst/>
+      </p:bgPr>
+    </p:bg>
+    <p:spTree>
+      <p:nvGrpSpPr>
+        <p:cNvPr id="1" name=""/>
+        <p:cNvGrpSpPr/>
+        <p:nvPr/>
+      </p:nvGrpSpPr>
+      <p:grpSpPr>
+        <a:xfrm>
+          <a:off x="0" y="0"/>
+          <a:ext cx="0" cy="0"/>
+          <a:chOff x="0" y="0"/>
+          <a:chExt cx="0" cy="0"/>
+        </a:xfrm>
+      </p:grpSpPr>
+      <p:sp>
+        <p:nvSpPr>
+          <p:cNvPr id="6" name="Título 5"/>
+          <p:cNvSpPr>
+            <a:spLocks noGrp="1"/>
+          </p:cNvSpPr>
+          <p:nvPr>
+            <p:ph type="title"/>
+          </p:nvPr>
+        </p:nvSpPr>
+        <p:spPr>
+          <a:xfrm>
+            <a:off x="2022591" y="589612"/>
+            <a:ext cx="2469510" cy="768477"/>
+          </a:xfrm>
+        </p:spPr>
+        <p:txBody>
+          <a:bodyPr>
+            <a:normAutofit fontScale="90000"/>
+          </a:bodyPr>
+          <a:lstStyle/>
+          <a:p>
+            <a:r>
+              <a:rPr lang="es-CO" sz="2500" b="1" dirty="0">
+                <a:solidFill>
+                  <a:schemeClr val="bg1"/>
+                </a:solidFill>
+                <a:latin typeface="Arial" panose="020B0604020202020204" pitchFamily="34" charset="0"/>
+                <a:cs typeface="Arial" panose="020B0604020202020204" pitchFamily="34" charset="0"/>
+              </a:rPr>
+              <a:t>Desarrollo (1/9)</a:t>
+            </a:r>
+            <a:endParaRPr lang="es-ES" sz="2500" b="1" dirty="0">
+              <a:solidFill>
+                <a:schemeClr val="bg1"/>
+              </a:solidFill>
+              <a:latin typeface="Arial" panose="020B0604020202020204" pitchFamily="34" charset="0"/>
+              <a:cs typeface="Arial" panose="020B0604020202020204" pitchFamily="34" charset="0"/>
+            </a:endParaRPr>
+          </a:p>
+        </p:txBody>
+      </p:sp>
+      <p:sp>
+        <p:nvSpPr>
+          <p:cNvPr id="3" name="Marcador de contenido 2">
+            <a:extLst>
+              <a:ext uri="{FF2B5EF4-FFF2-40B4-BE49-F238E27FC236}">
+                <a16:creationId xmlns:a16="http://schemas.microsoft.com/office/drawing/2014/main" id="{EF090BE7-DFBF-4D6D-A515-A22532350FAF}"/>
+              </a:ext>
+            </a:extLst>
+          </p:cNvPr>
+          <p:cNvSpPr>
+            <a:spLocks noGrp="1"/>
+          </p:cNvSpPr>
+          <p:nvPr>
+            <p:ph idx="1"/>
+          </p:nvPr>
+        </p:nvSpPr>
+        <p:spPr>
+          <a:xfrm>
+            <a:off x="1481738" y="1717271"/>
+            <a:ext cx="6180523" cy="630314"/>
+          </a:xfrm>
+        </p:spPr>
+        <p:txBody>
+          <a:bodyPr>
+            <a:normAutofit/>
+          </a:bodyPr>
+          <a:lstStyle/>
+          <a:p>
+            <a:pPr marL="0" indent="0" algn="ctr">
+              <a:buNone/>
+            </a:pPr>
+            <a:r>
+              <a:rPr lang="es-CO" sz="2000" b="1" dirty="0">
+                <a:latin typeface="Arial" panose="020B0604020202020204" pitchFamily="34" charset="0"/>
+                <a:cs typeface="Arial" panose="020B0604020202020204" pitchFamily="34" charset="0"/>
+              </a:rPr>
+              <a:t>Ruta de procesos y herramientas del proyecto</a:t>
+            </a:r>
+            <a:endParaRPr lang="es-CO" sz="2000" dirty="0">
+              <a:latin typeface="Arial" panose="020B0604020202020204" pitchFamily="34" charset="0"/>
+              <a:cs typeface="Arial" panose="020B0604020202020204" pitchFamily="34" charset="0"/>
+            </a:endParaRPr>
+          </a:p>
+        </p:txBody>
+      </p:sp>
+      <p:pic>
+        <p:nvPicPr>
+          <p:cNvPr id="7" name="Imagen 6">
+            <a:extLst>
+              <a:ext uri="{FF2B5EF4-FFF2-40B4-BE49-F238E27FC236}">
+                <a16:creationId xmlns:a16="http://schemas.microsoft.com/office/drawing/2014/main" id="{D2DCE7D3-4FAB-467E-95A7-17ADDBE570DB}"/>
+              </a:ext>
+            </a:extLst>
+          </p:cNvPr>
+          <p:cNvPicPr/>
+          <p:nvPr/>
+        </p:nvPicPr>
+        <p:blipFill>
+          <a:blip r:embed="rId3">
+            <a:extLst>
+              <a:ext uri="{28A0092B-C50C-407E-A947-70E740481C1C}">
+                <a14:useLocalDpi xmlns:a14="http://schemas.microsoft.com/office/drawing/2010/main" val="0"/>
+              </a:ext>
+            </a:extLst>
+          </a:blip>
+          <a:stretch>
+            <a:fillRect/>
+          </a:stretch>
+        </p:blipFill>
+        <p:spPr>
+          <a:xfrm>
+            <a:off x="2022591" y="2293204"/>
+            <a:ext cx="5288633" cy="3975184"/>
+          </a:xfrm>
+          <a:prstGeom prst="rect">
+            <a:avLst/>
+          </a:prstGeom>
+        </p:spPr>
+      </p:pic>
+      <p:sp>
+        <p:nvSpPr>
+          <p:cNvPr id="8" name="CuadroTexto 7">
+            <a:extLst>
+              <a:ext uri="{FF2B5EF4-FFF2-40B4-BE49-F238E27FC236}">
+                <a16:creationId xmlns:a16="http://schemas.microsoft.com/office/drawing/2014/main" id="{24AB61C2-CB9E-4F5A-862A-E7A8AFC15A2B}"/>
+              </a:ext>
+            </a:extLst>
+          </p:cNvPr>
+          <p:cNvSpPr txBox="1"/>
+          <p:nvPr/>
+        </p:nvSpPr>
+        <p:spPr>
+          <a:xfrm>
+            <a:off x="106531" y="6268388"/>
+            <a:ext cx="7457491" cy="246221"/>
+          </a:xfrm>
+          <a:prstGeom prst="rect">
+            <a:avLst/>
+          </a:prstGeom>
+          <a:noFill/>
+        </p:spPr>
+        <p:txBody>
+          <a:bodyPr wrap="none" rtlCol="0">
+            <a:spAutoFit/>
+          </a:bodyPr>
+          <a:lstStyle/>
+          <a:p>
+            <a:r>
+              <a:rPr lang="es-CO" sz="1000" i="1" dirty="0"/>
+              <a:t>Nota: </a:t>
+            </a:r>
+            <a:r>
+              <a:rPr lang="es-CO" sz="1000" dirty="0"/>
+              <a:t>Marín Ospina, B. E. (2020). </a:t>
+            </a:r>
+            <a:r>
+              <a:rPr lang="es-CO" sz="1000" i="1" dirty="0"/>
+              <a:t>Adecuación de la norma ISO/IEC 29110 e IEEE 829 para la gestión de proyectos de desarrollo con metodología Iconix</a:t>
+            </a:r>
+            <a:r>
+              <a:rPr lang="es-CO" sz="1000" dirty="0"/>
+              <a:t>. 15.</a:t>
+            </a:r>
+          </a:p>
+        </p:txBody>
+      </p:sp>
+    </p:spTree>
+    <p:extLst>
+      <p:ext uri="{BB962C8B-B14F-4D97-AF65-F5344CB8AC3E}">
+        <p14:creationId xmlns:p14="http://schemas.microsoft.com/office/powerpoint/2010/main" val="1766579750"/>
+      </p:ext>
+    </p:extLst>
+  </p:cSld>
+  <p:clrMapOvr>
+    <a:masterClrMapping/>
+  </p:clrMapOvr>
+</p:sld>
+</file>
+
+<file path=ppt/slides/slide18.xml><?xml version="1.0" encoding="utf-8"?>
+<p:sld xmlns:a="http://schemas.openxmlformats.org/drawingml/2006/main" xmlns:r="http://schemas.openxmlformats.org/officeDocument/2006/relationships" xmlns:p="http://schemas.openxmlformats.org/presentationml/2006/main">
+  <p:cSld>
+    <p:bg>
+      <p:bgPr>
+        <a:blipFill rotWithShape="1">
+          <a:blip r:embed="rId2"/>
+          <a:stretch>
+            <a:fillRect/>
+          </a:stretch>
+        </a:blipFill>
+        <a:effectLst/>
+      </p:bgPr>
+    </p:bg>
+    <p:spTree>
+      <p:nvGrpSpPr>
+        <p:cNvPr id="1" name=""/>
+        <p:cNvGrpSpPr/>
+        <p:nvPr/>
+      </p:nvGrpSpPr>
+      <p:grpSpPr>
+        <a:xfrm>
+          <a:off x="0" y="0"/>
+          <a:ext cx="0" cy="0"/>
+          <a:chOff x="0" y="0"/>
+          <a:chExt cx="0" cy="0"/>
+        </a:xfrm>
+      </p:grpSpPr>
+      <p:sp>
+        <p:nvSpPr>
+          <p:cNvPr id="6" name="Título 5"/>
+          <p:cNvSpPr>
+            <a:spLocks noGrp="1"/>
+          </p:cNvSpPr>
+          <p:nvPr>
+            <p:ph type="title"/>
+          </p:nvPr>
+        </p:nvSpPr>
+        <p:spPr>
+          <a:xfrm>
+            <a:off x="2022591" y="589612"/>
+            <a:ext cx="6848788" cy="768477"/>
+          </a:xfrm>
+        </p:spPr>
+        <p:txBody>
+          <a:bodyPr>
+            <a:normAutofit/>
+          </a:bodyPr>
+          <a:lstStyle/>
+          <a:p>
+            <a:r>
+              <a:rPr lang="es-CO" sz="2500" b="1" dirty="0">
+                <a:solidFill>
+                  <a:schemeClr val="bg1"/>
+                </a:solidFill>
+                <a:latin typeface="Arial" panose="020B0604020202020204" pitchFamily="34" charset="0"/>
+                <a:cs typeface="Arial" panose="020B0604020202020204" pitchFamily="34" charset="0"/>
+              </a:rPr>
+              <a:t>Desarrollo (2/9) – Plan del proyecto</a:t>
+            </a:r>
+            <a:endParaRPr lang="es-ES" sz="2500" b="1" dirty="0">
+              <a:solidFill>
+                <a:schemeClr val="bg1"/>
+              </a:solidFill>
+              <a:latin typeface="Arial" panose="020B0604020202020204" pitchFamily="34" charset="0"/>
+              <a:cs typeface="Arial" panose="020B0604020202020204" pitchFamily="34" charset="0"/>
+            </a:endParaRPr>
+          </a:p>
+        </p:txBody>
+      </p:sp>
+      <p:sp>
+        <p:nvSpPr>
+          <p:cNvPr id="5" name="CuadroTexto 4">
+            <a:extLst>
+              <a:ext uri="{FF2B5EF4-FFF2-40B4-BE49-F238E27FC236}">
+                <a16:creationId xmlns:a16="http://schemas.microsoft.com/office/drawing/2014/main" id="{0407966B-CEA6-4EC7-85CA-80EBB5EEF849}"/>
+              </a:ext>
+            </a:extLst>
+          </p:cNvPr>
+          <p:cNvSpPr txBox="1"/>
+          <p:nvPr/>
+        </p:nvSpPr>
+        <p:spPr>
+          <a:xfrm>
+            <a:off x="397977" y="2921168"/>
+            <a:ext cx="1624614" cy="1015663"/>
+          </a:xfrm>
+          <a:prstGeom prst="rect">
+            <a:avLst/>
+          </a:prstGeom>
+          <a:noFill/>
+        </p:spPr>
+        <p:txBody>
+          <a:bodyPr wrap="square" rtlCol="0">
+            <a:spAutoFit/>
+          </a:bodyPr>
+          <a:lstStyle/>
+          <a:p>
+            <a:r>
+              <a:rPr lang="es-CO" sz="2000" b="1" dirty="0">
+                <a:latin typeface="Arial" panose="020B0604020202020204" pitchFamily="34" charset="0"/>
+                <a:cs typeface="Arial" panose="020B0604020202020204" pitchFamily="34" charset="0"/>
+              </a:rPr>
+              <a:t>Fase 1: </a:t>
+            </a:r>
+            <a:r>
+              <a:rPr lang="es-CO" sz="2000" dirty="0">
+                <a:latin typeface="Arial" panose="020B0604020202020204" pitchFamily="34" charset="0"/>
+                <a:cs typeface="Arial" panose="020B0604020202020204" pitchFamily="34" charset="0"/>
+              </a:rPr>
+              <a:t>Planificación del proyecto</a:t>
+            </a:r>
+          </a:p>
+        </p:txBody>
+      </p:sp>
+      <p:sp>
+        <p:nvSpPr>
+          <p:cNvPr id="3" name="Marcador de contenido 2">
+            <a:extLst>
+              <a:ext uri="{FF2B5EF4-FFF2-40B4-BE49-F238E27FC236}">
+                <a16:creationId xmlns:a16="http://schemas.microsoft.com/office/drawing/2014/main" id="{EF090BE7-DFBF-4D6D-A515-A22532350FAF}"/>
+              </a:ext>
+            </a:extLst>
+          </p:cNvPr>
+          <p:cNvSpPr>
+            <a:spLocks noGrp="1"/>
+          </p:cNvSpPr>
+          <p:nvPr>
+            <p:ph idx="1"/>
+          </p:nvPr>
+        </p:nvSpPr>
+        <p:spPr>
+          <a:xfrm>
+            <a:off x="2201662" y="2957112"/>
+            <a:ext cx="6180523" cy="979719"/>
+          </a:xfrm>
+        </p:spPr>
+        <p:txBody>
+          <a:bodyPr>
+            <a:normAutofit/>
+          </a:bodyPr>
+          <a:lstStyle/>
+          <a:p>
+            <a:r>
+              <a:rPr lang="es-CO" sz="2000" dirty="0">
+                <a:latin typeface="Arial" panose="020B0604020202020204" pitchFamily="34" charset="0"/>
+                <a:cs typeface="Arial" panose="020B0604020202020204" pitchFamily="34" charset="0"/>
+              </a:rPr>
+              <a:t>Enlace al plan del proyecto: </a:t>
+            </a:r>
+            <a:r>
+              <a:rPr lang="es-MX" sz="2000" dirty="0">
+                <a:latin typeface="Arial" panose="020B0604020202020204" pitchFamily="34" charset="0"/>
+                <a:cs typeface="Arial" panose="020B0604020202020204" pitchFamily="34" charset="0"/>
+                <a:hlinkClick r:id="rId3" action="ppaction://hlinkfile"/>
+              </a:rPr>
+              <a:t>..\Documentos para el proyecto de Sanambiente\Plan del proyecto de Sanambiente.docx</a:t>
+            </a:r>
+            <a:r>
+              <a:rPr lang="es-MX" sz="2000" dirty="0">
+                <a:latin typeface="Arial" panose="020B0604020202020204" pitchFamily="34" charset="0"/>
+                <a:cs typeface="Arial" panose="020B0604020202020204" pitchFamily="34" charset="0"/>
+              </a:rPr>
+              <a:t> </a:t>
+            </a:r>
+            <a:endParaRPr lang="es-CO" sz="2000" dirty="0">
+              <a:latin typeface="Arial" panose="020B0604020202020204" pitchFamily="34" charset="0"/>
+              <a:cs typeface="Arial" panose="020B0604020202020204" pitchFamily="34" charset="0"/>
+            </a:endParaRPr>
+          </a:p>
+        </p:txBody>
+      </p:sp>
+    </p:spTree>
+    <p:extLst>
+      <p:ext uri="{BB962C8B-B14F-4D97-AF65-F5344CB8AC3E}">
+        <p14:creationId xmlns:p14="http://schemas.microsoft.com/office/powerpoint/2010/main" val="1778085835"/>
+      </p:ext>
+    </p:extLst>
+  </p:cSld>
+  <p:clrMapOvr>
+    <a:masterClrMapping/>
+  </p:clrMapOvr>
+</p:sld>
+</file>
+
+<file path=ppt/slides/slide19.xml><?xml version="1.0" encoding="utf-8"?>
+<p:sld xmlns:a="http://schemas.openxmlformats.org/drawingml/2006/main" xmlns:r="http://schemas.openxmlformats.org/officeDocument/2006/relationships" xmlns:p="http://schemas.openxmlformats.org/presentationml/2006/main">
+  <p:cSld>
+    <p:bg>
+      <p:bgPr>
+        <a:blipFill rotWithShape="1">
+          <a:blip r:embed="rId2"/>
+          <a:stretch>
+            <a:fillRect/>
+          </a:stretch>
+        </a:blipFill>
+        <a:effectLst/>
+      </p:bgPr>
+    </p:bg>
+    <p:spTree>
+      <p:nvGrpSpPr>
+        <p:cNvPr id="1" name=""/>
+        <p:cNvGrpSpPr/>
+        <p:nvPr/>
+      </p:nvGrpSpPr>
+      <p:grpSpPr>
+        <a:xfrm>
+          <a:off x="0" y="0"/>
+          <a:ext cx="0" cy="0"/>
+          <a:chOff x="0" y="0"/>
+          <a:chExt cx="0" cy="0"/>
+        </a:xfrm>
+      </p:grpSpPr>
+      <p:sp>
+        <p:nvSpPr>
+          <p:cNvPr id="6" name="Título 5"/>
+          <p:cNvSpPr>
+            <a:spLocks noGrp="1"/>
+          </p:cNvSpPr>
+          <p:nvPr>
+            <p:ph type="title"/>
+          </p:nvPr>
+        </p:nvSpPr>
+        <p:spPr>
+          <a:xfrm>
+            <a:off x="2022591" y="589612"/>
+            <a:ext cx="6848788" cy="768477"/>
+          </a:xfrm>
+        </p:spPr>
+        <p:txBody>
+          <a:bodyPr>
+            <a:normAutofit/>
+          </a:bodyPr>
+          <a:lstStyle/>
+          <a:p>
+            <a:r>
+              <a:rPr lang="es-CO" sz="2500" b="1" dirty="0">
+                <a:solidFill>
+                  <a:schemeClr val="bg1"/>
+                </a:solidFill>
+                <a:latin typeface="Arial" panose="020B0604020202020204" pitchFamily="34" charset="0"/>
+                <a:cs typeface="Arial" panose="020B0604020202020204" pitchFamily="34" charset="0"/>
+              </a:rPr>
+              <a:t>Desarrollo (3/9) – Repositorio del proyecto</a:t>
+            </a:r>
+            <a:endParaRPr lang="es-ES" sz="2500" b="1" dirty="0">
+              <a:solidFill>
+                <a:schemeClr val="bg1"/>
+              </a:solidFill>
+              <a:latin typeface="Arial" panose="020B0604020202020204" pitchFamily="34" charset="0"/>
+              <a:cs typeface="Arial" panose="020B0604020202020204" pitchFamily="34" charset="0"/>
+            </a:endParaRPr>
+          </a:p>
+        </p:txBody>
+      </p:sp>
+      <p:pic>
+        <p:nvPicPr>
+          <p:cNvPr id="8" name="Marcador de contenido 7">
+            <a:extLst>
+              <a:ext uri="{FF2B5EF4-FFF2-40B4-BE49-F238E27FC236}">
+                <a16:creationId xmlns:a16="http://schemas.microsoft.com/office/drawing/2014/main" id="{107943BD-451F-4968-A1EF-AD32F3367205}"/>
+              </a:ext>
+            </a:extLst>
+          </p:cNvPr>
+          <p:cNvPicPr>
+            <a:picLocks noGrp="1" noChangeAspect="1"/>
+          </p:cNvPicPr>
+          <p:nvPr>
+            <p:ph idx="1"/>
+          </p:nvPr>
+        </p:nvPicPr>
+        <p:blipFill>
+          <a:blip r:embed="rId3">
+            <a:extLst>
+              <a:ext uri="{28A0092B-C50C-407E-A947-70E740481C1C}">
+                <a14:useLocalDpi xmlns:a14="http://schemas.microsoft.com/office/drawing/2010/main" val="0"/>
+              </a:ext>
+            </a:extLst>
+          </a:blip>
+          <a:stretch>
+            <a:fillRect/>
+          </a:stretch>
+        </p:blipFill>
+        <p:spPr>
+          <a:xfrm>
+            <a:off x="2022593" y="1585928"/>
+            <a:ext cx="6521963" cy="4476368"/>
+          </a:xfrm>
+        </p:spPr>
+      </p:pic>
+      <p:sp>
+        <p:nvSpPr>
+          <p:cNvPr id="5" name="CuadroTexto 4">
+            <a:extLst>
+              <a:ext uri="{FF2B5EF4-FFF2-40B4-BE49-F238E27FC236}">
+                <a16:creationId xmlns:a16="http://schemas.microsoft.com/office/drawing/2014/main" id="{0407966B-CEA6-4EC7-85CA-80EBB5EEF849}"/>
+              </a:ext>
+            </a:extLst>
+          </p:cNvPr>
+          <p:cNvSpPr txBox="1"/>
+          <p:nvPr/>
+        </p:nvSpPr>
+        <p:spPr>
+          <a:xfrm>
+            <a:off x="301841" y="2921168"/>
+            <a:ext cx="1624614" cy="1015663"/>
+          </a:xfrm>
+          <a:prstGeom prst="rect">
+            <a:avLst/>
+          </a:prstGeom>
+          <a:noFill/>
+        </p:spPr>
+        <p:txBody>
+          <a:bodyPr wrap="square" rtlCol="0">
+            <a:spAutoFit/>
+          </a:bodyPr>
+          <a:lstStyle/>
+          <a:p>
+            <a:r>
+              <a:rPr lang="es-CO" sz="2000" b="1" dirty="0">
+                <a:latin typeface="Arial" panose="020B0604020202020204" pitchFamily="34" charset="0"/>
+                <a:cs typeface="Arial" panose="020B0604020202020204" pitchFamily="34" charset="0"/>
+              </a:rPr>
+              <a:t>Fase 1: </a:t>
+            </a:r>
+            <a:r>
+              <a:rPr lang="es-CO" sz="2000" dirty="0">
+                <a:latin typeface="Arial" panose="020B0604020202020204" pitchFamily="34" charset="0"/>
+                <a:cs typeface="Arial" panose="020B0604020202020204" pitchFamily="34" charset="0"/>
+              </a:rPr>
+              <a:t>Planificación del proyecto</a:t>
+            </a:r>
+          </a:p>
+        </p:txBody>
+      </p:sp>
+    </p:spTree>
+    <p:extLst>
+      <p:ext uri="{BB962C8B-B14F-4D97-AF65-F5344CB8AC3E}">
+        <p14:creationId xmlns:p14="http://schemas.microsoft.com/office/powerpoint/2010/main" val="3201176488"/>
+      </p:ext>
+    </p:extLst>
+  </p:cSld>
+  <p:clrMapOvr>
+    <a:masterClrMapping/>
+  </p:clrMapOvr>
+</p:sld>
+</file>
+
+<file path=ppt/slides/slide2.xml><?xml version="1.0" encoding="utf-8"?>
+<p:sld xmlns:a="http://schemas.openxmlformats.org/drawingml/2006/main" xmlns:r="http://schemas.openxmlformats.org/officeDocument/2006/relationships" xmlns:p="http://schemas.openxmlformats.org/presentationml/2006/main">
+  <p:cSld>
+    <p:bg>
+      <p:bgPr>
+        <a:blipFill rotWithShape="1">
+          <a:blip r:embed="rId2"/>
+          <a:stretch>
+            <a:fillRect/>
+          </a:stretch>
+        </a:blipFill>
+        <a:effectLst/>
+      </p:bgPr>
+    </p:bg>
+    <p:spTree>
+      <p:nvGrpSpPr>
+        <p:cNvPr id="1" name=""/>
+        <p:cNvGrpSpPr/>
+        <p:nvPr/>
+      </p:nvGrpSpPr>
+      <p:grpSpPr>
+        <a:xfrm>
+          <a:off x="0" y="0"/>
+          <a:ext cx="0" cy="0"/>
+          <a:chOff x="0" y="0"/>
+          <a:chExt cx="0" cy="0"/>
+        </a:xfrm>
+      </p:grpSpPr>
+      <p:sp>
+        <p:nvSpPr>
+          <p:cNvPr id="4" name="Título 3"/>
+          <p:cNvSpPr>
+            <a:spLocks noGrp="1"/>
+          </p:cNvSpPr>
+          <p:nvPr>
+            <p:ph type="title"/>
+          </p:nvPr>
+        </p:nvSpPr>
+        <p:spPr>
+          <a:xfrm>
+            <a:off x="244367" y="290148"/>
+            <a:ext cx="8768866" cy="6145823"/>
+          </a:xfrm>
+        </p:spPr>
+        <p:txBody>
+          <a:bodyPr>
+            <a:noAutofit/>
+          </a:bodyPr>
+          <a:lstStyle/>
+          <a:p>
+            <a:pPr algn="ctr"/>
+            <a:r>
+              <a:rPr lang="es-CO" sz="2500" b="1" dirty="0">
+                <a:solidFill>
+                  <a:schemeClr val="bg1"/>
+                </a:solidFill>
+                <a:latin typeface="Arial" panose="020B0604020202020204" pitchFamily="34" charset="0"/>
+                <a:cs typeface="Arial" panose="020B0604020202020204" pitchFamily="34" charset="0"/>
+              </a:rPr>
+              <a:t>Desarrollo de un marco de trabajo siguiendo el estándar ISO/IEC 29110 para el caso de estudio de integración de procesos del proyecto Sanambiente S.A.S de Cali</a:t>
+            </a:r>
+            <a:br>
+              <a:rPr lang="es-CO" sz="2500" dirty="0">
+                <a:solidFill>
+                  <a:schemeClr val="bg1"/>
+                </a:solidFill>
+                <a:latin typeface="Arial" panose="020B0604020202020204" pitchFamily="34" charset="0"/>
+                <a:cs typeface="Arial" panose="020B0604020202020204" pitchFamily="34" charset="0"/>
+              </a:rPr>
+            </a:br>
+            <a:br>
+              <a:rPr lang="es-ES" sz="2500" b="1" dirty="0">
+                <a:solidFill>
+                  <a:schemeClr val="bg1"/>
+                </a:solidFill>
+                <a:latin typeface="Arial" panose="020B0604020202020204" pitchFamily="34" charset="0"/>
+                <a:cs typeface="Arial" panose="020B0604020202020204" pitchFamily="34" charset="0"/>
+              </a:rPr>
+            </a:br>
+            <a:r>
+              <a:rPr lang="es-ES" sz="2500" b="1" dirty="0">
+                <a:solidFill>
+                  <a:schemeClr val="bg1"/>
+                </a:solidFill>
+                <a:latin typeface="Arial" panose="020B0604020202020204" pitchFamily="34" charset="0"/>
+                <a:cs typeface="Arial" panose="020B0604020202020204" pitchFamily="34" charset="0"/>
+              </a:rPr>
+              <a:t>Integrantes:</a:t>
+            </a:r>
+            <a:br>
+              <a:rPr lang="es-ES" sz="2500" dirty="0">
+                <a:solidFill>
+                  <a:schemeClr val="bg1"/>
+                </a:solidFill>
+                <a:latin typeface="Arial" panose="020B0604020202020204" pitchFamily="34" charset="0"/>
+                <a:cs typeface="Arial" panose="020B0604020202020204" pitchFamily="34" charset="0"/>
+              </a:rPr>
+            </a:br>
+            <a:r>
+              <a:rPr lang="es-ES" sz="2500" dirty="0">
+                <a:solidFill>
+                  <a:schemeClr val="bg1"/>
+                </a:solidFill>
+                <a:latin typeface="Arial" panose="020B0604020202020204" pitchFamily="34" charset="0"/>
+                <a:cs typeface="Arial" panose="020B0604020202020204" pitchFamily="34" charset="0"/>
+              </a:rPr>
+              <a:t>Aarón Levi Grajales Gómez </a:t>
+            </a:r>
+            <a:br>
+              <a:rPr lang="es-ES" sz="2500" dirty="0">
+                <a:solidFill>
+                  <a:schemeClr val="bg1"/>
+                </a:solidFill>
+                <a:latin typeface="Arial" panose="020B0604020202020204" pitchFamily="34" charset="0"/>
+                <a:cs typeface="Arial" panose="020B0604020202020204" pitchFamily="34" charset="0"/>
+              </a:rPr>
+            </a:br>
+            <a:r>
+              <a:rPr lang="es-ES" sz="2500" dirty="0">
+                <a:solidFill>
+                  <a:schemeClr val="bg1"/>
+                </a:solidFill>
+                <a:latin typeface="Arial" panose="020B0604020202020204" pitchFamily="34" charset="0"/>
+                <a:cs typeface="Arial" panose="020B0604020202020204" pitchFamily="34" charset="0"/>
+              </a:rPr>
+              <a:t>Cristhian Fernando Balanta Pazú</a:t>
+            </a:r>
+            <a:br>
+              <a:rPr lang="es-ES" sz="2500" dirty="0">
+                <a:solidFill>
+                  <a:schemeClr val="bg1"/>
+                </a:solidFill>
+                <a:latin typeface="Arial" panose="020B0604020202020204" pitchFamily="34" charset="0"/>
+                <a:cs typeface="Arial" panose="020B0604020202020204" pitchFamily="34" charset="0"/>
+              </a:rPr>
+            </a:br>
+            <a:br>
+              <a:rPr lang="es-ES" sz="2500" dirty="0">
+                <a:solidFill>
+                  <a:schemeClr val="bg1"/>
+                </a:solidFill>
+                <a:latin typeface="Arial" panose="020B0604020202020204" pitchFamily="34" charset="0"/>
+                <a:cs typeface="Arial" panose="020B0604020202020204" pitchFamily="34" charset="0"/>
+              </a:rPr>
+            </a:br>
+            <a:br>
+              <a:rPr lang="es-ES" sz="2500" dirty="0">
+                <a:solidFill>
+                  <a:schemeClr val="bg1"/>
+                </a:solidFill>
+                <a:latin typeface="Arial" panose="020B0604020202020204" pitchFamily="34" charset="0"/>
+                <a:cs typeface="Arial" panose="020B0604020202020204" pitchFamily="34" charset="0"/>
+              </a:rPr>
+            </a:br>
+            <a:r>
+              <a:rPr lang="es-CO" sz="2500" b="1" dirty="0">
+                <a:solidFill>
+                  <a:schemeClr val="bg1"/>
+                </a:solidFill>
+                <a:latin typeface="Arial" panose="020B0604020202020204" pitchFamily="34" charset="0"/>
+                <a:cs typeface="Arial" panose="020B0604020202020204" pitchFamily="34" charset="0"/>
+              </a:rPr>
+              <a:t>Semillero ITMedia - grupo de investigación GRINTIC</a:t>
+            </a:r>
+            <a:br>
+              <a:rPr lang="es-CO" sz="2500" b="1" dirty="0">
+                <a:solidFill>
+                  <a:schemeClr val="bg1"/>
+                </a:solidFill>
+                <a:latin typeface="Arial" panose="020B0604020202020204" pitchFamily="34" charset="0"/>
+                <a:cs typeface="Arial" panose="020B0604020202020204" pitchFamily="34" charset="0"/>
+              </a:rPr>
+            </a:br>
+            <a:r>
+              <a:rPr lang="es-CO" sz="2500" b="1" dirty="0">
+                <a:solidFill>
+                  <a:schemeClr val="bg1"/>
+                </a:solidFill>
+                <a:latin typeface="Arial" panose="020B0604020202020204" pitchFamily="34" charset="0"/>
+                <a:cs typeface="Arial" panose="020B0604020202020204" pitchFamily="34" charset="0"/>
+              </a:rPr>
+              <a:t>Tutora: </a:t>
+            </a:r>
+            <a:r>
+              <a:rPr lang="es-CO" sz="2500" dirty="0">
+                <a:solidFill>
+                  <a:schemeClr val="bg1"/>
+                </a:solidFill>
+                <a:latin typeface="Arial" panose="020B0604020202020204" pitchFamily="34" charset="0"/>
+                <a:cs typeface="Arial" panose="020B0604020202020204" pitchFamily="34" charset="0"/>
+              </a:rPr>
+              <a:t>Beatriz E. Marín</a:t>
+            </a:r>
+            <a:br>
+              <a:rPr lang="es-CO" sz="2500" b="1" dirty="0">
+                <a:solidFill>
+                  <a:schemeClr val="bg1"/>
+                </a:solidFill>
+                <a:latin typeface="Arial" panose="020B0604020202020204" pitchFamily="34" charset="0"/>
+                <a:cs typeface="Arial" panose="020B0604020202020204" pitchFamily="34" charset="0"/>
+              </a:rPr>
+            </a:br>
+            <a:br>
+              <a:rPr lang="es-ES" sz="2500" dirty="0">
+                <a:solidFill>
+                  <a:schemeClr val="bg1"/>
+                </a:solidFill>
+                <a:latin typeface="Arial" panose="020B0604020202020204" pitchFamily="34" charset="0"/>
+                <a:cs typeface="Arial" panose="020B0604020202020204" pitchFamily="34" charset="0"/>
+              </a:rPr>
+            </a:br>
+            <a:r>
+              <a:rPr lang="es-ES" sz="2500" dirty="0">
+                <a:solidFill>
+                  <a:schemeClr val="bg1"/>
+                </a:solidFill>
+                <a:latin typeface="Arial" panose="020B0604020202020204" pitchFamily="34" charset="0"/>
+                <a:cs typeface="Arial" panose="020B0604020202020204" pitchFamily="34" charset="0"/>
+              </a:rPr>
+              <a:t>Institución Universitaria Antonio José Camacho</a:t>
+            </a:r>
+            <a:br>
+              <a:rPr lang="es-ES" sz="2500" dirty="0">
+                <a:solidFill>
+                  <a:schemeClr val="bg1"/>
+                </a:solidFill>
+                <a:latin typeface="Arial" panose="020B0604020202020204" pitchFamily="34" charset="0"/>
+                <a:cs typeface="Arial" panose="020B0604020202020204" pitchFamily="34" charset="0"/>
+              </a:rPr>
+            </a:br>
+            <a:r>
+              <a:rPr lang="es-ES" sz="2500" dirty="0">
+                <a:solidFill>
+                  <a:schemeClr val="bg1"/>
+                </a:solidFill>
+                <a:latin typeface="Arial" panose="020B0604020202020204" pitchFamily="34" charset="0"/>
+                <a:cs typeface="Arial" panose="020B0604020202020204" pitchFamily="34" charset="0"/>
+              </a:rPr>
+              <a:t>Facultad de Ingenierías</a:t>
+            </a:r>
+            <a:br>
+              <a:rPr lang="es-ES" sz="2500" dirty="0">
+                <a:solidFill>
+                  <a:schemeClr val="bg1"/>
+                </a:solidFill>
+                <a:latin typeface="Arial" panose="020B0604020202020204" pitchFamily="34" charset="0"/>
+                <a:cs typeface="Arial" panose="020B0604020202020204" pitchFamily="34" charset="0"/>
+              </a:rPr>
+            </a:br>
+            <a:r>
+              <a:rPr lang="es-ES" sz="2500" dirty="0">
+                <a:solidFill>
+                  <a:schemeClr val="bg1"/>
+                </a:solidFill>
+                <a:latin typeface="Arial" panose="020B0604020202020204" pitchFamily="34" charset="0"/>
+                <a:cs typeface="Arial" panose="020B0604020202020204" pitchFamily="34" charset="0"/>
+              </a:rPr>
+              <a:t>Ingeniería de Sistemas</a:t>
+            </a:r>
+            <a:br>
+              <a:rPr lang="es-ES" sz="2500" dirty="0">
+                <a:solidFill>
+                  <a:schemeClr val="bg1"/>
+                </a:solidFill>
+                <a:latin typeface="Arial" panose="020B0604020202020204" pitchFamily="34" charset="0"/>
+                <a:cs typeface="Arial" panose="020B0604020202020204" pitchFamily="34" charset="0"/>
+              </a:rPr>
+            </a:br>
+            <a:r>
+              <a:rPr lang="es-ES" sz="2500" dirty="0">
+                <a:solidFill>
+                  <a:schemeClr val="bg1"/>
+                </a:solidFill>
+                <a:latin typeface="Arial" panose="020B0604020202020204" pitchFamily="34" charset="0"/>
+                <a:cs typeface="Arial" panose="020B0604020202020204" pitchFamily="34" charset="0"/>
+              </a:rPr>
+              <a:t>Santiago de Cali</a:t>
+            </a:r>
+            <a:br>
+              <a:rPr lang="es-ES" sz="2500" dirty="0">
+                <a:solidFill>
+                  <a:schemeClr val="bg1"/>
+                </a:solidFill>
+                <a:latin typeface="Arial" panose="020B0604020202020204" pitchFamily="34" charset="0"/>
+                <a:cs typeface="Arial" panose="020B0604020202020204" pitchFamily="34" charset="0"/>
+              </a:rPr>
+            </a:br>
+            <a:r>
+              <a:rPr lang="es-ES" sz="2500" dirty="0">
+                <a:solidFill>
+                  <a:schemeClr val="bg1"/>
+                </a:solidFill>
+                <a:latin typeface="Arial" panose="020B0604020202020204" pitchFamily="34" charset="0"/>
+                <a:cs typeface="Arial" panose="020B0604020202020204" pitchFamily="34" charset="0"/>
+              </a:rPr>
+              <a:t>2020</a:t>
+            </a:r>
+          </a:p>
+        </p:txBody>
+      </p:sp>
+    </p:spTree>
+    <p:extLst>
+      <p:ext uri="{BB962C8B-B14F-4D97-AF65-F5344CB8AC3E}">
+        <p14:creationId xmlns:p14="http://schemas.microsoft.com/office/powerpoint/2010/main" val="2354637152"/>
+      </p:ext>
+    </p:extLst>
+  </p:cSld>
+  <p:clrMapOvr>
+    <a:masterClrMapping/>
+  </p:clrMapOvr>
+</p:sld>
+</file>
+
+<file path=ppt/slides/slide20.xml><?xml version="1.0" encoding="utf-8"?>
+<p:sld xmlns:a="http://schemas.openxmlformats.org/drawingml/2006/main" xmlns:r="http://schemas.openxmlformats.org/officeDocument/2006/relationships" xmlns:p="http://schemas.openxmlformats.org/presentationml/2006/main">
+  <p:cSld>
+    <p:bg>
+      <p:bgPr>
+        <a:blipFill rotWithShape="1">
+          <a:blip r:embed="rId2"/>
+          <a:stretch>
+            <a:fillRect/>
+          </a:stretch>
+        </a:blipFill>
+        <a:effectLst/>
+      </p:bgPr>
+    </p:bg>
+    <p:spTree>
+      <p:nvGrpSpPr>
+        <p:cNvPr id="1" name=""/>
+        <p:cNvGrpSpPr/>
+        <p:nvPr/>
+      </p:nvGrpSpPr>
+      <p:grpSpPr>
+        <a:xfrm>
+          <a:off x="0" y="0"/>
+          <a:ext cx="0" cy="0"/>
+          <a:chOff x="0" y="0"/>
+          <a:chExt cx="0" cy="0"/>
+        </a:xfrm>
+      </p:grpSpPr>
+      <p:sp>
+        <p:nvSpPr>
+          <p:cNvPr id="6" name="Título 5"/>
+          <p:cNvSpPr>
+            <a:spLocks noGrp="1"/>
+          </p:cNvSpPr>
+          <p:nvPr>
+            <p:ph type="title"/>
+          </p:nvPr>
+        </p:nvSpPr>
+        <p:spPr>
+          <a:xfrm>
+            <a:off x="2022591" y="589612"/>
+            <a:ext cx="6848788" cy="768477"/>
+          </a:xfrm>
+        </p:spPr>
+        <p:txBody>
+          <a:bodyPr>
+            <a:normAutofit fontScale="90000"/>
+          </a:bodyPr>
+          <a:lstStyle/>
+          <a:p>
+            <a:r>
+              <a:rPr lang="es-CO" sz="2500" b="1" dirty="0">
+                <a:solidFill>
+                  <a:schemeClr val="bg1"/>
+                </a:solidFill>
+                <a:latin typeface="Arial" panose="020B0604020202020204" pitchFamily="34" charset="0"/>
+                <a:cs typeface="Arial" panose="020B0604020202020204" pitchFamily="34" charset="0"/>
+              </a:rPr>
+              <a:t>Desarrollo (4/9) – Resultados de la verificación</a:t>
             </a:r>
             <a:endParaRPr lang="es-ES" sz="2500" b="1" dirty="0">
               <a:solidFill>
@@ -12903,7 +14408,7 @@
 </p:sld>
 </file>
 
-<file path=ppt/slides/slide16.xml><?xml version="1.0" encoding="utf-8"?>
+<file path=ppt/slides/slide21.xml><?xml version="1.0" encoding="utf-8"?>
 <p:sld xmlns:a="http://schemas.openxmlformats.org/drawingml/2006/main" xmlns:r="http://schemas.openxmlformats.org/officeDocument/2006/relationships" xmlns:p="http://schemas.openxmlformats.org/presentationml/2006/main">
   <p:cSld>
     <p:bg>
@@ -12961,7 +14466,7 @@
                 <a:latin typeface="Arial" panose="020B0604020202020204" pitchFamily="34" charset="0"/>
                 <a:cs typeface="Arial" panose="020B0604020202020204" pitchFamily="34" charset="0"/>
               </a:rPr>
-              <a:t>Desarrollo (4/8) – Resultados de la verificación</a:t>
+              <a:t>Desarrollo (5/9) – Resultados de la verificación</a:t>
             </a:r>
             <a:endParaRPr lang="es-ES" sz="2500" b="1" dirty="0">
               <a:solidFill>
@@ -13067,7 +14572,7 @@
 </p:sld>
 </file>
 
-<file path=ppt/slides/slide17.xml><?xml version="1.0" encoding="utf-8"?>
+<file path=ppt/slides/slide22.xml><?xml version="1.0" encoding="utf-8"?>
 <p:sld xmlns:a="http://schemas.openxmlformats.org/drawingml/2006/main" xmlns:r="http://schemas.openxmlformats.org/officeDocument/2006/relationships" xmlns:p="http://schemas.openxmlformats.org/presentationml/2006/main">
   <p:cSld>
     <p:bg>
@@ -13125,7 +14630,7 @@
                 <a:latin typeface="Arial" panose="020B0604020202020204" pitchFamily="34" charset="0"/>
                 <a:cs typeface="Arial" panose="020B0604020202020204" pitchFamily="34" charset="0"/>
               </a:rPr>
-              <a:t>Desarrollo (5/8) – Registro de estado de progreso</a:t>
+              <a:t>Desarrollo (6/9) – Registro de estado de progreso</a:t>
             </a:r>
             <a:endParaRPr lang="es-ES" sz="2500" b="1" dirty="0">
               <a:solidFill>
@@ -13231,7 +14736,7 @@
 </p:sld>
 </file>
 
-<file path=ppt/slides/slide18.xml><?xml version="1.0" encoding="utf-8"?>
+<file path=ppt/slides/slide23.xml><?xml version="1.0" encoding="utf-8"?>
 <p:sld xmlns:a="http://schemas.openxmlformats.org/drawingml/2006/main" xmlns:r="http://schemas.openxmlformats.org/officeDocument/2006/relationships" xmlns:p="http://schemas.openxmlformats.org/presentationml/2006/main">
   <p:cSld>
     <p:bg>
@@ -13289,7 +14794,7 @@
                 <a:latin typeface="Arial" panose="020B0604020202020204" pitchFamily="34" charset="0"/>
                 <a:cs typeface="Arial" panose="020B0604020202020204" pitchFamily="34" charset="0"/>
               </a:rPr>
-              <a:t>Desarrollo (6/8) – Solicitud de cambio</a:t>
+              <a:t>Desarrollo (7/9) – Solicitud de cambio</a:t>
             </a:r>
             <a:endParaRPr lang="es-ES" sz="2500" b="1" dirty="0">
               <a:solidFill>
@@ -13395,7 +14900,7 @@
 </p:sld>
 </file>
 
-<file path=ppt/slides/slide19.xml><?xml version="1.0" encoding="utf-8"?>
+<file path=ppt/slides/slide24.xml><?xml version="1.0" encoding="utf-8"?>
 <p:sld xmlns:a="http://schemas.openxmlformats.org/drawingml/2006/main" xmlns:r="http://schemas.openxmlformats.org/officeDocument/2006/relationships" xmlns:p="http://schemas.openxmlformats.org/presentationml/2006/main">
   <p:cSld>
     <p:bg>
@@ -13453,7 +14958,7 @@
                 <a:latin typeface="Arial" panose="020B0604020202020204" pitchFamily="34" charset="0"/>
                 <a:cs typeface="Arial" panose="020B0604020202020204" pitchFamily="34" charset="0"/>
               </a:rPr>
-              <a:t>Desarrollo (7/8) – Registro de corrección</a:t>
+              <a:t>Desarrollo (8/9) – Registro de corrección</a:t>
             </a:r>
             <a:endParaRPr lang="es-ES" sz="2500" b="1" dirty="0">
               <a:solidFill>
@@ -13559,7 +15064,7 @@
 </p:sld>
 </file>
 
-<file path=ppt/slides/slide2.xml><?xml version="1.0" encoding="utf-8"?>
+<file path=ppt/slides/slide25.xml><?xml version="1.0" encoding="utf-8"?>
 <p:sld xmlns:a="http://schemas.openxmlformats.org/drawingml/2006/main" xmlns:r="http://schemas.openxmlformats.org/officeDocument/2006/relationships" xmlns:p="http://schemas.openxmlformats.org/presentationml/2006/main">
   <p:cSld>
     <p:bg>
@@ -13589,7 +15094,7 @@
       </p:grpSpPr>
       <p:sp>
         <p:nvSpPr>
-          <p:cNvPr id="4" name="Título 3"/>
+          <p:cNvPr id="6" name="Título 5"/>
           <p:cNvSpPr>
             <a:spLocks noGrp="1"/>
           </p:cNvSpPr>
@@ -13599,17 +15104,16 @@
         </p:nvSpPr>
         <p:spPr>
           <a:xfrm>
-            <a:off x="244367" y="290148"/>
-            <a:ext cx="8768866" cy="6145823"/>
+            <a:off x="2022591" y="589612"/>
+            <a:ext cx="6848788" cy="768477"/>
           </a:xfrm>
         </p:spPr>
         <p:txBody>
           <a:bodyPr>
-            <a:noAutofit/>
+            <a:normAutofit/>
           </a:bodyPr>
           <a:lstStyle/>
           <a:p>
-            <a:pPr algn="ctr"/>
             <a:r>
               <a:rPr lang="es-CO" sz="2500" b="1" dirty="0">
                 <a:solidFill>
@@ -13618,339 +15122,7 @@
                 <a:latin typeface="Arial" panose="020B0604020202020204" pitchFamily="34" charset="0"/>
                 <a:cs typeface="Arial" panose="020B0604020202020204" pitchFamily="34" charset="0"/>
               </a:rPr>
-              <a:t>Desarrollo de un marco de trabajo siguiendo el estándar ISO/IEC 29110 para el caso de estudio de integración de procesos del proyecto </a:t>
-            </a:r>
-            <a:r>
-              <a:rPr lang="es-CO" sz="2500" b="1" dirty="0" err="1">
-                <a:solidFill>
-                  <a:schemeClr val="bg1"/>
-                </a:solidFill>
-                <a:latin typeface="Arial" panose="020B0604020202020204" pitchFamily="34" charset="0"/>
-                <a:cs typeface="Arial" panose="020B0604020202020204" pitchFamily="34" charset="0"/>
-              </a:rPr>
-              <a:t>sanambiente</a:t>
-            </a:r>
-            <a:r>
-              <a:rPr lang="es-CO" sz="2500" b="1" dirty="0">
-                <a:solidFill>
-                  <a:schemeClr val="bg1"/>
-                </a:solidFill>
-                <a:latin typeface="Arial" panose="020B0604020202020204" pitchFamily="34" charset="0"/>
-                <a:cs typeface="Arial" panose="020B0604020202020204" pitchFamily="34" charset="0"/>
-              </a:rPr>
-              <a:t>.</a:t>
-            </a:r>
-            <a:br>
-              <a:rPr lang="es-CO" sz="2500" dirty="0">
-                <a:solidFill>
-                  <a:schemeClr val="bg1"/>
-                </a:solidFill>
-                <a:latin typeface="Arial" panose="020B0604020202020204" pitchFamily="34" charset="0"/>
-                <a:cs typeface="Arial" panose="020B0604020202020204" pitchFamily="34" charset="0"/>
-              </a:rPr>
-            </a:br>
-            <a:br>
-              <a:rPr lang="es-ES" sz="2500" b="1" dirty="0">
-                <a:solidFill>
-                  <a:schemeClr val="bg1"/>
-                </a:solidFill>
-                <a:latin typeface="Arial" panose="020B0604020202020204" pitchFamily="34" charset="0"/>
-                <a:cs typeface="Arial" panose="020B0604020202020204" pitchFamily="34" charset="0"/>
-              </a:rPr>
-            </a:br>
-            <a:r>
-              <a:rPr lang="es-ES" sz="2500" b="1" dirty="0">
-                <a:solidFill>
-                  <a:schemeClr val="bg1"/>
-                </a:solidFill>
-                <a:latin typeface="Arial" panose="020B0604020202020204" pitchFamily="34" charset="0"/>
-                <a:cs typeface="Arial" panose="020B0604020202020204" pitchFamily="34" charset="0"/>
-              </a:rPr>
-              <a:t>Integrantes:</a:t>
-            </a:r>
-            <a:br>
-              <a:rPr lang="es-ES" sz="2500" dirty="0">
-                <a:solidFill>
-                  <a:schemeClr val="bg1"/>
-                </a:solidFill>
-                <a:latin typeface="Arial" panose="020B0604020202020204" pitchFamily="34" charset="0"/>
-                <a:cs typeface="Arial" panose="020B0604020202020204" pitchFamily="34" charset="0"/>
-              </a:rPr>
-            </a:br>
-            <a:r>
-              <a:rPr lang="es-ES" sz="2500" dirty="0">
-                <a:solidFill>
-                  <a:schemeClr val="bg1"/>
-                </a:solidFill>
-                <a:latin typeface="Arial" panose="020B0604020202020204" pitchFamily="34" charset="0"/>
-                <a:cs typeface="Arial" panose="020B0604020202020204" pitchFamily="34" charset="0"/>
-              </a:rPr>
-              <a:t>Aarón Levi Grajales Gómez </a:t>
-            </a:r>
-            <a:br>
-              <a:rPr lang="es-ES" sz="2500" dirty="0">
-                <a:solidFill>
-                  <a:schemeClr val="bg1"/>
-                </a:solidFill>
-                <a:latin typeface="Arial" panose="020B0604020202020204" pitchFamily="34" charset="0"/>
-                <a:cs typeface="Arial" panose="020B0604020202020204" pitchFamily="34" charset="0"/>
-              </a:rPr>
-            </a:br>
-            <a:r>
-              <a:rPr lang="es-ES" sz="2500" dirty="0">
-                <a:solidFill>
-                  <a:schemeClr val="bg1"/>
-                </a:solidFill>
-                <a:latin typeface="Arial" panose="020B0604020202020204" pitchFamily="34" charset="0"/>
-                <a:cs typeface="Arial" panose="020B0604020202020204" pitchFamily="34" charset="0"/>
-              </a:rPr>
-              <a:t>Cristhian Fernando Balanta Pazú</a:t>
-            </a:r>
-            <a:br>
-              <a:rPr lang="es-ES" sz="2500" dirty="0">
-                <a:solidFill>
-                  <a:schemeClr val="bg1"/>
-                </a:solidFill>
-                <a:latin typeface="Arial" panose="020B0604020202020204" pitchFamily="34" charset="0"/>
-                <a:cs typeface="Arial" panose="020B0604020202020204" pitchFamily="34" charset="0"/>
-              </a:rPr>
-            </a:br>
-            <a:br>
-              <a:rPr lang="es-ES" sz="2500" dirty="0">
-                <a:solidFill>
-                  <a:schemeClr val="bg1"/>
-                </a:solidFill>
-                <a:latin typeface="Arial" panose="020B0604020202020204" pitchFamily="34" charset="0"/>
-                <a:cs typeface="Arial" panose="020B0604020202020204" pitchFamily="34" charset="0"/>
-              </a:rPr>
-            </a:br>
-            <a:br>
-              <a:rPr lang="es-ES" sz="2500" dirty="0">
-                <a:solidFill>
-                  <a:schemeClr val="bg1"/>
-                </a:solidFill>
-                <a:latin typeface="Arial" panose="020B0604020202020204" pitchFamily="34" charset="0"/>
-                <a:cs typeface="Arial" panose="020B0604020202020204" pitchFamily="34" charset="0"/>
-              </a:rPr>
-            </a:br>
-            <a:r>
-              <a:rPr lang="es-CO" sz="2500" b="1" dirty="0">
-                <a:solidFill>
-                  <a:schemeClr val="bg1"/>
-                </a:solidFill>
-                <a:latin typeface="Arial" panose="020B0604020202020204" pitchFamily="34" charset="0"/>
-                <a:cs typeface="Arial" panose="020B0604020202020204" pitchFamily="34" charset="0"/>
-              </a:rPr>
-              <a:t>Semillero ITMedia - grupo de investigación GRINTIC</a:t>
-            </a:r>
-            <a:br>
-              <a:rPr lang="es-CO" sz="2500" b="1" dirty="0">
-                <a:solidFill>
-                  <a:schemeClr val="bg1"/>
-                </a:solidFill>
-                <a:latin typeface="Arial" panose="020B0604020202020204" pitchFamily="34" charset="0"/>
-                <a:cs typeface="Arial" panose="020B0604020202020204" pitchFamily="34" charset="0"/>
-              </a:rPr>
-            </a:br>
-            <a:r>
-              <a:rPr lang="es-CO" sz="2500" b="1" dirty="0">
-                <a:solidFill>
-                  <a:schemeClr val="bg1"/>
-                </a:solidFill>
-                <a:latin typeface="Arial" panose="020B0604020202020204" pitchFamily="34" charset="0"/>
-                <a:cs typeface="Arial" panose="020B0604020202020204" pitchFamily="34" charset="0"/>
-              </a:rPr>
-              <a:t>Tutora: </a:t>
-            </a:r>
-            <a:r>
-              <a:rPr lang="es-CO" sz="2500" dirty="0">
-                <a:solidFill>
-                  <a:schemeClr val="bg1"/>
-                </a:solidFill>
-                <a:latin typeface="Arial" panose="020B0604020202020204" pitchFamily="34" charset="0"/>
-                <a:cs typeface="Arial" panose="020B0604020202020204" pitchFamily="34" charset="0"/>
-              </a:rPr>
-              <a:t>Beatriz E. Marín</a:t>
-            </a:r>
-            <a:br>
-              <a:rPr lang="es-CO" sz="2500" b="1" dirty="0">
-                <a:solidFill>
-                  <a:schemeClr val="bg1"/>
-                </a:solidFill>
-                <a:latin typeface="Arial" panose="020B0604020202020204" pitchFamily="34" charset="0"/>
-                <a:cs typeface="Arial" panose="020B0604020202020204" pitchFamily="34" charset="0"/>
-              </a:rPr>
-            </a:br>
-            <a:br>
-              <a:rPr lang="es-ES" sz="2500" dirty="0">
-                <a:solidFill>
-                  <a:schemeClr val="bg1"/>
-                </a:solidFill>
-                <a:latin typeface="Arial" panose="020B0604020202020204" pitchFamily="34" charset="0"/>
-                <a:cs typeface="Arial" panose="020B0604020202020204" pitchFamily="34" charset="0"/>
-              </a:rPr>
-            </a:br>
-            <a:r>
-              <a:rPr lang="es-ES" sz="2500" dirty="0">
-                <a:solidFill>
-                  <a:schemeClr val="bg1"/>
-                </a:solidFill>
-                <a:latin typeface="Arial" panose="020B0604020202020204" pitchFamily="34" charset="0"/>
-                <a:cs typeface="Arial" panose="020B0604020202020204" pitchFamily="34" charset="0"/>
-              </a:rPr>
-              <a:t>Institución Universitaria Antonio José Camacho</a:t>
-            </a:r>
-            <a:br>
-              <a:rPr lang="es-ES" sz="2500" dirty="0">
-                <a:solidFill>
-                  <a:schemeClr val="bg1"/>
-                </a:solidFill>
-                <a:latin typeface="Arial" panose="020B0604020202020204" pitchFamily="34" charset="0"/>
-                <a:cs typeface="Arial" panose="020B0604020202020204" pitchFamily="34" charset="0"/>
-              </a:rPr>
-            </a:br>
-            <a:r>
-              <a:rPr lang="es-ES" sz="2500" dirty="0">
-                <a:solidFill>
-                  <a:schemeClr val="bg1"/>
-                </a:solidFill>
-                <a:latin typeface="Arial" panose="020B0604020202020204" pitchFamily="34" charset="0"/>
-                <a:cs typeface="Arial" panose="020B0604020202020204" pitchFamily="34" charset="0"/>
-              </a:rPr>
-              <a:t>Facultad de Ingenierías</a:t>
-            </a:r>
-            <a:br>
-              <a:rPr lang="es-ES" sz="2500" dirty="0">
-                <a:solidFill>
-                  <a:schemeClr val="bg1"/>
-                </a:solidFill>
-                <a:latin typeface="Arial" panose="020B0604020202020204" pitchFamily="34" charset="0"/>
-                <a:cs typeface="Arial" panose="020B0604020202020204" pitchFamily="34" charset="0"/>
-              </a:rPr>
-            </a:br>
-            <a:r>
-              <a:rPr lang="es-ES" sz="2500" dirty="0">
-                <a:solidFill>
-                  <a:schemeClr val="bg1"/>
-                </a:solidFill>
-                <a:latin typeface="Arial" panose="020B0604020202020204" pitchFamily="34" charset="0"/>
-                <a:cs typeface="Arial" panose="020B0604020202020204" pitchFamily="34" charset="0"/>
-              </a:rPr>
-              <a:t>Ingeniería de sistemas</a:t>
-            </a:r>
-            <a:br>
-              <a:rPr lang="es-ES" sz="2500" dirty="0">
-                <a:solidFill>
-                  <a:schemeClr val="bg1"/>
-                </a:solidFill>
-                <a:latin typeface="Arial" panose="020B0604020202020204" pitchFamily="34" charset="0"/>
-                <a:cs typeface="Arial" panose="020B0604020202020204" pitchFamily="34" charset="0"/>
-              </a:rPr>
-            </a:br>
-            <a:r>
-              <a:rPr lang="es-ES" sz="2500" dirty="0">
-                <a:solidFill>
-                  <a:schemeClr val="bg1"/>
-                </a:solidFill>
-                <a:latin typeface="Arial" panose="020B0604020202020204" pitchFamily="34" charset="0"/>
-                <a:cs typeface="Arial" panose="020B0604020202020204" pitchFamily="34" charset="0"/>
-              </a:rPr>
-              <a:t>Santiago de Cali</a:t>
-            </a:r>
-            <a:br>
-              <a:rPr lang="es-ES" sz="2500" dirty="0">
-                <a:solidFill>
-                  <a:schemeClr val="bg1"/>
-                </a:solidFill>
-                <a:latin typeface="Arial" panose="020B0604020202020204" pitchFamily="34" charset="0"/>
-                <a:cs typeface="Arial" panose="020B0604020202020204" pitchFamily="34" charset="0"/>
-              </a:rPr>
-            </a:br>
-            <a:r>
-              <a:rPr lang="es-ES" sz="2500" dirty="0">
-                <a:solidFill>
-                  <a:schemeClr val="bg1"/>
-                </a:solidFill>
-                <a:latin typeface="Arial" panose="020B0604020202020204" pitchFamily="34" charset="0"/>
-                <a:cs typeface="Arial" panose="020B0604020202020204" pitchFamily="34" charset="0"/>
-              </a:rPr>
-              <a:t>2020</a:t>
-            </a:r>
-          </a:p>
-        </p:txBody>
-      </p:sp>
-    </p:spTree>
-    <p:extLst>
-      <p:ext uri="{BB962C8B-B14F-4D97-AF65-F5344CB8AC3E}">
-        <p14:creationId xmlns:p14="http://schemas.microsoft.com/office/powerpoint/2010/main" val="2354637152"/>
-      </p:ext>
-    </p:extLst>
-  </p:cSld>
-  <p:clrMapOvr>
-    <a:masterClrMapping/>
-  </p:clrMapOvr>
-</p:sld>
-</file>
-
-<file path=ppt/slides/slide20.xml><?xml version="1.0" encoding="utf-8"?>
-<p:sld xmlns:a="http://schemas.openxmlformats.org/drawingml/2006/main" xmlns:r="http://schemas.openxmlformats.org/officeDocument/2006/relationships" xmlns:p="http://schemas.openxmlformats.org/presentationml/2006/main">
-  <p:cSld>
-    <p:bg>
-      <p:bgPr>
-        <a:blipFill rotWithShape="1">
-          <a:blip r:embed="rId2"/>
-          <a:stretch>
-            <a:fillRect/>
-          </a:stretch>
-        </a:blipFill>
-        <a:effectLst/>
-      </p:bgPr>
-    </p:bg>
-    <p:spTree>
-      <p:nvGrpSpPr>
-        <p:cNvPr id="1" name=""/>
-        <p:cNvGrpSpPr/>
-        <p:nvPr/>
-      </p:nvGrpSpPr>
-      <p:grpSpPr>
-        <a:xfrm>
-          <a:off x="0" y="0"/>
-          <a:ext cx="0" cy="0"/>
-          <a:chOff x="0" y="0"/>
-          <a:chExt cx="0" cy="0"/>
-        </a:xfrm>
-      </p:grpSpPr>
-      <p:sp>
-        <p:nvSpPr>
-          <p:cNvPr id="6" name="Título 5"/>
-          <p:cNvSpPr>
-            <a:spLocks noGrp="1"/>
-          </p:cNvSpPr>
-          <p:nvPr>
-            <p:ph type="title"/>
-          </p:nvPr>
-        </p:nvSpPr>
-        <p:spPr>
-          <a:xfrm>
-            <a:off x="2022591" y="589612"/>
-            <a:ext cx="6848788" cy="768477"/>
-          </a:xfrm>
-        </p:spPr>
-        <p:txBody>
-          <a:bodyPr>
-            <a:normAutofit/>
-          </a:bodyPr>
-          <a:lstStyle/>
-          <a:p>
-            <a:r>
-              <a:rPr lang="es-CO" sz="2500" b="1" dirty="0">
-                <a:solidFill>
-                  <a:schemeClr val="bg1"/>
-                </a:solidFill>
-                <a:latin typeface="Arial" panose="020B0604020202020204" pitchFamily="34" charset="0"/>
-                <a:cs typeface="Arial" panose="020B0604020202020204" pitchFamily="34" charset="0"/>
-              </a:rPr>
-              <a:t>Desarrollo (8/8) – Registro de aceptación</a:t>
+              <a:t>Desarrollo (9/9) – Registro de aceptación</a:t>
             </a:r>
             <a:endParaRPr lang="es-ES" sz="2500" b="1" dirty="0">
               <a:solidFill>
@@ -14092,7 +15264,7 @@
 </p:sld>
 </file>
 
-<file path=ppt/slides/slide21.xml><?xml version="1.0" encoding="utf-8"?>
+<file path=ppt/slides/slide26.xml><?xml version="1.0" encoding="utf-8"?>
 <p:sld xmlns:a="http://schemas.openxmlformats.org/drawingml/2006/main" xmlns:r="http://schemas.openxmlformats.org/officeDocument/2006/relationships" xmlns:p="http://schemas.openxmlformats.org/presentationml/2006/main">
   <p:cSld>
     <p:bg>
@@ -14237,7 +15409,7 @@
 </p:sld>
 </file>
 
-<file path=ppt/slides/slide22.xml><?xml version="1.0" encoding="utf-8"?>
+<file path=ppt/slides/slide27.xml><?xml version="1.0" encoding="utf-8"?>
 <p:sld xmlns:a="http://schemas.openxmlformats.org/drawingml/2006/main" xmlns:r="http://schemas.openxmlformats.org/officeDocument/2006/relationships" xmlns:p="http://schemas.openxmlformats.org/presentationml/2006/main">
   <p:cSld>
     <p:bg>
@@ -14395,7 +15567,7 @@
 </p:sld>
 </file>
 
-<file path=ppt/slides/slide23.xml><?xml version="1.0" encoding="utf-8"?>
+<file path=ppt/slides/slide28.xml><?xml version="1.0" encoding="utf-8"?>
 <p:sld xmlns:a="http://schemas.openxmlformats.org/drawingml/2006/main" xmlns:r="http://schemas.openxmlformats.org/officeDocument/2006/relationships" xmlns:p="http://schemas.openxmlformats.org/presentationml/2006/main">
   <p:cSld>
     <p:bg>
@@ -14472,7 +15644,7 @@
 </p:sld>
 </file>
 
-<file path=ppt/slides/slide24.xml><?xml version="1.0" encoding="utf-8"?>
+<file path=ppt/slides/slide29.xml><?xml version="1.0" encoding="utf-8"?>
 <p:sld xmlns:a="http://schemas.openxmlformats.org/drawingml/2006/main" xmlns:r="http://schemas.openxmlformats.org/officeDocument/2006/relationships" xmlns:p="http://schemas.openxmlformats.org/presentationml/2006/main">
   <p:cSld>
     <p:bg>
@@ -14553,8 +15725,8 @@
         </p:nvSpPr>
         <p:spPr>
           <a:xfrm>
-            <a:off x="462127" y="1889062"/>
-            <a:ext cx="6848788" cy="3930927"/>
+            <a:off x="2056147" y="1800285"/>
+            <a:ext cx="4012219" cy="3930927"/>
           </a:xfrm>
         </p:spPr>
         <p:txBody>
@@ -14606,7 +15778,7 @@
                 <a:cs typeface="Arial" panose="020B0604020202020204" pitchFamily="34" charset="0"/>
                 <a:hlinkClick r:id="rId5" action="ppaction://hlinksldjump"/>
               </a:rPr>
-              <a:t>3. Objetivos</a:t>
+              <a:t>3. Formulación del problema</a:t>
             </a:r>
             <a:endParaRPr lang="es-CO" sz="1800" dirty="0">
               <a:latin typeface="Arial" panose="020B0604020202020204" pitchFamily="34" charset="0"/>
@@ -14819,7 +15991,7 @@
         <p:spPr>
           <a:xfrm>
             <a:off x="377505" y="1912456"/>
-            <a:ext cx="8572786" cy="1275362"/>
+            <a:ext cx="8572786" cy="1420374"/>
           </a:xfrm>
         </p:spPr>
         <p:txBody>
@@ -14834,14 +16006,14 @@
                 <a:latin typeface="Arial" panose="020B0604020202020204" pitchFamily="34" charset="0"/>
                 <a:cs typeface="Arial" panose="020B0604020202020204" pitchFamily="34" charset="0"/>
               </a:rPr>
-              <a:t>Sanambiente S.A.S</a:t>
+              <a:t>Sanambiente S.A.S </a:t>
             </a:r>
             <a:r>
               <a:rPr lang="es-CO" sz="2000" dirty="0">
                 <a:latin typeface="Arial" panose="020B0604020202020204" pitchFamily="34" charset="0"/>
                 <a:cs typeface="Arial" panose="020B0604020202020204" pitchFamily="34" charset="0"/>
               </a:rPr>
-              <a:t> es una empresa especializada en ofrecer soluciones integrales en productos y/o servicios que aportan al cuidado y mejoramiento de las condiciones ambientales en un medio ambiente específico (Sanambiente, s. f.).</a:t>
+              <a:t>es una empresa que se encuentra radicada con su sede principal en la ciudad de Cali, especializada en ofrecer soluciones integrales en productos y/o servicios que aportan al cuidado y mejoramiento de las condiciones ambientales en un medio ambiente específico (Sanambiente, s. f.).</a:t>
             </a:r>
           </a:p>
         </p:txBody>
@@ -14910,7 +16082,7 @@
         </p:blipFill>
         <p:spPr bwMode="auto">
           <a:xfrm>
-            <a:off x="2410138" y="3365372"/>
+            <a:off x="2410138" y="3525170"/>
             <a:ext cx="4323724" cy="1596006"/>
           </a:xfrm>
           <a:prstGeom prst="rect">
@@ -14986,8 +16158,8 @@
         </p:nvSpPr>
         <p:spPr>
           <a:xfrm>
-            <a:off x="327172" y="1878899"/>
-            <a:ext cx="8599023" cy="2124930"/>
+            <a:off x="327172" y="1878898"/>
+            <a:ext cx="8599023" cy="3927098"/>
           </a:xfrm>
         </p:spPr>
         <p:txBody>
@@ -15002,12 +16174,31 @@
                 <a:latin typeface="Arial" panose="020B0604020202020204" pitchFamily="34" charset="0"/>
                 <a:cs typeface="Arial" panose="020B0604020202020204" pitchFamily="34" charset="0"/>
               </a:rPr>
-              <a:t>Este proyecto describe el cómo implementar un marco de trabajo siguiendo estándares y metodologías para facilitar el control y seguimiento de todos los recursos que intervienen en el desarrollo de un producto de software. Este marco incluye las principales etapas para gestión de un proyecto de desarrollo de software, desde la planificación del proyecto hasta el cierre de este, siguiendo como base los pasos y artefactos proporcionados por el estándar ISO/IEC 29110.</a:t>
-            </a:r>
-            <a:endParaRPr lang="es-CO" sz="1400" dirty="0">
-              <a:latin typeface="Arial" panose="020B0604020202020204" pitchFamily="34" charset="0"/>
-              <a:cs typeface="Arial" panose="020B0604020202020204" pitchFamily="34" charset="0"/>
-            </a:endParaRPr>
+              <a:t>Este proyecto describe el cómo implementar un marco de trabajo siguiendo estándares y metodologías para facilitar el control y seguimiento de todos los recursos que intervienen en el desarrollo de un producto de software. Este marco incluye las principales etapas para la gestión de un proyecto de desarrollo de software, desde la planificación del proyecto hasta el cierre de éste, siguiendo como base los pasos y artefactos proporcionados por el estándar ISO/IEC 29110.</a:t>
+            </a:r>
+          </a:p>
+          <a:p>
+            <a:r>
+              <a:rPr lang="es-CO" sz="2000" dirty="0">
+                <a:latin typeface="Arial" panose="020B0604020202020204" pitchFamily="34" charset="0"/>
+                <a:cs typeface="Arial" panose="020B0604020202020204" pitchFamily="34" charset="0"/>
+              </a:rPr>
+              <a:t>Este trabajo se realizó en paralelo con dos </a:t>
+            </a:r>
+            <a:r>
+              <a:rPr lang="es-CO" sz="2000">
+                <a:latin typeface="Arial" panose="020B0604020202020204" pitchFamily="34" charset="0"/>
+                <a:cs typeface="Arial" panose="020B0604020202020204" pitchFamily="34" charset="0"/>
+              </a:rPr>
+              <a:t>proyectos de </a:t>
+            </a:r>
+            <a:r>
+              <a:rPr lang="es-CO" sz="2000" dirty="0">
+                <a:latin typeface="Arial" panose="020B0604020202020204" pitchFamily="34" charset="0"/>
+                <a:cs typeface="Arial" panose="020B0604020202020204" pitchFamily="34" charset="0"/>
+              </a:rPr>
+              <a:t>estudiantes de Ingeniería y Tecnología de Sistemas de la UNIAJC (Institución Universitaria Antonio José Camacho), encargados de los procesos a gestionar: desarrollo y calidad.</a:t>
+            </a:r>
           </a:p>
         </p:txBody>
       </p:sp>
@@ -15046,42 +16237,6 @@
           </a:p>
         </p:txBody>
       </p:sp>
-      <p:pic>
-        <p:nvPicPr>
-          <p:cNvPr id="8" name="Imagen 7">
-            <a:extLst>
-              <a:ext uri="{FF2B5EF4-FFF2-40B4-BE49-F238E27FC236}">
-                <a16:creationId xmlns:a16="http://schemas.microsoft.com/office/drawing/2014/main" id="{D61D2FCE-D1E3-455D-A5B2-41902A50AAFD}"/>
-              </a:ext>
-            </a:extLst>
-          </p:cNvPr>
-          <p:cNvPicPr>
-            <a:picLocks noChangeAspect="1"/>
-          </p:cNvPicPr>
-          <p:nvPr/>
-        </p:nvPicPr>
-        <p:blipFill>
-          <a:blip r:embed="rId3"/>
-          <a:stretch>
-            <a:fillRect/>
-          </a:stretch>
-        </p:blipFill>
-        <p:spPr>
-          <a:xfrm>
-            <a:off x="3057723" y="4245526"/>
-            <a:ext cx="3028557" cy="1893075"/>
-          </a:xfrm>
-          <a:prstGeom prst="rect">
-            <a:avLst/>
-          </a:prstGeom>
-          <a:ln>
-            <a:noFill/>
-          </a:ln>
-          <a:effectLst>
-            <a:softEdge rad="112500"/>
-          </a:effectLst>
-        </p:spPr>
-      </p:pic>
     </p:spTree>
     <p:extLst>
       <p:ext uri="{BB962C8B-B14F-4D97-AF65-F5344CB8AC3E}">
@@ -15161,15 +16316,8 @@
                 <a:latin typeface="Arial" panose="020B0604020202020204" pitchFamily="34" charset="0"/>
                 <a:cs typeface="Arial" panose="020B0604020202020204" pitchFamily="34" charset="0"/>
               </a:rPr>
-              <a:t>De esta situación surge la propuesta de desarrollar un paquete a la medida que sirva de ejercicio académico para los estudiantes de Ingeniería y Tecnología en Sistemas.  Al ser un producto empresarial que vincula varios grupos de trabajo, se requiere incluir estrategias de gestión que aseguren la calidad del producto final en cada uno de sus componentes, por esta razón surge la propuesta de este proyecto.</a:t>
-            </a:r>
-          </a:p>
-          <a:p>
-            <a:pPr algn="just"/>
-            <a:endParaRPr lang="es-CO" dirty="0">
-              <a:latin typeface="Arial" panose="020B0604020202020204" pitchFamily="34" charset="0"/>
-              <a:cs typeface="Arial" panose="020B0604020202020204" pitchFamily="34" charset="0"/>
-            </a:endParaRPr>
+              <a:t>De esta situación surge la propuesta de desarrollar un paquete a la medida que sirva de ejercicio académico para los estudiantes de Ingeniería y Tecnología en Sistemas. Al ser un producto empresarial que vincula varios grupos de trabajo, se requiere incluir estrategias de gestión que aseguren la calidad del producto final en cada uno de sus componentes, por esta razón surge la propuesta de este proyecto.</a:t>
+            </a:r>
           </a:p>
         </p:txBody>
       </p:sp>
@@ -15315,7 +16463,7 @@
                 <a:latin typeface="Arial" panose="020B0604020202020204" pitchFamily="34" charset="0"/>
                 <a:cs typeface="Arial" panose="020B0604020202020204" pitchFamily="34" charset="0"/>
               </a:rPr>
-              <a:t>¿Cómo integrar los equipos del proyecto de gestión de datos de Sanambiente para que cumplan con criterios de calidad y robustez hacia el futuro?</a:t>
+              <a:t>¿Cómo integrar los equipos del proyecto de gestión de datos de Sanambiente S.A.S para que cumplan con criterios de calidad y robustez hacia el futuro?</a:t>
             </a:r>
           </a:p>
         </p:txBody>
@@ -15455,7 +16603,7 @@
                 <a:latin typeface="Arial" panose="020B0604020202020204" pitchFamily="34" charset="0"/>
                 <a:cs typeface="Arial" panose="020B0604020202020204" pitchFamily="34" charset="0"/>
               </a:rPr>
-              <a:t>¿Cuáles elementos de la ISO/IEC 29110 se pueden ajustar a las características del proyecto Sanambiente? </a:t>
+              <a:t>¿Cuáles elementos de la ISO/IEC 29110 se pueden ajustar a las características del proyecto Sanambiente S.A.S? </a:t>
             </a:r>
           </a:p>
           <a:p>
@@ -15465,7 +16613,7 @@
                 <a:latin typeface="Arial" panose="020B0604020202020204" pitchFamily="34" charset="0"/>
                 <a:cs typeface="Arial" panose="020B0604020202020204" pitchFamily="34" charset="0"/>
               </a:rPr>
-              <a:t>¿Cuáles son las herramientas propuestas por la ISO/IEC 29110 que permitan la integración de los diferentes equipos de trabajo del proyecto Sanambiente?</a:t>
+              <a:t>¿Cuáles son las herramientas propuestas por la ISO/IEC 29110 que permiten la integración de los diferentes equipos de trabajo del proyecto Sanambiente S.AS?</a:t>
             </a:r>
           </a:p>
           <a:p>
@@ -15475,7 +16623,7 @@
                 <a:latin typeface="Arial" panose="020B0604020202020204" pitchFamily="34" charset="0"/>
                 <a:cs typeface="Arial" panose="020B0604020202020204" pitchFamily="34" charset="0"/>
               </a:rPr>
-              <a:t>¿Cómo asegurar que el proyecto Sanambiente cumple adecuadamente un marco de calidad?</a:t>
+              <a:t>¿Cómo asegurar que el proyecto Sanambiente S.A.S cumple adecuadamente un marco de calidad?</a:t>
             </a:r>
           </a:p>
           <a:p>
@@ -15661,8 +16809,8 @@
         </p:nvSpPr>
         <p:spPr>
           <a:xfrm>
-            <a:off x="319699" y="2752741"/>
-            <a:ext cx="5178167" cy="1145851"/>
+            <a:off x="230921" y="2702858"/>
+            <a:ext cx="5335377" cy="1452283"/>
           </a:xfrm>
         </p:spPr>
         <p:txBody>
@@ -15675,13 +16823,13 @@
               <a:buNone/>
             </a:pPr>
             <a:r>
-              <a:rPr lang="es-CO" sz="1800" dirty="0">
+              <a:rPr lang="es-CO" sz="2000" dirty="0">
                 <a:latin typeface="Arial" panose="020B0604020202020204" pitchFamily="34" charset="0"/>
                 <a:cs typeface="Arial" panose="020B0604020202020204" pitchFamily="34" charset="0"/>
               </a:rPr>
-              <a:t>Establecer un marco de trabajo siguiendo los lineamientos dados por la ISO/IEC 29110 utilizando como caso de estudio la integración de procesos del proyecto Sanambiente.</a:t>
-            </a:r>
-            <a:endParaRPr lang="es-CO" sz="1800" b="1" dirty="0">
+              <a:t>Establecer un marco de trabajo siguiendo los lineamientos dados por la ISO/IEC 29110 utilizando como caso de estudio la integración de procesos del proyecto Sanambiente S.A.S sede Cali.</a:t>
+            </a:r>
+            <a:endParaRPr lang="es-CO" sz="2000" b="1" dirty="0">
               <a:latin typeface="Arial" panose="020B0604020202020204" pitchFamily="34" charset="0"/>
               <a:cs typeface="Arial" panose="020B0604020202020204" pitchFamily="34" charset="0"/>
             </a:endParaRPr>

</xml_diff>

<commit_message>
update de tabla de contenido
cambio
</commit_message>
<xml_diff>
--- a/Documento(s) de proyecto de grado/Presentación del proyecto de grado.pptx
+++ b/Documento(s) de proyecto de grado/Presentación del proyecto de grado.pptx
@@ -1519,6 +1519,13 @@
         </dgm:presLayoutVars>
       </dgm:prSet>
       <dgm:spPr/>
+      <dgm:t>
+        <a:bodyPr/>
+        <a:lstStyle/>
+        <a:p>
+          <a:endParaRPr lang="es-ES"/>
+        </a:p>
+      </dgm:t>
     </dgm:pt>
     <dgm:pt modelId="{02BE49C7-665B-4C3D-A106-CA427F48BCAF}" type="pres">
       <dgm:prSet presAssocID="{D47754FE-3154-4F9F-9E2B-4221CEEAA210}" presName="composite" presStyleCnt="0"/>
@@ -1533,10 +1540,24 @@
         </dgm:presLayoutVars>
       </dgm:prSet>
       <dgm:spPr/>
+      <dgm:t>
+        <a:bodyPr/>
+        <a:lstStyle/>
+        <a:p>
+          <a:endParaRPr lang="es-ES"/>
+        </a:p>
+      </dgm:t>
     </dgm:pt>
     <dgm:pt modelId="{5BB44648-10DE-43B4-B115-41EF1A186346}" type="pres">
       <dgm:prSet presAssocID="{D47754FE-3154-4F9F-9E2B-4221CEEAA210}" presName="parSh" presStyleLbl="node1" presStyleIdx="0" presStyleCnt="4"/>
       <dgm:spPr/>
+      <dgm:t>
+        <a:bodyPr/>
+        <a:lstStyle/>
+        <a:p>
+          <a:endParaRPr lang="es-ES"/>
+        </a:p>
+      </dgm:t>
     </dgm:pt>
     <dgm:pt modelId="{D02E87F5-91E0-4C1F-A5B8-0BA8CF87E582}" type="pres">
       <dgm:prSet presAssocID="{D47754FE-3154-4F9F-9E2B-4221CEEAA210}" presName="desTx" presStyleLbl="fgAcc1" presStyleIdx="0" presStyleCnt="4" custScaleX="110838">
@@ -1545,14 +1566,35 @@
         </dgm:presLayoutVars>
       </dgm:prSet>
       <dgm:spPr/>
+      <dgm:t>
+        <a:bodyPr/>
+        <a:lstStyle/>
+        <a:p>
+          <a:endParaRPr lang="es-ES"/>
+        </a:p>
+      </dgm:t>
     </dgm:pt>
     <dgm:pt modelId="{88E2B1E4-04B5-41FA-A12F-BE67D51B6C5F}" type="pres">
       <dgm:prSet presAssocID="{123588F0-CE72-4B1F-8B84-5553302DB827}" presName="sibTrans" presStyleLbl="sibTrans2D1" presStyleIdx="0" presStyleCnt="3"/>
       <dgm:spPr/>
+      <dgm:t>
+        <a:bodyPr/>
+        <a:lstStyle/>
+        <a:p>
+          <a:endParaRPr lang="es-ES"/>
+        </a:p>
+      </dgm:t>
     </dgm:pt>
     <dgm:pt modelId="{62DBB75B-493D-4ED1-8514-A72E66E97119}" type="pres">
       <dgm:prSet presAssocID="{123588F0-CE72-4B1F-8B84-5553302DB827}" presName="connTx" presStyleLbl="sibTrans2D1" presStyleIdx="0" presStyleCnt="3"/>
       <dgm:spPr/>
+      <dgm:t>
+        <a:bodyPr/>
+        <a:lstStyle/>
+        <a:p>
+          <a:endParaRPr lang="es-ES"/>
+        </a:p>
+      </dgm:t>
     </dgm:pt>
     <dgm:pt modelId="{5FDCDE92-7A60-430F-9874-09E29F2620A2}" type="pres">
       <dgm:prSet presAssocID="{8E9E8EAE-C51B-43BB-AB85-A07B7A42250B}" presName="composite" presStyleCnt="0"/>
@@ -1567,10 +1609,24 @@
         </dgm:presLayoutVars>
       </dgm:prSet>
       <dgm:spPr/>
+      <dgm:t>
+        <a:bodyPr/>
+        <a:lstStyle/>
+        <a:p>
+          <a:endParaRPr lang="es-ES"/>
+        </a:p>
+      </dgm:t>
     </dgm:pt>
     <dgm:pt modelId="{6E69A30B-E30E-4A4A-903F-9C45B8148E8A}" type="pres">
       <dgm:prSet presAssocID="{8E9E8EAE-C51B-43BB-AB85-A07B7A42250B}" presName="parSh" presStyleLbl="node1" presStyleIdx="1" presStyleCnt="4" custScaleX="106569"/>
       <dgm:spPr/>
+      <dgm:t>
+        <a:bodyPr/>
+        <a:lstStyle/>
+        <a:p>
+          <a:endParaRPr lang="es-ES"/>
+        </a:p>
+      </dgm:t>
     </dgm:pt>
     <dgm:pt modelId="{C6761EF3-66FA-4B14-92BF-D2A06FE81CE9}" type="pres">
       <dgm:prSet presAssocID="{8E9E8EAE-C51B-43BB-AB85-A07B7A42250B}" presName="desTx" presStyleLbl="fgAcc1" presStyleIdx="1" presStyleCnt="4">
@@ -1579,14 +1635,35 @@
         </dgm:presLayoutVars>
       </dgm:prSet>
       <dgm:spPr/>
+      <dgm:t>
+        <a:bodyPr/>
+        <a:lstStyle/>
+        <a:p>
+          <a:endParaRPr lang="es-ES"/>
+        </a:p>
+      </dgm:t>
     </dgm:pt>
     <dgm:pt modelId="{ADF8F87A-B442-4640-849F-83C75E8EF929}" type="pres">
       <dgm:prSet presAssocID="{CDB6FA27-D583-4260-AA26-84D379DFA717}" presName="sibTrans" presStyleLbl="sibTrans2D1" presStyleIdx="1" presStyleCnt="3"/>
       <dgm:spPr/>
+      <dgm:t>
+        <a:bodyPr/>
+        <a:lstStyle/>
+        <a:p>
+          <a:endParaRPr lang="es-ES"/>
+        </a:p>
+      </dgm:t>
     </dgm:pt>
     <dgm:pt modelId="{9AF69F07-8AE2-40C2-A400-56FDAB4ACE6A}" type="pres">
       <dgm:prSet presAssocID="{CDB6FA27-D583-4260-AA26-84D379DFA717}" presName="connTx" presStyleLbl="sibTrans2D1" presStyleIdx="1" presStyleCnt="3"/>
       <dgm:spPr/>
+      <dgm:t>
+        <a:bodyPr/>
+        <a:lstStyle/>
+        <a:p>
+          <a:endParaRPr lang="es-ES"/>
+        </a:p>
+      </dgm:t>
     </dgm:pt>
     <dgm:pt modelId="{26FC784F-DB2F-4DDB-8802-5B39D0D36D91}" type="pres">
       <dgm:prSet presAssocID="{B4DF41A4-27CF-4137-A10B-EE6AFE441123}" presName="composite" presStyleCnt="0"/>
@@ -1601,10 +1678,24 @@
         </dgm:presLayoutVars>
       </dgm:prSet>
       <dgm:spPr/>
+      <dgm:t>
+        <a:bodyPr/>
+        <a:lstStyle/>
+        <a:p>
+          <a:endParaRPr lang="es-ES"/>
+        </a:p>
+      </dgm:t>
     </dgm:pt>
     <dgm:pt modelId="{3CF5C418-0088-45CB-8BB7-5481218A1D3C}" type="pres">
       <dgm:prSet presAssocID="{B4DF41A4-27CF-4137-A10B-EE6AFE441123}" presName="parSh" presStyleLbl="node1" presStyleIdx="2" presStyleCnt="4" custScaleX="127161"/>
       <dgm:spPr/>
+      <dgm:t>
+        <a:bodyPr/>
+        <a:lstStyle/>
+        <a:p>
+          <a:endParaRPr lang="es-ES"/>
+        </a:p>
+      </dgm:t>
     </dgm:pt>
     <dgm:pt modelId="{D805C2BA-0FFD-4B93-8248-DC0ABFFA4568}" type="pres">
       <dgm:prSet presAssocID="{B4DF41A4-27CF-4137-A10B-EE6AFE441123}" presName="desTx" presStyleLbl="fgAcc1" presStyleIdx="2" presStyleCnt="4">
@@ -1613,14 +1704,35 @@
         </dgm:presLayoutVars>
       </dgm:prSet>
       <dgm:spPr/>
+      <dgm:t>
+        <a:bodyPr/>
+        <a:lstStyle/>
+        <a:p>
+          <a:endParaRPr lang="es-ES"/>
+        </a:p>
+      </dgm:t>
     </dgm:pt>
     <dgm:pt modelId="{5CC8F97A-34DC-4ABC-8F5F-5E69D5A87645}" type="pres">
       <dgm:prSet presAssocID="{80924495-4125-489F-9479-57BC0BD91A44}" presName="sibTrans" presStyleLbl="sibTrans2D1" presStyleIdx="2" presStyleCnt="3"/>
       <dgm:spPr/>
+      <dgm:t>
+        <a:bodyPr/>
+        <a:lstStyle/>
+        <a:p>
+          <a:endParaRPr lang="es-ES"/>
+        </a:p>
+      </dgm:t>
     </dgm:pt>
     <dgm:pt modelId="{653C4DF2-2C54-4BA2-AA14-C9D0DACFD5B8}" type="pres">
       <dgm:prSet presAssocID="{80924495-4125-489F-9479-57BC0BD91A44}" presName="connTx" presStyleLbl="sibTrans2D1" presStyleIdx="2" presStyleCnt="3"/>
       <dgm:spPr/>
+      <dgm:t>
+        <a:bodyPr/>
+        <a:lstStyle/>
+        <a:p>
+          <a:endParaRPr lang="es-ES"/>
+        </a:p>
+      </dgm:t>
     </dgm:pt>
     <dgm:pt modelId="{8DB08D07-62B1-4214-BB51-E6B36053087C}" type="pres">
       <dgm:prSet presAssocID="{62A2A740-02AA-44BA-B14C-8EA0290C9406}" presName="composite" presStyleCnt="0"/>
@@ -1635,10 +1747,24 @@
         </dgm:presLayoutVars>
       </dgm:prSet>
       <dgm:spPr/>
+      <dgm:t>
+        <a:bodyPr/>
+        <a:lstStyle/>
+        <a:p>
+          <a:endParaRPr lang="es-ES"/>
+        </a:p>
+      </dgm:t>
     </dgm:pt>
     <dgm:pt modelId="{B6CF3BF9-9286-4E4B-B82B-657382B6C901}" type="pres">
       <dgm:prSet presAssocID="{62A2A740-02AA-44BA-B14C-8EA0290C9406}" presName="parSh" presStyleLbl="node1" presStyleIdx="3" presStyleCnt="4"/>
       <dgm:spPr/>
+      <dgm:t>
+        <a:bodyPr/>
+        <a:lstStyle/>
+        <a:p>
+          <a:endParaRPr lang="es-ES"/>
+        </a:p>
+      </dgm:t>
     </dgm:pt>
     <dgm:pt modelId="{ECA19675-F8FF-45FC-ABCA-FD5D8E8A6026}" type="pres">
       <dgm:prSet presAssocID="{62A2A740-02AA-44BA-B14C-8EA0290C9406}" presName="desTx" presStyleLbl="fgAcc1" presStyleIdx="3" presStyleCnt="4">
@@ -1647,44 +1773,51 @@
         </dgm:presLayoutVars>
       </dgm:prSet>
       <dgm:spPr/>
+      <dgm:t>
+        <a:bodyPr/>
+        <a:lstStyle/>
+        <a:p>
+          <a:endParaRPr lang="es-ES"/>
+        </a:p>
+      </dgm:t>
     </dgm:pt>
   </dgm:ptLst>
   <dgm:cxnLst>
+    <dgm:cxn modelId="{EF8851D3-B525-461F-B803-4A7933630737}" srcId="{8E9E8EAE-C51B-43BB-AB85-A07B7A42250B}" destId="{0E5B48D1-195C-42AE-8560-A8F090D2D731}" srcOrd="0" destOrd="0" parTransId="{E9925DEE-1E5A-438D-BEB9-E7A707E6E533}" sibTransId="{BCD9CC88-A22A-4BE4-B805-373A32706650}"/>
+    <dgm:cxn modelId="{2099223B-BDBC-48FC-8D08-CD7568636C2D}" type="presOf" srcId="{C96FDFC3-2252-4341-BAA9-6A2E0295E737}" destId="{C6761EF3-66FA-4B14-92BF-D2A06FE81CE9}" srcOrd="0" destOrd="2" presId="urn:microsoft.com/office/officeart/2005/8/layout/process3"/>
+    <dgm:cxn modelId="{62DBC681-DCE7-486D-82BC-7D9B3B73566F}" srcId="{8E9E8EAE-C51B-43BB-AB85-A07B7A42250B}" destId="{BEB4FEF3-C155-43D6-AD17-13110221F3BC}" srcOrd="1" destOrd="0" parTransId="{B08D8101-D53F-460A-9074-186CB914EB7D}" sibTransId="{494C5A1F-EF5D-4663-A4FF-CB634D5F81DC}"/>
+    <dgm:cxn modelId="{A4E547AD-E759-4FA2-88BE-937B5AEEF6C9}" type="presOf" srcId="{CDB6FA27-D583-4260-AA26-84D379DFA717}" destId="{ADF8F87A-B442-4640-849F-83C75E8EF929}" srcOrd="0" destOrd="0" presId="urn:microsoft.com/office/officeart/2005/8/layout/process3"/>
+    <dgm:cxn modelId="{646528CE-6E2C-4CD4-80A4-1003AA9B1C4B}" type="presOf" srcId="{CDB6FA27-D583-4260-AA26-84D379DFA717}" destId="{9AF69F07-8AE2-40C2-A400-56FDAB4ACE6A}" srcOrd="1" destOrd="0" presId="urn:microsoft.com/office/officeart/2005/8/layout/process3"/>
+    <dgm:cxn modelId="{7854B4FB-3D9C-4033-8FD3-C1D72FFA2E2B}" type="presOf" srcId="{80924495-4125-489F-9479-57BC0BD91A44}" destId="{5CC8F97A-34DC-4ABC-8F5F-5E69D5A87645}" srcOrd="0" destOrd="0" presId="urn:microsoft.com/office/officeart/2005/8/layout/process3"/>
+    <dgm:cxn modelId="{1494C5E8-F79A-4FA1-BABF-50F926DB07A2}" type="presOf" srcId="{BEB4FEF3-C155-43D6-AD17-13110221F3BC}" destId="{C6761EF3-66FA-4B14-92BF-D2A06FE81CE9}" srcOrd="0" destOrd="1" presId="urn:microsoft.com/office/officeart/2005/8/layout/process3"/>
     <dgm:cxn modelId="{FDF58601-5085-4BAF-ACAD-FC051A68EF6C}" srcId="{D47754FE-3154-4F9F-9E2B-4221CEEAA210}" destId="{69CA003F-6B59-401F-B758-288631CADEBC}" srcOrd="0" destOrd="0" parTransId="{BBF737C2-B615-460E-BE03-AD3A51FE79CF}" sibTransId="{6A3F8AC1-E9BF-4E71-B2EF-DFF2AC28FF88}"/>
+    <dgm:cxn modelId="{C9F4A961-2F1E-4515-B264-21192EB9D9AE}" type="presOf" srcId="{B4DF41A4-27CF-4137-A10B-EE6AFE441123}" destId="{360F57FC-C640-481B-A017-4D2B929CC74E}" srcOrd="0" destOrd="0" presId="urn:microsoft.com/office/officeart/2005/8/layout/process3"/>
+    <dgm:cxn modelId="{4ED9C596-61DF-4EF1-AF18-FE595F019FD8}" type="presOf" srcId="{123588F0-CE72-4B1F-8B84-5553302DB827}" destId="{62DBB75B-493D-4ED1-8514-A72E66E97119}" srcOrd="1" destOrd="0" presId="urn:microsoft.com/office/officeart/2005/8/layout/process3"/>
+    <dgm:cxn modelId="{5C543995-4A95-4834-943E-4355BCBE113F}" type="presOf" srcId="{8E9E8EAE-C51B-43BB-AB85-A07B7A42250B}" destId="{97979297-E9CB-4815-8E97-63384DB01CAD}" srcOrd="0" destOrd="0" presId="urn:microsoft.com/office/officeart/2005/8/layout/process3"/>
+    <dgm:cxn modelId="{4B65C2A5-0A73-44E2-949F-CA4D71F864BA}" srcId="{D47754FE-3154-4F9F-9E2B-4221CEEAA210}" destId="{9535B3D5-2E4E-4479-8B81-68F108B4E1B1}" srcOrd="2" destOrd="0" parTransId="{D9FF943B-1116-49C8-9996-6FCA1F4D7CB4}" sibTransId="{99F46589-2494-471C-A019-4535CDB980C7}"/>
+    <dgm:cxn modelId="{7DAD02C2-C926-42E6-87AA-F71FBA89B5F2}" srcId="{B4DF41A4-27CF-4137-A10B-EE6AFE441123}" destId="{54F1FFCF-D2CF-400C-8A54-1CD2AD4B846B}" srcOrd="0" destOrd="0" parTransId="{331E3A34-7AE9-49EF-91CD-2221AD729316}" sibTransId="{A7040E73-FA28-425C-90CA-890311AEB3D7}"/>
+    <dgm:cxn modelId="{ED5B0A85-B536-4275-BE58-5C4ECA183844}" srcId="{EB6EB4FA-5A72-403F-BE71-7EDB5249E1DA}" destId="{62A2A740-02AA-44BA-B14C-8EA0290C9406}" srcOrd="3" destOrd="0" parTransId="{2365BB5F-A8D3-46C1-93FA-713B69089859}" sibTransId="{7CB4EC55-F000-461B-899B-A761971704EA}"/>
     <dgm:cxn modelId="{EE13D012-A8D8-408D-94AE-361D784F01AB}" srcId="{EB6EB4FA-5A72-403F-BE71-7EDB5249E1DA}" destId="{D47754FE-3154-4F9F-9E2B-4221CEEAA210}" srcOrd="0" destOrd="0" parTransId="{8423D843-01DF-408B-9D5D-D22E6A1060A6}" sibTransId="{123588F0-CE72-4B1F-8B84-5553302DB827}"/>
+    <dgm:cxn modelId="{97E89B1E-08B1-4CD1-A927-F0413B7D74C3}" type="presOf" srcId="{8E9E8EAE-C51B-43BB-AB85-A07B7A42250B}" destId="{6E69A30B-E30E-4A4A-903F-9C45B8148E8A}" srcOrd="1" destOrd="0" presId="urn:microsoft.com/office/officeart/2005/8/layout/process3"/>
+    <dgm:cxn modelId="{B2AEF29E-38A8-4926-9B6F-151498CB7592}" type="presOf" srcId="{80924495-4125-489F-9479-57BC0BD91A44}" destId="{653C4DF2-2C54-4BA2-AA14-C9D0DACFD5B8}" srcOrd="1" destOrd="0" presId="urn:microsoft.com/office/officeart/2005/8/layout/process3"/>
     <dgm:cxn modelId="{70613614-3A16-4471-9057-1D2CCC1A5D40}" type="presOf" srcId="{A7517125-A20F-412D-988A-3F599C50B404}" destId="{ECA19675-F8FF-45FC-ABCA-FD5D8E8A6026}" srcOrd="0" destOrd="0" presId="urn:microsoft.com/office/officeart/2005/8/layout/process3"/>
+    <dgm:cxn modelId="{90267F67-BEC8-4401-AE1F-5B98EE15D3A3}" type="presOf" srcId="{62A2A740-02AA-44BA-B14C-8EA0290C9406}" destId="{B6CF3BF9-9286-4E4B-B82B-657382B6C901}" srcOrd="1" destOrd="0" presId="urn:microsoft.com/office/officeart/2005/8/layout/process3"/>
+    <dgm:cxn modelId="{C12B1FAA-12B9-49BF-BC32-784FA6E2AC79}" srcId="{D47754FE-3154-4F9F-9E2B-4221CEEAA210}" destId="{B72F0616-DF75-40C1-968D-D75C81F010B3}" srcOrd="1" destOrd="0" parTransId="{55E406A9-5BC5-4BE5-9DE7-4FEF29E3C903}" sibTransId="{28021ADB-8108-484A-88CC-0D219F7C67E0}"/>
+    <dgm:cxn modelId="{423BF34D-D4AB-485C-8789-13D82B5EC072}" type="presOf" srcId="{EB6EB4FA-5A72-403F-BE71-7EDB5249E1DA}" destId="{5B67E884-2419-45CE-A7D2-821B89DAFA50}" srcOrd="0" destOrd="0" presId="urn:microsoft.com/office/officeart/2005/8/layout/process3"/>
+    <dgm:cxn modelId="{967B478A-F489-4070-972D-80D00C6D3F3F}" type="presOf" srcId="{62A2A740-02AA-44BA-B14C-8EA0290C9406}" destId="{06BC847A-176B-4C4C-A3DD-A3B57EB9E1F3}" srcOrd="0" destOrd="0" presId="urn:microsoft.com/office/officeart/2005/8/layout/process3"/>
+    <dgm:cxn modelId="{9ECE3AC6-3C76-414B-80A3-32C3C6FE3257}" type="presOf" srcId="{D47754FE-3154-4F9F-9E2B-4221CEEAA210}" destId="{1C18F407-5922-4EDC-B315-460C310DA38A}" srcOrd="0" destOrd="0" presId="urn:microsoft.com/office/officeart/2005/8/layout/process3"/>
+    <dgm:cxn modelId="{9FB01E56-1BE2-4F30-8E13-0B2DF2D6F8FA}" srcId="{62A2A740-02AA-44BA-B14C-8EA0290C9406}" destId="{A7517125-A20F-412D-988A-3F599C50B404}" srcOrd="0" destOrd="0" parTransId="{6DBB3196-B92F-494B-992C-6A2FD90AAAEE}" sibTransId="{EDB8967D-34BA-4CE8-9FCE-FA1ECF6CF08F}"/>
     <dgm:cxn modelId="{CF99661B-A677-475A-B760-60E7DA30078A}" type="presOf" srcId="{54F1FFCF-D2CF-400C-8A54-1CD2AD4B846B}" destId="{D805C2BA-0FFD-4B93-8248-DC0ABFFA4568}" srcOrd="0" destOrd="0" presId="urn:microsoft.com/office/officeart/2005/8/layout/process3"/>
-    <dgm:cxn modelId="{97E89B1E-08B1-4CD1-A927-F0413B7D74C3}" type="presOf" srcId="{8E9E8EAE-C51B-43BB-AB85-A07B7A42250B}" destId="{6E69A30B-E30E-4A4A-903F-9C45B8148E8A}" srcOrd="1" destOrd="0" presId="urn:microsoft.com/office/officeart/2005/8/layout/process3"/>
     <dgm:cxn modelId="{3359F927-6C37-45F4-A05F-D936AF81902F}" type="presOf" srcId="{123588F0-CE72-4B1F-8B84-5553302DB827}" destId="{88E2B1E4-04B5-41FA-A12F-BE67D51B6C5F}" srcOrd="0" destOrd="0" presId="urn:microsoft.com/office/officeart/2005/8/layout/process3"/>
+    <dgm:cxn modelId="{ECEDFA71-0C01-4F73-8950-45DD0B7371AB}" type="presOf" srcId="{D47754FE-3154-4F9F-9E2B-4221CEEAA210}" destId="{5BB44648-10DE-43B4-B115-41EF1A186346}" srcOrd="1" destOrd="0" presId="urn:microsoft.com/office/officeart/2005/8/layout/process3"/>
     <dgm:cxn modelId="{39E8702C-A9CA-4DBB-82BC-3F04047854BD}" type="presOf" srcId="{9535B3D5-2E4E-4479-8B81-68F108B4E1B1}" destId="{D02E87F5-91E0-4C1F-A5B8-0BA8CF87E582}" srcOrd="0" destOrd="2" presId="urn:microsoft.com/office/officeart/2005/8/layout/process3"/>
-    <dgm:cxn modelId="{2099223B-BDBC-48FC-8D08-CD7568636C2D}" type="presOf" srcId="{C96FDFC3-2252-4341-BAA9-6A2E0295E737}" destId="{C6761EF3-66FA-4B14-92BF-D2A06FE81CE9}" srcOrd="0" destOrd="2" presId="urn:microsoft.com/office/officeart/2005/8/layout/process3"/>
-    <dgm:cxn modelId="{C9F4A961-2F1E-4515-B264-21192EB9D9AE}" type="presOf" srcId="{B4DF41A4-27CF-4137-A10B-EE6AFE441123}" destId="{360F57FC-C640-481B-A017-4D2B929CC74E}" srcOrd="0" destOrd="0" presId="urn:microsoft.com/office/officeart/2005/8/layout/process3"/>
-    <dgm:cxn modelId="{90267F67-BEC8-4401-AE1F-5B98EE15D3A3}" type="presOf" srcId="{62A2A740-02AA-44BA-B14C-8EA0290C9406}" destId="{B6CF3BF9-9286-4E4B-B82B-657382B6C901}" srcOrd="1" destOrd="0" presId="urn:microsoft.com/office/officeart/2005/8/layout/process3"/>
-    <dgm:cxn modelId="{423BF34D-D4AB-485C-8789-13D82B5EC072}" type="presOf" srcId="{EB6EB4FA-5A72-403F-BE71-7EDB5249E1DA}" destId="{5B67E884-2419-45CE-A7D2-821B89DAFA50}" srcOrd="0" destOrd="0" presId="urn:microsoft.com/office/officeart/2005/8/layout/process3"/>
-    <dgm:cxn modelId="{ECEDFA71-0C01-4F73-8950-45DD0B7371AB}" type="presOf" srcId="{D47754FE-3154-4F9F-9E2B-4221CEEAA210}" destId="{5BB44648-10DE-43B4-B115-41EF1A186346}" srcOrd="1" destOrd="0" presId="urn:microsoft.com/office/officeart/2005/8/layout/process3"/>
-    <dgm:cxn modelId="{9FB01E56-1BE2-4F30-8E13-0B2DF2D6F8FA}" srcId="{62A2A740-02AA-44BA-B14C-8EA0290C9406}" destId="{A7517125-A20F-412D-988A-3F599C50B404}" srcOrd="0" destOrd="0" parTransId="{6DBB3196-B92F-494B-992C-6A2FD90AAAEE}" sibTransId="{EDB8967D-34BA-4CE8-9FCE-FA1ECF6CF08F}"/>
-    <dgm:cxn modelId="{62DBC681-DCE7-486D-82BC-7D9B3B73566F}" srcId="{8E9E8EAE-C51B-43BB-AB85-A07B7A42250B}" destId="{BEB4FEF3-C155-43D6-AD17-13110221F3BC}" srcOrd="1" destOrd="0" parTransId="{B08D8101-D53F-460A-9074-186CB914EB7D}" sibTransId="{494C5A1F-EF5D-4663-A4FF-CB634D5F81DC}"/>
-    <dgm:cxn modelId="{ED5B0A85-B536-4275-BE58-5C4ECA183844}" srcId="{EB6EB4FA-5A72-403F-BE71-7EDB5249E1DA}" destId="{62A2A740-02AA-44BA-B14C-8EA0290C9406}" srcOrd="3" destOrd="0" parTransId="{2365BB5F-A8D3-46C1-93FA-713B69089859}" sibTransId="{7CB4EC55-F000-461B-899B-A761971704EA}"/>
-    <dgm:cxn modelId="{967B478A-F489-4070-972D-80D00C6D3F3F}" type="presOf" srcId="{62A2A740-02AA-44BA-B14C-8EA0290C9406}" destId="{06BC847A-176B-4C4C-A3DD-A3B57EB9E1F3}" srcOrd="0" destOrd="0" presId="urn:microsoft.com/office/officeart/2005/8/layout/process3"/>
+    <dgm:cxn modelId="{4CCA75A7-1236-4E98-9C3B-5DCCBB4E61CE}" type="presOf" srcId="{0E5B48D1-195C-42AE-8560-A8F090D2D731}" destId="{C6761EF3-66FA-4B14-92BF-D2A06FE81CE9}" srcOrd="0" destOrd="0" presId="urn:microsoft.com/office/officeart/2005/8/layout/process3"/>
     <dgm:cxn modelId="{83F74B90-B7A5-425D-8BB6-F349E2E7BE02}" srcId="{EB6EB4FA-5A72-403F-BE71-7EDB5249E1DA}" destId="{B4DF41A4-27CF-4137-A10B-EE6AFE441123}" srcOrd="2" destOrd="0" parTransId="{04F8B9A1-9F9D-4402-A624-5142FA854A05}" sibTransId="{80924495-4125-489F-9479-57BC0BD91A44}"/>
-    <dgm:cxn modelId="{5C543995-4A95-4834-943E-4355BCBE113F}" type="presOf" srcId="{8E9E8EAE-C51B-43BB-AB85-A07B7A42250B}" destId="{97979297-E9CB-4815-8E97-63384DB01CAD}" srcOrd="0" destOrd="0" presId="urn:microsoft.com/office/officeart/2005/8/layout/process3"/>
-    <dgm:cxn modelId="{4ED9C596-61DF-4EF1-AF18-FE595F019FD8}" type="presOf" srcId="{123588F0-CE72-4B1F-8B84-5553302DB827}" destId="{62DBB75B-493D-4ED1-8514-A72E66E97119}" srcOrd="1" destOrd="0" presId="urn:microsoft.com/office/officeart/2005/8/layout/process3"/>
+    <dgm:cxn modelId="{1A93E9A8-CB80-447C-B874-6015CC21ACAB}" srcId="{8E9E8EAE-C51B-43BB-AB85-A07B7A42250B}" destId="{C96FDFC3-2252-4341-BAA9-6A2E0295E737}" srcOrd="2" destOrd="0" parTransId="{5F3E278E-2307-4799-A275-D36D7908844E}" sibTransId="{575DEABC-D156-4840-89B3-E9B3B98D700E}"/>
+    <dgm:cxn modelId="{3C6047CD-0662-4C53-A08C-23931375F78E}" type="presOf" srcId="{69CA003F-6B59-401F-B758-288631CADEBC}" destId="{D02E87F5-91E0-4C1F-A5B8-0BA8CF87E582}" srcOrd="0" destOrd="0" presId="urn:microsoft.com/office/officeart/2005/8/layout/process3"/>
     <dgm:cxn modelId="{9E5BD89E-3CE9-45FA-B87E-0BBB967FD0E5}" srcId="{EB6EB4FA-5A72-403F-BE71-7EDB5249E1DA}" destId="{8E9E8EAE-C51B-43BB-AB85-A07B7A42250B}" srcOrd="1" destOrd="0" parTransId="{61572377-88BA-41BA-82C3-6ED78DEADAD5}" sibTransId="{CDB6FA27-D583-4260-AA26-84D379DFA717}"/>
-    <dgm:cxn modelId="{B2AEF29E-38A8-4926-9B6F-151498CB7592}" type="presOf" srcId="{80924495-4125-489F-9479-57BC0BD91A44}" destId="{653C4DF2-2C54-4BA2-AA14-C9D0DACFD5B8}" srcOrd="1" destOrd="0" presId="urn:microsoft.com/office/officeart/2005/8/layout/process3"/>
-    <dgm:cxn modelId="{4B65C2A5-0A73-44E2-949F-CA4D71F864BA}" srcId="{D47754FE-3154-4F9F-9E2B-4221CEEAA210}" destId="{9535B3D5-2E4E-4479-8B81-68F108B4E1B1}" srcOrd="2" destOrd="0" parTransId="{D9FF943B-1116-49C8-9996-6FCA1F4D7CB4}" sibTransId="{99F46589-2494-471C-A019-4535CDB980C7}"/>
-    <dgm:cxn modelId="{4CCA75A7-1236-4E98-9C3B-5DCCBB4E61CE}" type="presOf" srcId="{0E5B48D1-195C-42AE-8560-A8F090D2D731}" destId="{C6761EF3-66FA-4B14-92BF-D2A06FE81CE9}" srcOrd="0" destOrd="0" presId="urn:microsoft.com/office/officeart/2005/8/layout/process3"/>
-    <dgm:cxn modelId="{1A93E9A8-CB80-447C-B874-6015CC21ACAB}" srcId="{8E9E8EAE-C51B-43BB-AB85-A07B7A42250B}" destId="{C96FDFC3-2252-4341-BAA9-6A2E0295E737}" srcOrd="2" destOrd="0" parTransId="{5F3E278E-2307-4799-A275-D36D7908844E}" sibTransId="{575DEABC-D156-4840-89B3-E9B3B98D700E}"/>
-    <dgm:cxn modelId="{C12B1FAA-12B9-49BF-BC32-784FA6E2AC79}" srcId="{D47754FE-3154-4F9F-9E2B-4221CEEAA210}" destId="{B72F0616-DF75-40C1-968D-D75C81F010B3}" srcOrd="1" destOrd="0" parTransId="{55E406A9-5BC5-4BE5-9DE7-4FEF29E3C903}" sibTransId="{28021ADB-8108-484A-88CC-0D219F7C67E0}"/>
-    <dgm:cxn modelId="{A4E547AD-E759-4FA2-88BE-937B5AEEF6C9}" type="presOf" srcId="{CDB6FA27-D583-4260-AA26-84D379DFA717}" destId="{ADF8F87A-B442-4640-849F-83C75E8EF929}" srcOrd="0" destOrd="0" presId="urn:microsoft.com/office/officeart/2005/8/layout/process3"/>
-    <dgm:cxn modelId="{7DAD02C2-C926-42E6-87AA-F71FBA89B5F2}" srcId="{B4DF41A4-27CF-4137-A10B-EE6AFE441123}" destId="{54F1FFCF-D2CF-400C-8A54-1CD2AD4B846B}" srcOrd="0" destOrd="0" parTransId="{331E3A34-7AE9-49EF-91CD-2221AD729316}" sibTransId="{A7040E73-FA28-425C-90CA-890311AEB3D7}"/>
+    <dgm:cxn modelId="{575B5AFC-8FD9-4718-8AAC-719D93888372}" type="presOf" srcId="{B4DF41A4-27CF-4137-A10B-EE6AFE441123}" destId="{3CF5C418-0088-45CB-8BB7-5481218A1D3C}" srcOrd="1" destOrd="0" presId="urn:microsoft.com/office/officeart/2005/8/layout/process3"/>
     <dgm:cxn modelId="{3C04B9C4-947C-46EF-809E-AABCD6AA7DF4}" type="presOf" srcId="{B72F0616-DF75-40C1-968D-D75C81F010B3}" destId="{D02E87F5-91E0-4C1F-A5B8-0BA8CF87E582}" srcOrd="0" destOrd="1" presId="urn:microsoft.com/office/officeart/2005/8/layout/process3"/>
-    <dgm:cxn modelId="{9ECE3AC6-3C76-414B-80A3-32C3C6FE3257}" type="presOf" srcId="{D47754FE-3154-4F9F-9E2B-4221CEEAA210}" destId="{1C18F407-5922-4EDC-B315-460C310DA38A}" srcOrd="0" destOrd="0" presId="urn:microsoft.com/office/officeart/2005/8/layout/process3"/>
-    <dgm:cxn modelId="{3C6047CD-0662-4C53-A08C-23931375F78E}" type="presOf" srcId="{69CA003F-6B59-401F-B758-288631CADEBC}" destId="{D02E87F5-91E0-4C1F-A5B8-0BA8CF87E582}" srcOrd="0" destOrd="0" presId="urn:microsoft.com/office/officeart/2005/8/layout/process3"/>
-    <dgm:cxn modelId="{646528CE-6E2C-4CD4-80A4-1003AA9B1C4B}" type="presOf" srcId="{CDB6FA27-D583-4260-AA26-84D379DFA717}" destId="{9AF69F07-8AE2-40C2-A400-56FDAB4ACE6A}" srcOrd="1" destOrd="0" presId="urn:microsoft.com/office/officeart/2005/8/layout/process3"/>
-    <dgm:cxn modelId="{EF8851D3-B525-461F-B803-4A7933630737}" srcId="{8E9E8EAE-C51B-43BB-AB85-A07B7A42250B}" destId="{0E5B48D1-195C-42AE-8560-A8F090D2D731}" srcOrd="0" destOrd="0" parTransId="{E9925DEE-1E5A-438D-BEB9-E7A707E6E533}" sibTransId="{BCD9CC88-A22A-4BE4-B805-373A32706650}"/>
-    <dgm:cxn modelId="{1494C5E8-F79A-4FA1-BABF-50F926DB07A2}" type="presOf" srcId="{BEB4FEF3-C155-43D6-AD17-13110221F3BC}" destId="{C6761EF3-66FA-4B14-92BF-D2A06FE81CE9}" srcOrd="0" destOrd="1" presId="urn:microsoft.com/office/officeart/2005/8/layout/process3"/>
-    <dgm:cxn modelId="{7854B4FB-3D9C-4033-8FD3-C1D72FFA2E2B}" type="presOf" srcId="{80924495-4125-489F-9479-57BC0BD91A44}" destId="{5CC8F97A-34DC-4ABC-8F5F-5E69D5A87645}" srcOrd="0" destOrd="0" presId="urn:microsoft.com/office/officeart/2005/8/layout/process3"/>
-    <dgm:cxn modelId="{575B5AFC-8FD9-4718-8AAC-719D93888372}" type="presOf" srcId="{B4DF41A4-27CF-4137-A10B-EE6AFE441123}" destId="{3CF5C418-0088-45CB-8BB7-5481218A1D3C}" srcOrd="1" destOrd="0" presId="urn:microsoft.com/office/officeart/2005/8/layout/process3"/>
     <dgm:cxn modelId="{909EF691-DB80-4A40-8E29-6FF17A41E87E}" type="presParOf" srcId="{5B67E884-2419-45CE-A7D2-821B89DAFA50}" destId="{02BE49C7-665B-4C3D-A106-CA427F48BCAF}" srcOrd="0" destOrd="0" presId="urn:microsoft.com/office/officeart/2005/8/layout/process3"/>
     <dgm:cxn modelId="{C8B108CA-DB1F-4E45-9DFE-4FE195D6E499}" type="presParOf" srcId="{02BE49C7-665B-4C3D-A106-CA427F48BCAF}" destId="{1C18F407-5922-4EDC-B315-460C310DA38A}" srcOrd="0" destOrd="0" presId="urn:microsoft.com/office/officeart/2005/8/layout/process3"/>
     <dgm:cxn modelId="{093EC1D5-057C-4CEC-846C-7BEA7BAC285A}" type="presParOf" srcId="{02BE49C7-665B-4C3D-A106-CA427F48BCAF}" destId="{5BB44648-10DE-43B4-B115-41EF1A186346}" srcOrd="1" destOrd="0" presId="urn:microsoft.com/office/officeart/2005/8/layout/process3"/>
@@ -1783,7 +1916,7 @@
         </a:bodyPr>
         <a:lstStyle/>
         <a:p>
-          <a:pPr marL="0" lvl="0" indent="0" algn="l" defTabSz="533400">
+          <a:pPr lvl="0" algn="l" defTabSz="533400">
             <a:lnSpc>
               <a:spcPct val="90000"/>
             </a:lnSpc>
@@ -1793,7 +1926,6 @@
             <a:spcAft>
               <a:spcPct val="35000"/>
             </a:spcAft>
-            <a:buNone/>
           </a:pPr>
           <a:r>
             <a:rPr lang="es-ES" sz="1200" b="1" kern="1200" dirty="0">
@@ -1804,7 +1936,7 @@
           </a:r>
         </a:p>
         <a:p>
-          <a:pPr marL="0" lvl="0" indent="0" algn="l" defTabSz="533400">
+          <a:pPr lvl="0" algn="l" defTabSz="533400">
             <a:lnSpc>
               <a:spcPct val="90000"/>
             </a:lnSpc>
@@ -1814,7 +1946,6 @@
             <a:spcAft>
               <a:spcPct val="35000"/>
             </a:spcAft>
-            <a:buNone/>
           </a:pPr>
           <a:r>
             <a:rPr lang="es-ES" sz="1200" b="1" kern="1200" dirty="0">
@@ -1896,7 +2027,7 @@
             <a:spcAft>
               <a:spcPct val="15000"/>
             </a:spcAft>
-            <a:buChar char="•"/>
+            <a:buChar char="••"/>
           </a:pPr>
           <a:r>
             <a:rPr lang="es-CO" sz="1200" b="1" kern="1200" dirty="0">
@@ -1921,7 +2052,7 @@
             <a:spcAft>
               <a:spcPct val="15000"/>
             </a:spcAft>
-            <a:buChar char="•"/>
+            <a:buChar char="••"/>
           </a:pPr>
           <a:r>
             <a:rPr lang="es-CO" sz="1200" b="1" kern="1200" dirty="0">
@@ -1942,7 +2073,7 @@
             <a:spcAft>
               <a:spcPct val="15000"/>
             </a:spcAft>
-            <a:buChar char="•"/>
+            <a:buChar char="••"/>
           </a:pPr>
           <a:r>
             <a:rPr lang="es-CO" sz="1200" b="1" kern="1200" dirty="0">
@@ -2008,7 +2139,7 @@
         </a:bodyPr>
         <a:lstStyle/>
         <a:p>
-          <a:pPr marL="0" lvl="0" indent="0" algn="ctr" defTabSz="533400">
+          <a:pPr lvl="0" algn="ctr" defTabSz="533400">
             <a:lnSpc>
               <a:spcPct val="90000"/>
             </a:lnSpc>
@@ -2018,7 +2149,6 @@
             <a:spcAft>
               <a:spcPct val="35000"/>
             </a:spcAft>
-            <a:buNone/>
           </a:pPr>
           <a:endParaRPr lang="es-ES" sz="1200" kern="1200">
             <a:latin typeface="Arial" panose="020B0604020202020204" pitchFamily="34" charset="0"/>
@@ -2088,7 +2218,7 @@
         </a:bodyPr>
         <a:lstStyle/>
         <a:p>
-          <a:pPr marL="0" lvl="0" indent="0" algn="l" defTabSz="533400">
+          <a:pPr lvl="0" algn="l" defTabSz="533400">
             <a:lnSpc>
               <a:spcPct val="90000"/>
             </a:lnSpc>
@@ -2098,7 +2228,6 @@
             <a:spcAft>
               <a:spcPct val="35000"/>
             </a:spcAft>
-            <a:buNone/>
           </a:pPr>
           <a:r>
             <a:rPr lang="es-ES" sz="1200" b="1" kern="1200" dirty="0">
@@ -2109,7 +2238,7 @@
           </a:r>
         </a:p>
         <a:p>
-          <a:pPr marL="0" lvl="0" indent="0" algn="l" defTabSz="533400">
+          <a:pPr lvl="0" algn="l" defTabSz="533400">
             <a:lnSpc>
               <a:spcPct val="90000"/>
             </a:lnSpc>
@@ -2119,7 +2248,6 @@
             <a:spcAft>
               <a:spcPct val="35000"/>
             </a:spcAft>
-            <a:buNone/>
           </a:pPr>
           <a:r>
             <a:rPr lang="es-ES" sz="1200" b="1" kern="1200" dirty="0">
@@ -2201,7 +2329,7 @@
             <a:spcAft>
               <a:spcPct val="15000"/>
             </a:spcAft>
-            <a:buChar char="•"/>
+            <a:buChar char="••"/>
           </a:pPr>
           <a:r>
             <a:rPr lang="es-CO" sz="1200" b="1" kern="1200" dirty="0">
@@ -2226,7 +2354,7 @@
             <a:spcAft>
               <a:spcPct val="15000"/>
             </a:spcAft>
-            <a:buChar char="•"/>
+            <a:buChar char="••"/>
           </a:pPr>
           <a:r>
             <a:rPr lang="es-CO" sz="1200" b="1" kern="1200" dirty="0">
@@ -2247,7 +2375,7 @@
             <a:spcAft>
               <a:spcPct val="15000"/>
             </a:spcAft>
-            <a:buChar char="•"/>
+            <a:buChar char="••"/>
           </a:pPr>
           <a:r>
             <a:rPr lang="es-CO" sz="1200" b="1" kern="1200" dirty="0">
@@ -2313,7 +2441,7 @@
         </a:bodyPr>
         <a:lstStyle/>
         <a:p>
-          <a:pPr marL="0" lvl="0" indent="0" algn="ctr" defTabSz="533400">
+          <a:pPr lvl="0" algn="ctr" defTabSz="533400">
             <a:lnSpc>
               <a:spcPct val="90000"/>
             </a:lnSpc>
@@ -2323,7 +2451,6 @@
             <a:spcAft>
               <a:spcPct val="35000"/>
             </a:spcAft>
-            <a:buNone/>
           </a:pPr>
           <a:endParaRPr lang="es-ES" sz="1200" kern="1200">
             <a:latin typeface="Arial" panose="020B0604020202020204" pitchFamily="34" charset="0"/>
@@ -2393,7 +2520,7 @@
         </a:bodyPr>
         <a:lstStyle/>
         <a:p>
-          <a:pPr marL="0" lvl="0" indent="0" algn="l" defTabSz="533400">
+          <a:pPr lvl="0" algn="l" defTabSz="533400">
             <a:lnSpc>
               <a:spcPct val="90000"/>
             </a:lnSpc>
@@ -2403,7 +2530,6 @@
             <a:spcAft>
               <a:spcPct val="35000"/>
             </a:spcAft>
-            <a:buNone/>
           </a:pPr>
           <a:r>
             <a:rPr lang="es-ES" sz="1200" b="1" kern="1200" dirty="0">
@@ -2414,7 +2540,7 @@
           </a:r>
         </a:p>
         <a:p>
-          <a:pPr marL="0" lvl="0" indent="0" algn="l" defTabSz="533400">
+          <a:pPr lvl="0" algn="l" defTabSz="533400">
             <a:lnSpc>
               <a:spcPct val="90000"/>
             </a:lnSpc>
@@ -2424,7 +2550,6 @@
             <a:spcAft>
               <a:spcPct val="35000"/>
             </a:spcAft>
-            <a:buNone/>
           </a:pPr>
           <a:r>
             <a:rPr lang="es-ES" sz="1200" b="1" kern="1200" dirty="0">
@@ -2506,7 +2631,7 @@
             <a:spcAft>
               <a:spcPct val="15000"/>
             </a:spcAft>
-            <a:buChar char="•"/>
+            <a:buChar char="••"/>
           </a:pPr>
           <a:r>
             <a:rPr lang="es-CO" sz="1200" b="1" kern="1200" dirty="0">
@@ -2576,7 +2701,7 @@
         </a:bodyPr>
         <a:lstStyle/>
         <a:p>
-          <a:pPr marL="0" lvl="0" indent="0" algn="ctr" defTabSz="533400">
+          <a:pPr lvl="0" algn="ctr" defTabSz="533400">
             <a:lnSpc>
               <a:spcPct val="90000"/>
             </a:lnSpc>
@@ -2586,7 +2711,6 @@
             <a:spcAft>
               <a:spcPct val="35000"/>
             </a:spcAft>
-            <a:buNone/>
           </a:pPr>
           <a:endParaRPr lang="es-ES" sz="1200" kern="1200">
             <a:latin typeface="Arial" panose="020B0604020202020204" pitchFamily="34" charset="0"/>
@@ -2656,7 +2780,7 @@
         </a:bodyPr>
         <a:lstStyle/>
         <a:p>
-          <a:pPr marL="0" lvl="0" indent="0" algn="l" defTabSz="533400">
+          <a:pPr lvl="0" algn="l" defTabSz="533400">
             <a:lnSpc>
               <a:spcPct val="90000"/>
             </a:lnSpc>
@@ -2666,7 +2790,6 @@
             <a:spcAft>
               <a:spcPct val="35000"/>
             </a:spcAft>
-            <a:buNone/>
           </a:pPr>
           <a:r>
             <a:rPr lang="es-ES" sz="1200" b="1" kern="1200" dirty="0">
@@ -2677,7 +2800,7 @@
           </a:r>
         </a:p>
         <a:p>
-          <a:pPr marL="0" lvl="0" indent="0" algn="l" defTabSz="533400">
+          <a:pPr lvl="0" algn="l" defTabSz="533400">
             <a:lnSpc>
               <a:spcPct val="90000"/>
             </a:lnSpc>
@@ -2687,7 +2810,6 @@
             <a:spcAft>
               <a:spcPct val="35000"/>
             </a:spcAft>
-            <a:buNone/>
           </a:pPr>
           <a:r>
             <a:rPr lang="es-ES" sz="1200" b="1" kern="1200" dirty="0">
@@ -2769,7 +2891,7 @@
             <a:spcAft>
               <a:spcPct val="15000"/>
             </a:spcAft>
-            <a:buChar char="•"/>
+            <a:buChar char="••"/>
           </a:pPr>
           <a:r>
             <a:rPr lang="es-CO" sz="1200" b="1" kern="1200" dirty="0">
@@ -13992,6 +14114,16 @@
               </a:rPr>
               <a:t>Desarrollo de un marco de trabajo siguiendo el estándar ISO/IEC 29110 para el caso de estudio de integración de procesos del proyecto Sanambiente S.A.S de Cali</a:t>
             </a:r>
+            <a:r>
+              <a:rPr lang="es-CO" sz="2500" dirty="0">
+                <a:solidFill>
+                  <a:schemeClr val="bg1"/>
+                </a:solidFill>
+                <a:latin typeface="Arial" panose="020B0604020202020204" pitchFamily="34" charset="0"/>
+                <a:cs typeface="Arial" panose="020B0604020202020204" pitchFamily="34" charset="0"/>
+              </a:rPr>
+              <a:t/>
+            </a:r>
             <a:br>
               <a:rPr lang="es-CO" sz="2500" dirty="0">
                 <a:solidFill>
@@ -14001,6 +14133,16 @@
                 <a:cs typeface="Arial" panose="020B0604020202020204" pitchFamily="34" charset="0"/>
               </a:rPr>
             </a:br>
+            <a:r>
+              <a:rPr lang="es-ES" sz="2500" b="1" dirty="0">
+                <a:solidFill>
+                  <a:schemeClr val="bg1"/>
+                </a:solidFill>
+                <a:latin typeface="Arial" panose="020B0604020202020204" pitchFamily="34" charset="0"/>
+                <a:cs typeface="Arial" panose="020B0604020202020204" pitchFamily="34" charset="0"/>
+              </a:rPr>
+              <a:t/>
+            </a:r>
             <a:br>
               <a:rPr lang="es-ES" sz="2500" b="1" dirty="0">
                 <a:solidFill>
@@ -14020,6 +14162,16 @@
               </a:rPr>
               <a:t>Integrantes:</a:t>
             </a:r>
+            <a:r>
+              <a:rPr lang="es-ES" sz="2500" dirty="0">
+                <a:solidFill>
+                  <a:schemeClr val="bg1"/>
+                </a:solidFill>
+                <a:latin typeface="Arial" panose="020B0604020202020204" pitchFamily="34" charset="0"/>
+                <a:cs typeface="Arial" panose="020B0604020202020204" pitchFamily="34" charset="0"/>
+              </a:rPr>
+              <a:t/>
+            </a:r>
             <a:br>
               <a:rPr lang="es-ES" sz="2500" dirty="0">
                 <a:solidFill>
@@ -14067,6 +14219,16 @@
                 <a:cs typeface="Arial" panose="020B0604020202020204" pitchFamily="34" charset="0"/>
               </a:rPr>
             </a:br>
+            <a:r>
+              <a:rPr lang="es-ES" sz="2500" dirty="0">
+                <a:solidFill>
+                  <a:schemeClr val="bg1"/>
+                </a:solidFill>
+                <a:latin typeface="Arial" panose="020B0604020202020204" pitchFamily="34" charset="0"/>
+                <a:cs typeface="Arial" panose="020B0604020202020204" pitchFamily="34" charset="0"/>
+              </a:rPr>
+              <a:t/>
+            </a:r>
             <a:br>
               <a:rPr lang="es-ES" sz="2500" dirty="0">
                 <a:solidFill>
@@ -14076,6 +14238,16 @@
                 <a:cs typeface="Arial" panose="020B0604020202020204" pitchFamily="34" charset="0"/>
               </a:rPr>
             </a:br>
+            <a:r>
+              <a:rPr lang="es-ES" sz="2500" dirty="0">
+                <a:solidFill>
+                  <a:schemeClr val="bg1"/>
+                </a:solidFill>
+                <a:latin typeface="Arial" panose="020B0604020202020204" pitchFamily="34" charset="0"/>
+                <a:cs typeface="Arial" panose="020B0604020202020204" pitchFamily="34" charset="0"/>
+              </a:rPr>
+              <a:t/>
+            </a:r>
             <a:br>
               <a:rPr lang="es-ES" sz="2500" dirty="0">
                 <a:solidFill>
@@ -14124,6 +14296,16 @@
               </a:rPr>
               <a:t>Beatriz E. Marín</a:t>
             </a:r>
+            <a:r>
+              <a:rPr lang="es-CO" sz="2500" b="1" dirty="0">
+                <a:solidFill>
+                  <a:schemeClr val="bg1"/>
+                </a:solidFill>
+                <a:latin typeface="Arial" panose="020B0604020202020204" pitchFamily="34" charset="0"/>
+                <a:cs typeface="Arial" panose="020B0604020202020204" pitchFamily="34" charset="0"/>
+              </a:rPr>
+              <a:t/>
+            </a:r>
             <a:br>
               <a:rPr lang="es-CO" sz="2500" b="1" dirty="0">
                 <a:solidFill>
@@ -14133,6 +14315,16 @@
                 <a:cs typeface="Arial" panose="020B0604020202020204" pitchFamily="34" charset="0"/>
               </a:rPr>
             </a:br>
+            <a:r>
+              <a:rPr lang="es-ES" sz="2500" dirty="0">
+                <a:solidFill>
+                  <a:schemeClr val="bg1"/>
+                </a:solidFill>
+                <a:latin typeface="Arial" panose="020B0604020202020204" pitchFamily="34" charset="0"/>
+                <a:cs typeface="Arial" panose="020B0604020202020204" pitchFamily="34" charset="0"/>
+              </a:rPr>
+              <a:t/>
+            </a:r>
             <a:br>
               <a:rPr lang="es-ES" sz="2500" dirty="0">
                 <a:solidFill>
@@ -15744,7 +15936,15 @@
                 <a:cs typeface="Arial" panose="020B0604020202020204" pitchFamily="34" charset="0"/>
                 <a:hlinkClick r:id="rId3" action="ppaction://hlinksldjump"/>
               </a:rPr>
-              <a:t>1. Introducción</a:t>
+              <a:t>1. </a:t>
+            </a:r>
+            <a:r>
+              <a:rPr lang="es-CO" sz="1800" dirty="0" smtClean="0">
+                <a:latin typeface="Arial" panose="020B0604020202020204" pitchFamily="34" charset="0"/>
+                <a:cs typeface="Arial" panose="020B0604020202020204" pitchFamily="34" charset="0"/>
+                <a:hlinkClick r:id="rId3" action="ppaction://hlinksldjump"/>
+              </a:rPr>
+              <a:t>Introducción </a:t>
             </a:r>
             <a:endParaRPr lang="es-CO" sz="1800" dirty="0">
               <a:latin typeface="Arial" panose="020B0604020202020204" pitchFamily="34" charset="0"/>
@@ -15778,9 +15978,17 @@
                 <a:cs typeface="Arial" panose="020B0604020202020204" pitchFamily="34" charset="0"/>
                 <a:hlinkClick r:id="rId5" action="ppaction://hlinksldjump"/>
               </a:rPr>
-              <a:t>3. Formulación del problema</a:t>
-            </a:r>
-            <a:endParaRPr lang="es-CO" sz="1800" dirty="0">
+              <a:t>3. Formulación del </a:t>
+            </a:r>
+            <a:r>
+              <a:rPr lang="es-CO" sz="1800" dirty="0" smtClean="0">
+                <a:latin typeface="Arial" panose="020B0604020202020204" pitchFamily="34" charset="0"/>
+                <a:cs typeface="Arial" panose="020B0604020202020204" pitchFamily="34" charset="0"/>
+                <a:hlinkClick r:id="rId5" action="ppaction://hlinksldjump"/>
+              </a:rPr>
+              <a:t>problema</a:t>
+            </a:r>
+            <a:endParaRPr lang="es-CO" sz="1800" dirty="0" smtClean="0">
               <a:latin typeface="Arial" panose="020B0604020202020204" pitchFamily="34" charset="0"/>
               <a:cs typeface="Arial" panose="020B0604020202020204" pitchFamily="34" charset="0"/>
             </a:endParaRPr>
@@ -15795,9 +16003,17 @@
                 <a:cs typeface="Arial" panose="020B0604020202020204" pitchFamily="34" charset="0"/>
                 <a:hlinkClick r:id="rId6" action="ppaction://hlinksldjump"/>
               </a:rPr>
-              <a:t>4. Marco teórico</a:t>
-            </a:r>
-            <a:endParaRPr lang="es-CO" sz="1800" dirty="0">
+              <a:t>4</a:t>
+            </a:r>
+            <a:r>
+              <a:rPr lang="es-CO" sz="1800" dirty="0" smtClean="0">
+                <a:latin typeface="Arial" panose="020B0604020202020204" pitchFamily="34" charset="0"/>
+                <a:cs typeface="Arial" panose="020B0604020202020204" pitchFamily="34" charset="0"/>
+                <a:hlinkClick r:id="rId6" action="ppaction://hlinksldjump"/>
+              </a:rPr>
+              <a:t>. Sistematización del problema</a:t>
+            </a:r>
+            <a:endParaRPr lang="es-CO" sz="1800" dirty="0" smtClean="0">
               <a:latin typeface="Arial" panose="020B0604020202020204" pitchFamily="34" charset="0"/>
               <a:cs typeface="Arial" panose="020B0604020202020204" pitchFamily="34" charset="0"/>
             </a:endParaRPr>
@@ -15807,14 +16023,14 @@
               <a:buNone/>
             </a:pPr>
             <a:r>
-              <a:rPr lang="es-CO" sz="1800" dirty="0">
+              <a:rPr lang="es-CO" sz="1800" dirty="0" smtClean="0">
                 <a:latin typeface="Arial" panose="020B0604020202020204" pitchFamily="34" charset="0"/>
                 <a:cs typeface="Arial" panose="020B0604020202020204" pitchFamily="34" charset="0"/>
                 <a:hlinkClick r:id="rId7" action="ppaction://hlinksldjump"/>
               </a:rPr>
-              <a:t>5. Desarrollo</a:t>
-            </a:r>
-            <a:endParaRPr lang="es-CO" sz="1800" dirty="0">
+              <a:t>5. Objetivo general</a:t>
+            </a:r>
+            <a:endParaRPr lang="es-CO" sz="1800" dirty="0" smtClean="0">
               <a:latin typeface="Arial" panose="020B0604020202020204" pitchFamily="34" charset="0"/>
               <a:cs typeface="Arial" panose="020B0604020202020204" pitchFamily="34" charset="0"/>
             </a:endParaRPr>
@@ -15824,31 +16040,22 @@
               <a:buNone/>
             </a:pPr>
             <a:r>
-              <a:rPr lang="es-CO" sz="1800" dirty="0">
-                <a:latin typeface="Arial" panose="020B0604020202020204" pitchFamily="34" charset="0"/>
-                <a:cs typeface="Arial" panose="020B0604020202020204" pitchFamily="34" charset="0"/>
-                <a:hlinkClick r:id="rId6" action="ppaction://hlinksldjump"/>
-              </a:rPr>
-              <a:t>6. Resultados</a:t>
-            </a:r>
-            <a:endParaRPr lang="es-CO" sz="1800" dirty="0">
-              <a:latin typeface="Arial" panose="020B0604020202020204" pitchFamily="34" charset="0"/>
-              <a:cs typeface="Arial" panose="020B0604020202020204" pitchFamily="34" charset="0"/>
-            </a:endParaRPr>
-          </a:p>
-          <a:p>
-            <a:pPr marL="0" indent="0">
-              <a:buNone/>
-            </a:pPr>
-            <a:r>
-              <a:rPr lang="es-CO" sz="1800" dirty="0">
+              <a:rPr lang="es-CO" sz="1800" dirty="0" smtClean="0">
                 <a:latin typeface="Arial" panose="020B0604020202020204" pitchFamily="34" charset="0"/>
                 <a:cs typeface="Arial" panose="020B0604020202020204" pitchFamily="34" charset="0"/>
                 <a:hlinkClick r:id="rId8" action="ppaction://hlinksldjump"/>
               </a:rPr>
-              <a:t>7. Conclusiones</a:t>
-            </a:r>
-            <a:endParaRPr lang="es-CO" sz="1800" dirty="0">
+              <a:t>6. </a:t>
+            </a:r>
+            <a:r>
+              <a:rPr lang="es-CO" sz="1800" smtClean="0">
+                <a:latin typeface="Arial" panose="020B0604020202020204" pitchFamily="34" charset="0"/>
+                <a:cs typeface="Arial" panose="020B0604020202020204" pitchFamily="34" charset="0"/>
+                <a:hlinkClick r:id="rId8" action="ppaction://hlinksldjump"/>
+              </a:rPr>
+              <a:t>Objetivos específicos</a:t>
+            </a:r>
+            <a:endParaRPr lang="es-CO" sz="1800" dirty="0" smtClean="0">
               <a:latin typeface="Arial" panose="020B0604020202020204" pitchFamily="34" charset="0"/>
               <a:cs typeface="Arial" panose="020B0604020202020204" pitchFamily="34" charset="0"/>
             </a:endParaRPr>
@@ -15857,13 +16064,96 @@
             <a:pPr marL="0" indent="0">
               <a:buNone/>
             </a:pPr>
+            <a:r>
+              <a:rPr lang="es-CO" sz="1800" dirty="0" smtClean="0">
+                <a:latin typeface="Arial" panose="020B0604020202020204" pitchFamily="34" charset="0"/>
+                <a:cs typeface="Arial" panose="020B0604020202020204" pitchFamily="34" charset="0"/>
+                <a:hlinkClick r:id="rId9" action="ppaction://hlinksldjump"/>
+              </a:rPr>
+              <a:t>7. </a:t>
+            </a:r>
             <a:r>
               <a:rPr lang="es-CO" sz="1800" dirty="0">
                 <a:latin typeface="Arial" panose="020B0604020202020204" pitchFamily="34" charset="0"/>
                 <a:cs typeface="Arial" panose="020B0604020202020204" pitchFamily="34" charset="0"/>
                 <a:hlinkClick r:id="rId9" action="ppaction://hlinksldjump"/>
               </a:rPr>
-              <a:t>8. Bibliografía</a:t>
+              <a:t>Marco teórico</a:t>
+            </a:r>
+            <a:endParaRPr lang="es-CO" sz="1800" dirty="0">
+              <a:latin typeface="Arial" panose="020B0604020202020204" pitchFamily="34" charset="0"/>
+              <a:cs typeface="Arial" panose="020B0604020202020204" pitchFamily="34" charset="0"/>
+            </a:endParaRPr>
+          </a:p>
+          <a:p>
+            <a:pPr marL="0" indent="0">
+              <a:buNone/>
+            </a:pPr>
+            <a:r>
+              <a:rPr lang="es-CO" sz="1800" dirty="0" smtClean="0">
+                <a:latin typeface="Arial" panose="020B0604020202020204" pitchFamily="34" charset="0"/>
+                <a:cs typeface="Arial" panose="020B0604020202020204" pitchFamily="34" charset="0"/>
+                <a:hlinkClick r:id="rId10" action="ppaction://hlinksldjump"/>
+              </a:rPr>
+              <a:t>8. </a:t>
+            </a:r>
+            <a:r>
+              <a:rPr lang="es-CO" sz="1800" dirty="0">
+                <a:latin typeface="Arial" panose="020B0604020202020204" pitchFamily="34" charset="0"/>
+                <a:cs typeface="Arial" panose="020B0604020202020204" pitchFamily="34" charset="0"/>
+                <a:hlinkClick r:id="rId10" action="ppaction://hlinksldjump"/>
+              </a:rPr>
+              <a:t>Desarrollo</a:t>
+            </a:r>
+            <a:endParaRPr lang="es-CO" sz="1800" dirty="0">
+              <a:latin typeface="Arial" panose="020B0604020202020204" pitchFamily="34" charset="0"/>
+              <a:cs typeface="Arial" panose="020B0604020202020204" pitchFamily="34" charset="0"/>
+            </a:endParaRPr>
+          </a:p>
+          <a:p>
+            <a:pPr marL="0" indent="0">
+              <a:buNone/>
+            </a:pPr>
+            <a:r>
+              <a:rPr lang="es-CO" sz="1800" dirty="0" smtClean="0">
+                <a:latin typeface="Arial" panose="020B0604020202020204" pitchFamily="34" charset="0"/>
+                <a:cs typeface="Arial" panose="020B0604020202020204" pitchFamily="34" charset="0"/>
+                <a:hlinkClick r:id="rId11" action="ppaction://hlinksldjump"/>
+              </a:rPr>
+              <a:t>9. </a:t>
+            </a:r>
+            <a:r>
+              <a:rPr lang="es-CO" sz="1800" dirty="0">
+                <a:latin typeface="Arial" panose="020B0604020202020204" pitchFamily="34" charset="0"/>
+                <a:cs typeface="Arial" panose="020B0604020202020204" pitchFamily="34" charset="0"/>
+                <a:hlinkClick r:id="rId11" action="ppaction://hlinksldjump"/>
+              </a:rPr>
+              <a:t>Conclusiones</a:t>
+            </a:r>
+            <a:endParaRPr lang="es-CO" sz="1800" dirty="0">
+              <a:latin typeface="Arial" panose="020B0604020202020204" pitchFamily="34" charset="0"/>
+              <a:cs typeface="Arial" panose="020B0604020202020204" pitchFamily="34" charset="0"/>
+            </a:endParaRPr>
+          </a:p>
+          <a:p>
+            <a:pPr marL="0" indent="0">
+              <a:buNone/>
+            </a:pPr>
+            <a:r>
+              <a:rPr lang="es-CO" sz="1800" dirty="0" smtClean="0">
+                <a:latin typeface="Arial" panose="020B0604020202020204" pitchFamily="34" charset="0"/>
+                <a:cs typeface="Arial" panose="020B0604020202020204" pitchFamily="34" charset="0"/>
+                <a:hlinkClick r:id="rId12" action="ppaction://hlinksldjump"/>
+              </a:rPr>
+              <a:t>10. </a:t>
+            </a:r>
+            <a:r>
+              <a:rPr lang="es-CO" sz="1800" dirty="0">
+                <a:latin typeface="Arial" panose="020B0604020202020204" pitchFamily="34" charset="0"/>
+                <a:cs typeface="Arial" panose="020B0604020202020204" pitchFamily="34" charset="0"/>
+                <a:hlinkClick r:id="rId12" action="ppaction://hlinksldjump"/>
+              </a:rPr>
+              <a:t>Bibliografía</a:t>
             </a:r>
             <a:endParaRPr lang="es-CO" sz="1800" dirty="0">
               <a:latin typeface="Arial" panose="020B0604020202020204" pitchFamily="34" charset="0"/>

</xml_diff>

<commit_message>
Cambios en dos documentos
REPASAR MAÑANA
</commit_message>
<xml_diff>
--- a/Documento(s) de proyecto de grado/Presentación del proyecto de grado.pptx
+++ b/Documento(s) de proyecto de grado/Presentación del proyecto de grado.pptx
@@ -11057,7 +11057,7 @@
                 <a:latin typeface="Arial" panose="020B0604020202020204" pitchFamily="34" charset="0"/>
                 <a:cs typeface="Arial" panose="020B0604020202020204" pitchFamily="34" charset="0"/>
               </a:rPr>
-              <a:t>Identificar los procesos y medidas propuestas por la ISO/IEC 29110 que se adecúen a las características del gestor de datos ambientales de la empresa Sanambiente S.AS.</a:t>
+              <a:t>Identificar los procesos y medidas propuestas por la ISO/IEC 29110 que se adecúen a las características del gestor de datos ambientales de la empresa Sanambiente S.A.S.</a:t>
             </a:r>
           </a:p>
           <a:p>
@@ -12739,16 +12739,69 @@
           </a:p>
         </p:txBody>
       </p:sp>
-      <p:pic>
-        <p:nvPicPr>
-          <p:cNvPr id="5" name="Imagen 4">
+      <p:sp>
+        <p:nvSpPr>
+          <p:cNvPr id="7" name="CuadroTexto 6">
             <a:extLst>
               <a:ext uri="{FF2B5EF4-FFF2-40B4-BE49-F238E27FC236}">
-                <a16:creationId xmlns:a16="http://schemas.microsoft.com/office/drawing/2014/main" id="{3D23E89A-038B-4C23-8E76-5EB2D6D93165}"/>
+                <a16:creationId xmlns:a16="http://schemas.microsoft.com/office/drawing/2014/main" id="{1A7C1F12-4EF5-4B37-BC5B-544EA503C799}"/>
               </a:ext>
             </a:extLst>
           </p:cNvPr>
-          <p:cNvPicPr/>
+          <p:cNvSpPr txBox="1"/>
+          <p:nvPr/>
+        </p:nvSpPr>
+        <p:spPr>
+          <a:xfrm>
+            <a:off x="124287" y="6582484"/>
+            <a:ext cx="8457765" cy="400110"/>
+          </a:xfrm>
+          <a:prstGeom prst="rect">
+            <a:avLst/>
+          </a:prstGeom>
+          <a:noFill/>
+        </p:spPr>
+        <p:txBody>
+          <a:bodyPr wrap="square" rtlCol="0">
+            <a:spAutoFit/>
+          </a:bodyPr>
+          <a:lstStyle/>
+          <a:p>
+            <a:r>
+              <a:rPr lang="en-US" sz="1000" i="1" dirty="0"/>
+              <a:t>Nota: </a:t>
+            </a:r>
+            <a:r>
+              <a:rPr lang="en-US" sz="1000" dirty="0"/>
+              <a:t>ISO/IEC. (2011). </a:t>
+            </a:r>
+            <a:r>
+              <a:rPr lang="en-US" sz="1000" i="1" dirty="0"/>
+              <a:t>Software engineering - Lifecycle profiles for Very Small Entities (VSEs) Part 5-1-2: Management and engineering guide: Generic profile group: Basic profile</a:t>
+            </a:r>
+            <a:r>
+              <a:rPr lang="en-US" sz="1000" dirty="0"/>
+              <a:t>.</a:t>
+            </a:r>
+            <a:endParaRPr lang="es-CO" sz="1000" dirty="0"/>
+          </a:p>
+          <a:p>
+            <a:endParaRPr lang="es-CO" sz="1000" dirty="0"/>
+          </a:p>
+        </p:txBody>
+      </p:sp>
+      <p:pic>
+        <p:nvPicPr>
+          <p:cNvPr id="4" name="Imagen 3">
+            <a:extLst>
+              <a:ext uri="{FF2B5EF4-FFF2-40B4-BE49-F238E27FC236}">
+                <a16:creationId xmlns:a16="http://schemas.microsoft.com/office/drawing/2014/main" id="{C6857754-2E0D-4D12-A2BD-4E8B609C72BC}"/>
+              </a:ext>
+            </a:extLst>
+          </p:cNvPr>
+          <p:cNvPicPr>
+            <a:picLocks noChangeAspect="1"/>
+          </p:cNvPicPr>
           <p:nvPr/>
         </p:nvPicPr>
         <p:blipFill>
@@ -12765,65 +12818,14 @@
         </p:blipFill>
         <p:spPr>
           <a:xfrm>
-            <a:off x="2467992" y="1793289"/>
-            <a:ext cx="4563124" cy="4625266"/>
+            <a:off x="2505053" y="1808491"/>
+            <a:ext cx="4676982" cy="4629419"/>
           </a:xfrm>
           <a:prstGeom prst="rect">
             <a:avLst/>
           </a:prstGeom>
         </p:spPr>
       </p:pic>
-      <p:sp>
-        <p:nvSpPr>
-          <p:cNvPr id="7" name="CuadroTexto 6">
-            <a:extLst>
-              <a:ext uri="{FF2B5EF4-FFF2-40B4-BE49-F238E27FC236}">
-                <a16:creationId xmlns:a16="http://schemas.microsoft.com/office/drawing/2014/main" id="{1A7C1F12-4EF5-4B37-BC5B-544EA503C799}"/>
-              </a:ext>
-            </a:extLst>
-          </p:cNvPr>
-          <p:cNvSpPr txBox="1"/>
-          <p:nvPr/>
-        </p:nvSpPr>
-        <p:spPr>
-          <a:xfrm>
-            <a:off x="124287" y="6582484"/>
-            <a:ext cx="8457765" cy="400110"/>
-          </a:xfrm>
-          <a:prstGeom prst="rect">
-            <a:avLst/>
-          </a:prstGeom>
-          <a:noFill/>
-        </p:spPr>
-        <p:txBody>
-          <a:bodyPr wrap="square" rtlCol="0">
-            <a:spAutoFit/>
-          </a:bodyPr>
-          <a:lstStyle/>
-          <a:p>
-            <a:r>
-              <a:rPr lang="en-US" sz="1000" i="1" dirty="0"/>
-              <a:t>Nota: </a:t>
-            </a:r>
-            <a:r>
-              <a:rPr lang="en-US" sz="1000" dirty="0"/>
-              <a:t>ISO/IEC. (2011). </a:t>
-            </a:r>
-            <a:r>
-              <a:rPr lang="en-US" sz="1000" i="1" dirty="0"/>
-              <a:t>Software engineering - Lifecycle profiles for Very Small Entities (VSEs) Part 5-1-2: Management and engineering guide: Generic profile group: Basic profile</a:t>
-            </a:r>
-            <a:r>
-              <a:rPr lang="en-US" sz="1000" dirty="0"/>
-              <a:t>.</a:t>
-            </a:r>
-            <a:endParaRPr lang="es-CO" sz="1000" dirty="0"/>
-          </a:p>
-          <a:p>
-            <a:endParaRPr lang="es-CO" sz="1000" dirty="0"/>
-          </a:p>
-        </p:txBody>
-      </p:sp>
     </p:spTree>
     <p:extLst>
       <p:ext uri="{BB962C8B-B14F-4D97-AF65-F5344CB8AC3E}">
@@ -13245,153 +13247,55 @@
                 <a:latin typeface="Arial" panose="020B0604020202020204" pitchFamily="34" charset="0"/>
                 <a:cs typeface="Arial" panose="020B0604020202020204" pitchFamily="34" charset="0"/>
               </a:rPr>
-              <a:t>Análisis de requerimientos CU, proto, </a:t>
-            </a:r>
-            <a:r>
-              <a:rPr lang="es-CO" sz="2000" dirty="0" err="1">
-                <a:latin typeface="Arial" panose="020B0604020202020204" pitchFamily="34" charset="0"/>
-                <a:cs typeface="Arial" panose="020B0604020202020204" pitchFamily="34" charset="0"/>
-              </a:rPr>
-              <a:t>levant</a:t>
-            </a:r>
+              <a:t>Análisis de requerimientos.</a:t>
+            </a:r>
+          </a:p>
+          <a:p>
+            <a:pPr marL="457200" indent="-457200">
+              <a:buAutoNum type="arabicPeriod"/>
+            </a:pPr>
             <a:r>
               <a:rPr lang="es-CO" sz="2000" dirty="0">
                 <a:latin typeface="Arial" panose="020B0604020202020204" pitchFamily="34" charset="0"/>
                 <a:cs typeface="Arial" panose="020B0604020202020204" pitchFamily="34" charset="0"/>
               </a:rPr>
-              <a:t> </a:t>
-            </a:r>
-            <a:r>
-              <a:rPr lang="es-CO" sz="2000" dirty="0" err="1">
+              <a:t>Análisis y diseño preliminar.</a:t>
+            </a:r>
+          </a:p>
+          <a:p>
+            <a:pPr marL="457200" indent="-457200">
+              <a:buAutoNum type="arabicPeriod"/>
+            </a:pPr>
+            <a:r>
+              <a:rPr lang="es-CO" sz="2000" dirty="0">
                 <a:latin typeface="Arial" panose="020B0604020202020204" pitchFamily="34" charset="0"/>
                 <a:cs typeface="Arial" panose="020B0604020202020204" pitchFamily="34" charset="0"/>
               </a:rPr>
-              <a:t>requ</a:t>
+              <a:t>Diseño detallado.</a:t>
+            </a:r>
+          </a:p>
+          <a:p>
+            <a:pPr marL="457200" indent="-457200">
+              <a:buAutoNum type="arabicPeriod"/>
+            </a:pPr>
+            <a:r>
+              <a:rPr lang="es-CO" sz="2000" dirty="0">
+                <a:latin typeface="Arial" panose="020B0604020202020204" pitchFamily="34" charset="0"/>
+                <a:cs typeface="Arial" panose="020B0604020202020204" pitchFamily="34" charset="0"/>
+              </a:rPr>
+              <a:t>Implementación (Rosenberg &amp; Scott, 2001, p. </a:t>
+            </a:r>
+            <a:r>
+              <a:rPr lang="es-CO" sz="2000">
+                <a:latin typeface="Arial" panose="020B0604020202020204" pitchFamily="34" charset="0"/>
+                <a:cs typeface="Arial" panose="020B0604020202020204" pitchFamily="34" charset="0"/>
+              </a:rPr>
+              <a:t>23).</a:t>
             </a:r>
             <a:endParaRPr lang="es-CO" sz="2000" dirty="0">
               <a:latin typeface="Arial" panose="020B0604020202020204" pitchFamily="34" charset="0"/>
               <a:cs typeface="Arial" panose="020B0604020202020204" pitchFamily="34" charset="0"/>
             </a:endParaRPr>
-          </a:p>
-          <a:p>
-            <a:pPr marL="457200" indent="-457200">
-              <a:buAutoNum type="arabicPeriod"/>
-            </a:pPr>
-            <a:r>
-              <a:rPr lang="es-CO" sz="2000" dirty="0">
-                <a:latin typeface="Arial" panose="020B0604020202020204" pitchFamily="34" charset="0"/>
-                <a:cs typeface="Arial" panose="020B0604020202020204" pitchFamily="34" charset="0"/>
-              </a:rPr>
-              <a:t>Análisis y diseño preliminar diagrama clases, robustez</a:t>
-            </a:r>
-          </a:p>
-          <a:p>
-            <a:pPr marL="457200" indent="-457200">
-              <a:buAutoNum type="arabicPeriod"/>
-            </a:pPr>
-            <a:r>
-              <a:rPr lang="es-CO" sz="2000" dirty="0">
-                <a:latin typeface="Arial" panose="020B0604020202020204" pitchFamily="34" charset="0"/>
-                <a:cs typeface="Arial" panose="020B0604020202020204" pitchFamily="34" charset="0"/>
-              </a:rPr>
-              <a:t>Diseño detallado </a:t>
-            </a:r>
-            <a:r>
-              <a:rPr lang="es-CO" sz="2000" dirty="0" err="1">
-                <a:latin typeface="Arial" panose="020B0604020202020204" pitchFamily="34" charset="0"/>
-                <a:cs typeface="Arial" panose="020B0604020202020204" pitchFamily="34" charset="0"/>
-              </a:rPr>
-              <a:t>diagram</a:t>
-            </a:r>
-            <a:r>
-              <a:rPr lang="es-CO" sz="2000" dirty="0">
-                <a:latin typeface="Arial" panose="020B0604020202020204" pitchFamily="34" charset="0"/>
-                <a:cs typeface="Arial" panose="020B0604020202020204" pitchFamily="34" charset="0"/>
-              </a:rPr>
-              <a:t> </a:t>
-            </a:r>
-            <a:r>
-              <a:rPr lang="es-CO" sz="2000" dirty="0" err="1">
-                <a:latin typeface="Arial" panose="020B0604020202020204" pitchFamily="34" charset="0"/>
-                <a:cs typeface="Arial" panose="020B0604020202020204" pitchFamily="34" charset="0"/>
-              </a:rPr>
-              <a:t>sec</a:t>
-            </a:r>
-            <a:r>
-              <a:rPr lang="es-CO" sz="2000" dirty="0">
-                <a:latin typeface="Arial" panose="020B0604020202020204" pitchFamily="34" charset="0"/>
-                <a:cs typeface="Arial" panose="020B0604020202020204" pitchFamily="34" charset="0"/>
-              </a:rPr>
-              <a:t>, ultimar </a:t>
-            </a:r>
-            <a:r>
-              <a:rPr lang="es-CO" sz="2000" dirty="0" err="1">
-                <a:latin typeface="Arial" panose="020B0604020202020204" pitchFamily="34" charset="0"/>
-                <a:cs typeface="Arial" panose="020B0604020202020204" pitchFamily="34" charset="0"/>
-              </a:rPr>
-              <a:t>detall</a:t>
-            </a:r>
-            <a:r>
-              <a:rPr lang="es-CO" sz="2000" dirty="0">
-                <a:latin typeface="Arial" panose="020B0604020202020204" pitchFamily="34" charset="0"/>
-                <a:cs typeface="Arial" panose="020B0604020202020204" pitchFamily="34" charset="0"/>
-              </a:rPr>
-              <a:t> </a:t>
-            </a:r>
-            <a:r>
-              <a:rPr lang="es-CO" sz="2000" dirty="0" err="1">
-                <a:latin typeface="Arial" panose="020B0604020202020204" pitchFamily="34" charset="0"/>
-                <a:cs typeface="Arial" panose="020B0604020202020204" pitchFamily="34" charset="0"/>
-              </a:rPr>
-              <a:t>dia</a:t>
-            </a:r>
-            <a:r>
-              <a:rPr lang="es-CO" sz="2000" dirty="0">
-                <a:latin typeface="Arial" panose="020B0604020202020204" pitchFamily="34" charset="0"/>
-                <a:cs typeface="Arial" panose="020B0604020202020204" pitchFamily="34" charset="0"/>
-              </a:rPr>
-              <a:t> clases</a:t>
-            </a:r>
-          </a:p>
-          <a:p>
-            <a:pPr marL="457200" indent="-457200">
-              <a:buAutoNum type="arabicPeriod"/>
-            </a:pPr>
-            <a:r>
-              <a:rPr lang="es-CO" sz="2000" dirty="0">
-                <a:latin typeface="Arial" panose="020B0604020202020204" pitchFamily="34" charset="0"/>
-                <a:cs typeface="Arial" panose="020B0604020202020204" pitchFamily="34" charset="0"/>
-              </a:rPr>
-              <a:t>Implementación escribe código, pruebas unitarias y pruebas de </a:t>
-            </a:r>
-            <a:r>
-              <a:rPr lang="es-CO" sz="2000" dirty="0" err="1">
-                <a:latin typeface="Arial" panose="020B0604020202020204" pitchFamily="34" charset="0"/>
-                <a:cs typeface="Arial" panose="020B0604020202020204" pitchFamily="34" charset="0"/>
-              </a:rPr>
-              <a:t>aceptac</a:t>
-            </a:r>
-            <a:r>
-              <a:rPr lang="es-CO" sz="2000" dirty="0">
-                <a:latin typeface="Arial" panose="020B0604020202020204" pitchFamily="34" charset="0"/>
-                <a:cs typeface="Arial" panose="020B0604020202020204" pitchFamily="34" charset="0"/>
-              </a:rPr>
-              <a:t> del </a:t>
-            </a:r>
-            <a:r>
-              <a:rPr lang="es-CO" sz="2000" dirty="0" err="1">
-                <a:latin typeface="Arial" panose="020B0604020202020204" pitchFamily="34" charset="0"/>
-                <a:cs typeface="Arial" panose="020B0604020202020204" pitchFamily="34" charset="0"/>
-              </a:rPr>
-              <a:t>user</a:t>
-            </a:r>
-            <a:r>
-              <a:rPr lang="es-CO" sz="2000" dirty="0">
-                <a:latin typeface="Arial" panose="020B0604020202020204" pitchFamily="34" charset="0"/>
-                <a:cs typeface="Arial" panose="020B0604020202020204" pitchFamily="34" charset="0"/>
-              </a:rPr>
-              <a:t> (Rosenberg &amp; Scott, 2001, p. 23)</a:t>
-            </a:r>
           </a:p>
           <a:p>
             <a:pPr marL="0" indent="0">
@@ -14497,7 +14401,7 @@
         </p:spPr>
         <p:txBody>
           <a:bodyPr>
-            <a:normAutofit fontScale="90000"/>
+            <a:normAutofit/>
           </a:bodyPr>
           <a:lstStyle/>
           <a:p>
@@ -14509,7 +14413,7 @@
                 <a:latin typeface="Arial" panose="020B0604020202020204" pitchFamily="34" charset="0"/>
                 <a:cs typeface="Arial" panose="020B0604020202020204" pitchFamily="34" charset="0"/>
               </a:rPr>
-              <a:t>Desarrollo (5/9) – Resultados de la verificación</a:t>
+              <a:t>Desarrollo (5/9) – Acta de reunión</a:t>
             </a:r>
             <a:endParaRPr lang="es-ES" sz="2500" b="1" dirty="0">
               <a:solidFill>

</xml_diff>

<commit_message>
Diapositivas para la sustentación
</commit_message>
<xml_diff>
--- a/Documento(s) de proyecto de grado/Presentación del proyecto de grado.pptx
+++ b/Documento(s) de proyecto de grado/Presentación del proyecto de grado.pptx
@@ -4211,7 +4211,7 @@
           <a:p>
             <a:fld id="{CF2D75CD-27F5-9C40-BF98-62796332CDBF}" type="datetimeFigureOut">
               <a:rPr lang="es-ES" smtClean="0"/>
-              <a:t>07/09/2020</a:t>
+              <a:t>08/09/2020</a:t>
             </a:fld>
             <a:endParaRPr lang="es-ES"/>
           </a:p>
@@ -4610,7 +4610,7 @@
           <a:p>
             <a:fld id="{E36FCCCF-5A9A-4876-93B5-B07C4A7CF72D}" type="datetimeFigureOut">
               <a:rPr lang="es-CO" smtClean="0"/>
-              <a:t>7/09/2020</a:t>
+              <a:t>8/09/2020</a:t>
             </a:fld>
             <a:endParaRPr lang="es-CO"/>
           </a:p>
@@ -4780,7 +4780,7 @@
           <a:p>
             <a:fld id="{E36FCCCF-5A9A-4876-93B5-B07C4A7CF72D}" type="datetimeFigureOut">
               <a:rPr lang="es-CO" smtClean="0"/>
-              <a:t>7/09/2020</a:t>
+              <a:t>8/09/2020</a:t>
             </a:fld>
             <a:endParaRPr lang="es-CO"/>
           </a:p>
@@ -4960,7 +4960,7 @@
           <a:p>
             <a:fld id="{E36FCCCF-5A9A-4876-93B5-B07C4A7CF72D}" type="datetimeFigureOut">
               <a:rPr lang="es-CO" smtClean="0"/>
-              <a:t>7/09/2020</a:t>
+              <a:t>8/09/2020</a:t>
             </a:fld>
             <a:endParaRPr lang="es-CO"/>
           </a:p>
@@ -5168,7 +5168,7 @@
               <a:pPr>
                 <a:defRPr/>
               </a:pPr>
-              <a:t>7/09/2020</a:t>
+              <a:t>8/09/2020</a:t>
             </a:fld>
             <a:endParaRPr lang="es-CO" dirty="0"/>
           </a:p>
@@ -5378,7 +5378,7 @@
               <a:pPr>
                 <a:defRPr/>
               </a:pPr>
-              <a:t>7/09/2020</a:t>
+              <a:t>8/09/2020</a:t>
             </a:fld>
             <a:endParaRPr lang="es-CO" dirty="0"/>
           </a:p>
@@ -5662,7 +5662,7 @@
               <a:pPr>
                 <a:defRPr/>
               </a:pPr>
-              <a:t>7/09/2020</a:t>
+              <a:t>8/09/2020</a:t>
             </a:fld>
             <a:endParaRPr lang="es-CO" dirty="0"/>
           </a:p>
@@ -5934,7 +5934,7 @@
               <a:pPr>
                 <a:defRPr/>
               </a:pPr>
-              <a:t>7/09/2020</a:t>
+              <a:t>8/09/2020</a:t>
             </a:fld>
             <a:endParaRPr lang="es-CO" dirty="0"/>
           </a:p>
@@ -6341,7 +6341,7 @@
               <a:pPr>
                 <a:defRPr/>
               </a:pPr>
-              <a:t>7/09/2020</a:t>
+              <a:t>8/09/2020</a:t>
             </a:fld>
             <a:endParaRPr lang="es-CO" dirty="0"/>
           </a:p>
@@ -6499,7 +6499,7 @@
               <a:pPr>
                 <a:defRPr/>
               </a:pPr>
-              <a:t>7/09/2020</a:t>
+              <a:t>8/09/2020</a:t>
             </a:fld>
             <a:endParaRPr lang="es-CO" dirty="0"/>
           </a:p>
@@ -6634,7 +6634,7 @@
               <a:pPr>
                 <a:defRPr/>
               </a:pPr>
-              <a:t>7/09/2020</a:t>
+              <a:t>8/09/2020</a:t>
             </a:fld>
             <a:endParaRPr lang="es-CO" dirty="0"/>
           </a:p>
@@ -6951,7 +6951,7 @@
               <a:pPr>
                 <a:defRPr/>
               </a:pPr>
-              <a:t>7/09/2020</a:t>
+              <a:t>8/09/2020</a:t>
             </a:fld>
             <a:endParaRPr lang="es-CO" dirty="0"/>
           </a:p>
@@ -7145,7 +7145,7 @@
           <a:p>
             <a:fld id="{E36FCCCF-5A9A-4876-93B5-B07C4A7CF72D}" type="datetimeFigureOut">
               <a:rPr lang="es-CO" smtClean="0"/>
-              <a:t>7/09/2020</a:t>
+              <a:t>8/09/2020</a:t>
             </a:fld>
             <a:endParaRPr lang="es-CO"/>
           </a:p>
@@ -7421,7 +7421,7 @@
               <a:pPr>
                 <a:defRPr/>
               </a:pPr>
-              <a:t>7/09/2020</a:t>
+              <a:t>8/09/2020</a:t>
             </a:fld>
             <a:endParaRPr lang="es-CO" dirty="0"/>
           </a:p>
@@ -7631,7 +7631,7 @@
               <a:pPr>
                 <a:defRPr/>
               </a:pPr>
-              <a:t>7/09/2020</a:t>
+              <a:t>8/09/2020</a:t>
             </a:fld>
             <a:endParaRPr lang="es-CO" dirty="0"/>
           </a:p>
@@ -7851,7 +7851,7 @@
               <a:pPr>
                 <a:defRPr/>
               </a:pPr>
-              <a:t>7/09/2020</a:t>
+              <a:t>8/09/2020</a:t>
             </a:fld>
             <a:endParaRPr lang="es-CO" dirty="0"/>
           </a:p>
@@ -8119,7 +8119,7 @@
           <a:p>
             <a:fld id="{E36FCCCF-5A9A-4876-93B5-B07C4A7CF72D}" type="datetimeFigureOut">
               <a:rPr lang="es-CO" smtClean="0"/>
-              <a:t>7/09/2020</a:t>
+              <a:t>8/09/2020</a:t>
             </a:fld>
             <a:endParaRPr lang="es-CO"/>
           </a:p>
@@ -8351,7 +8351,7 @@
           <a:p>
             <a:fld id="{E36FCCCF-5A9A-4876-93B5-B07C4A7CF72D}" type="datetimeFigureOut">
               <a:rPr lang="es-CO" smtClean="0"/>
-              <a:t>7/09/2020</a:t>
+              <a:t>8/09/2020</a:t>
             </a:fld>
             <a:endParaRPr lang="es-CO"/>
           </a:p>
@@ -8718,7 +8718,7 @@
           <a:p>
             <a:fld id="{E36FCCCF-5A9A-4876-93B5-B07C4A7CF72D}" type="datetimeFigureOut">
               <a:rPr lang="es-CO" smtClean="0"/>
-              <a:t>7/09/2020</a:t>
+              <a:t>8/09/2020</a:t>
             </a:fld>
             <a:endParaRPr lang="es-CO"/>
           </a:p>
@@ -8836,7 +8836,7 @@
           <a:p>
             <a:fld id="{E36FCCCF-5A9A-4876-93B5-B07C4A7CF72D}" type="datetimeFigureOut">
               <a:rPr lang="es-CO" smtClean="0"/>
-              <a:t>7/09/2020</a:t>
+              <a:t>8/09/2020</a:t>
             </a:fld>
             <a:endParaRPr lang="es-CO"/>
           </a:p>
@@ -8931,7 +8931,7 @@
           <a:p>
             <a:fld id="{E36FCCCF-5A9A-4876-93B5-B07C4A7CF72D}" type="datetimeFigureOut">
               <a:rPr lang="es-CO" smtClean="0"/>
-              <a:t>7/09/2020</a:t>
+              <a:t>8/09/2020</a:t>
             </a:fld>
             <a:endParaRPr lang="es-CO"/>
           </a:p>
@@ -9208,7 +9208,7 @@
           <a:p>
             <a:fld id="{E36FCCCF-5A9A-4876-93B5-B07C4A7CF72D}" type="datetimeFigureOut">
               <a:rPr lang="es-CO" smtClean="0"/>
-              <a:t>7/09/2020</a:t>
+              <a:t>8/09/2020</a:t>
             </a:fld>
             <a:endParaRPr lang="es-CO"/>
           </a:p>
@@ -9465,7 +9465,7 @@
           <a:p>
             <a:fld id="{E36FCCCF-5A9A-4876-93B5-B07C4A7CF72D}" type="datetimeFigureOut">
               <a:rPr lang="es-CO" smtClean="0"/>
-              <a:t>7/09/2020</a:t>
+              <a:t>8/09/2020</a:t>
             </a:fld>
             <a:endParaRPr lang="es-CO"/>
           </a:p>
@@ -9678,7 +9678,7 @@
           <a:p>
             <a:fld id="{E36FCCCF-5A9A-4876-93B5-B07C4A7CF72D}" type="datetimeFigureOut">
               <a:rPr lang="es-CO" smtClean="0"/>
-              <a:t>7/09/2020</a:t>
+              <a:t>8/09/2020</a:t>
             </a:fld>
             <a:endParaRPr lang="es-CO"/>
           </a:p>
@@ -10304,7 +10304,7 @@
               <a:pPr>
                 <a:defRPr/>
               </a:pPr>
-              <a:t>7/09/2020</a:t>
+              <a:t>8/09/2020</a:t>
             </a:fld>
             <a:endParaRPr lang="es-CO" dirty="0"/>
           </a:p>
@@ -11234,16 +11234,7 @@
                 <a:latin typeface="Arial" panose="020B0604020202020204" pitchFamily="34" charset="0"/>
                 <a:cs typeface="Arial" panose="020B0604020202020204" pitchFamily="34" charset="0"/>
               </a:rPr>
-              <a:t> (Very Small Enterprises (VSEs))”. </a:t>
-            </a:r>
-          </a:p>
-          <a:p>
-            <a:r>
-              <a:rPr lang="es-CO" sz="2000" dirty="0">
-                <a:latin typeface="Arial" panose="020B0604020202020204" pitchFamily="34" charset="0"/>
-                <a:cs typeface="Arial" panose="020B0604020202020204" pitchFamily="34" charset="0"/>
-              </a:rPr>
-              <a:t>La norma ha sido desarrollada para mejorar la calidad de los productos y/o servicios y el rendimiento de los procesos en pequeñas entidades de software que en el momento se encuentran aisladas de algunas actividades económicas, y de este modo contar con los mismos niveles de competitividad en el mercado que las grandes industrias. (ISO/IEC, 2011, p. vi)</a:t>
+              <a:t> (Very Small Enterprises (VSEs))”(ISO/IEC, 2011, p. vi).</a:t>
             </a:r>
           </a:p>
         </p:txBody>
@@ -11270,7 +11261,7 @@
         </p:blipFill>
         <p:spPr>
           <a:xfrm>
-            <a:off x="2846229" y="4802819"/>
+            <a:off x="2846229" y="3429000"/>
             <a:ext cx="3451542" cy="1725771"/>
           </a:xfrm>
           <a:prstGeom prst="rect">

</xml_diff>

<commit_message>
Cambios en presentaciones de eventos
**Diapositivas ECE2I 2019**

Se incluyeron las numeraciones a los títulos de acuerdo a la tabla de contenido.

**Diapositivas ECE2I 2020**

Se pulieron las diapositivas y fueron finalizadas para su presentación el 20 de septiembre.
</commit_message>
<xml_diff>
--- a/Documento(s) de proyecto de grado/Presentación del proyecto de grado.pptx
+++ b/Documento(s) de proyecto de grado/Presentación del proyecto de grado.pptx
@@ -4211,7 +4211,7 @@
           <a:p>
             <a:fld id="{CF2D75CD-27F5-9C40-BF98-62796332CDBF}" type="datetimeFigureOut">
               <a:rPr lang="es-ES" smtClean="0"/>
-              <a:t>08/09/2020</a:t>
+              <a:t>21/09/2020</a:t>
             </a:fld>
             <a:endParaRPr lang="es-ES"/>
           </a:p>
@@ -4610,7 +4610,7 @@
           <a:p>
             <a:fld id="{E36FCCCF-5A9A-4876-93B5-B07C4A7CF72D}" type="datetimeFigureOut">
               <a:rPr lang="es-CO" smtClean="0"/>
-              <a:t>8/09/2020</a:t>
+              <a:t>21/09/2020</a:t>
             </a:fld>
             <a:endParaRPr lang="es-CO"/>
           </a:p>
@@ -4780,7 +4780,7 @@
           <a:p>
             <a:fld id="{E36FCCCF-5A9A-4876-93B5-B07C4A7CF72D}" type="datetimeFigureOut">
               <a:rPr lang="es-CO" smtClean="0"/>
-              <a:t>8/09/2020</a:t>
+              <a:t>21/09/2020</a:t>
             </a:fld>
             <a:endParaRPr lang="es-CO"/>
           </a:p>
@@ -4960,7 +4960,7 @@
           <a:p>
             <a:fld id="{E36FCCCF-5A9A-4876-93B5-B07C4A7CF72D}" type="datetimeFigureOut">
               <a:rPr lang="es-CO" smtClean="0"/>
-              <a:t>8/09/2020</a:t>
+              <a:t>21/09/2020</a:t>
             </a:fld>
             <a:endParaRPr lang="es-CO"/>
           </a:p>
@@ -5168,7 +5168,7 @@
               <a:pPr>
                 <a:defRPr/>
               </a:pPr>
-              <a:t>8/09/2020</a:t>
+              <a:t>21/09/2020</a:t>
             </a:fld>
             <a:endParaRPr lang="es-CO" dirty="0"/>
           </a:p>
@@ -5378,7 +5378,7 @@
               <a:pPr>
                 <a:defRPr/>
               </a:pPr>
-              <a:t>8/09/2020</a:t>
+              <a:t>21/09/2020</a:t>
             </a:fld>
             <a:endParaRPr lang="es-CO" dirty="0"/>
           </a:p>
@@ -5662,7 +5662,7 @@
               <a:pPr>
                 <a:defRPr/>
               </a:pPr>
-              <a:t>8/09/2020</a:t>
+              <a:t>21/09/2020</a:t>
             </a:fld>
             <a:endParaRPr lang="es-CO" dirty="0"/>
           </a:p>
@@ -5934,7 +5934,7 @@
               <a:pPr>
                 <a:defRPr/>
               </a:pPr>
-              <a:t>8/09/2020</a:t>
+              <a:t>21/09/2020</a:t>
             </a:fld>
             <a:endParaRPr lang="es-CO" dirty="0"/>
           </a:p>
@@ -6341,7 +6341,7 @@
               <a:pPr>
                 <a:defRPr/>
               </a:pPr>
-              <a:t>8/09/2020</a:t>
+              <a:t>21/09/2020</a:t>
             </a:fld>
             <a:endParaRPr lang="es-CO" dirty="0"/>
           </a:p>
@@ -6499,7 +6499,7 @@
               <a:pPr>
                 <a:defRPr/>
               </a:pPr>
-              <a:t>8/09/2020</a:t>
+              <a:t>21/09/2020</a:t>
             </a:fld>
             <a:endParaRPr lang="es-CO" dirty="0"/>
           </a:p>
@@ -6634,7 +6634,7 @@
               <a:pPr>
                 <a:defRPr/>
               </a:pPr>
-              <a:t>8/09/2020</a:t>
+              <a:t>21/09/2020</a:t>
             </a:fld>
             <a:endParaRPr lang="es-CO" dirty="0"/>
           </a:p>
@@ -6951,7 +6951,7 @@
               <a:pPr>
                 <a:defRPr/>
               </a:pPr>
-              <a:t>8/09/2020</a:t>
+              <a:t>21/09/2020</a:t>
             </a:fld>
             <a:endParaRPr lang="es-CO" dirty="0"/>
           </a:p>
@@ -7145,7 +7145,7 @@
           <a:p>
             <a:fld id="{E36FCCCF-5A9A-4876-93B5-B07C4A7CF72D}" type="datetimeFigureOut">
               <a:rPr lang="es-CO" smtClean="0"/>
-              <a:t>8/09/2020</a:t>
+              <a:t>21/09/2020</a:t>
             </a:fld>
             <a:endParaRPr lang="es-CO"/>
           </a:p>
@@ -7421,7 +7421,7 @@
               <a:pPr>
                 <a:defRPr/>
               </a:pPr>
-              <a:t>8/09/2020</a:t>
+              <a:t>21/09/2020</a:t>
             </a:fld>
             <a:endParaRPr lang="es-CO" dirty="0"/>
           </a:p>
@@ -7631,7 +7631,7 @@
               <a:pPr>
                 <a:defRPr/>
               </a:pPr>
-              <a:t>8/09/2020</a:t>
+              <a:t>21/09/2020</a:t>
             </a:fld>
             <a:endParaRPr lang="es-CO" dirty="0"/>
           </a:p>
@@ -7851,7 +7851,7 @@
               <a:pPr>
                 <a:defRPr/>
               </a:pPr>
-              <a:t>8/09/2020</a:t>
+              <a:t>21/09/2020</a:t>
             </a:fld>
             <a:endParaRPr lang="es-CO" dirty="0"/>
           </a:p>
@@ -8119,7 +8119,7 @@
           <a:p>
             <a:fld id="{E36FCCCF-5A9A-4876-93B5-B07C4A7CF72D}" type="datetimeFigureOut">
               <a:rPr lang="es-CO" smtClean="0"/>
-              <a:t>8/09/2020</a:t>
+              <a:t>21/09/2020</a:t>
             </a:fld>
             <a:endParaRPr lang="es-CO"/>
           </a:p>
@@ -8351,7 +8351,7 @@
           <a:p>
             <a:fld id="{E36FCCCF-5A9A-4876-93B5-B07C4A7CF72D}" type="datetimeFigureOut">
               <a:rPr lang="es-CO" smtClean="0"/>
-              <a:t>8/09/2020</a:t>
+              <a:t>21/09/2020</a:t>
             </a:fld>
             <a:endParaRPr lang="es-CO"/>
           </a:p>
@@ -8718,7 +8718,7 @@
           <a:p>
             <a:fld id="{E36FCCCF-5A9A-4876-93B5-B07C4A7CF72D}" type="datetimeFigureOut">
               <a:rPr lang="es-CO" smtClean="0"/>
-              <a:t>8/09/2020</a:t>
+              <a:t>21/09/2020</a:t>
             </a:fld>
             <a:endParaRPr lang="es-CO"/>
           </a:p>
@@ -8836,7 +8836,7 @@
           <a:p>
             <a:fld id="{E36FCCCF-5A9A-4876-93B5-B07C4A7CF72D}" type="datetimeFigureOut">
               <a:rPr lang="es-CO" smtClean="0"/>
-              <a:t>8/09/2020</a:t>
+              <a:t>21/09/2020</a:t>
             </a:fld>
             <a:endParaRPr lang="es-CO"/>
           </a:p>
@@ -8931,7 +8931,7 @@
           <a:p>
             <a:fld id="{E36FCCCF-5A9A-4876-93B5-B07C4A7CF72D}" type="datetimeFigureOut">
               <a:rPr lang="es-CO" smtClean="0"/>
-              <a:t>8/09/2020</a:t>
+              <a:t>21/09/2020</a:t>
             </a:fld>
             <a:endParaRPr lang="es-CO"/>
           </a:p>
@@ -9208,7 +9208,7 @@
           <a:p>
             <a:fld id="{E36FCCCF-5A9A-4876-93B5-B07C4A7CF72D}" type="datetimeFigureOut">
               <a:rPr lang="es-CO" smtClean="0"/>
-              <a:t>8/09/2020</a:t>
+              <a:t>21/09/2020</a:t>
             </a:fld>
             <a:endParaRPr lang="es-CO"/>
           </a:p>
@@ -9465,7 +9465,7 @@
           <a:p>
             <a:fld id="{E36FCCCF-5A9A-4876-93B5-B07C4A7CF72D}" type="datetimeFigureOut">
               <a:rPr lang="es-CO" smtClean="0"/>
-              <a:t>8/09/2020</a:t>
+              <a:t>21/09/2020</a:t>
             </a:fld>
             <a:endParaRPr lang="es-CO"/>
           </a:p>
@@ -9678,7 +9678,7 @@
           <a:p>
             <a:fld id="{E36FCCCF-5A9A-4876-93B5-B07C4A7CF72D}" type="datetimeFigureOut">
               <a:rPr lang="es-CO" smtClean="0"/>
-              <a:t>8/09/2020</a:t>
+              <a:t>21/09/2020</a:t>
             </a:fld>
             <a:endParaRPr lang="es-CO"/>
           </a:p>
@@ -10304,7 +10304,7 @@
               <a:pPr>
                 <a:defRPr/>
               </a:pPr>
-              <a:t>8/09/2020</a:t>
+              <a:t>21/09/2020</a:t>
             </a:fld>
             <a:endParaRPr lang="es-CO" dirty="0"/>
           </a:p>
@@ -10979,7 +10979,7 @@
                 <a:latin typeface="Arial" panose="020B0604020202020204" pitchFamily="34" charset="0"/>
                 <a:cs typeface="Arial" panose="020B0604020202020204" pitchFamily="34" charset="0"/>
               </a:rPr>
-              <a:t>Objetivos específicos</a:t>
+              <a:t>6. Objetivos específicos</a:t>
             </a:r>
           </a:p>
         </p:txBody>
@@ -11011,7 +11011,7 @@
         </p:blipFill>
         <p:spPr bwMode="auto">
           <a:xfrm>
-            <a:off x="6717129" y="3114542"/>
+            <a:off x="6708251" y="3123420"/>
             <a:ext cx="1405062" cy="1360004"/>
           </a:xfrm>
           <a:prstGeom prst="rect">
@@ -11162,7 +11162,7 @@
                 <a:latin typeface="Arial" panose="020B0604020202020204" pitchFamily="34" charset="0"/>
                 <a:cs typeface="Arial" panose="020B0604020202020204" pitchFamily="34" charset="0"/>
               </a:rPr>
-              <a:t>Marco teórico (1/6) </a:t>
+              <a:t>7. Marco teórico (1/6) </a:t>
             </a:r>
             <a:r>
               <a:rPr lang="es-ES" sz="2500" b="1" dirty="0">
@@ -11340,7 +11340,7 @@
                 <a:latin typeface="Arial" panose="020B0604020202020204" pitchFamily="34" charset="0"/>
                 <a:cs typeface="Arial" panose="020B0604020202020204" pitchFamily="34" charset="0"/>
               </a:rPr>
-              <a:t>Marco teórico (2/6</a:t>
+              <a:t>7. Marco teórico (2/6</a:t>
             </a:r>
             <a:r>
               <a:rPr lang="es-ES" sz="2500" b="1" dirty="0">
@@ -12514,7 +12514,7 @@
                 <a:latin typeface="Arial" panose="020B0604020202020204" pitchFamily="34" charset="0"/>
                 <a:cs typeface="Arial" panose="020B0604020202020204" pitchFamily="34" charset="0"/>
               </a:rPr>
-              <a:t>Marco teórico (3/6)</a:t>
+              <a:t>7. Marco teórico (3/6)</a:t>
             </a:r>
             <a:endParaRPr lang="es-ES" sz="2500" b="1" dirty="0">
               <a:solidFill>
@@ -12663,7 +12663,7 @@
                 <a:latin typeface="Arial" panose="020B0604020202020204" pitchFamily="34" charset="0"/>
                 <a:cs typeface="Arial" panose="020B0604020202020204" pitchFamily="34" charset="0"/>
               </a:rPr>
-              <a:t>Marco teórico (4/6)</a:t>
+              <a:t>7. Marco teórico (4/6)</a:t>
             </a:r>
             <a:endParaRPr lang="es-ES" sz="2500" b="1" dirty="0">
               <a:solidFill>
@@ -12888,7 +12888,7 @@
                 <a:latin typeface="Arial" panose="020B0604020202020204" pitchFamily="34" charset="0"/>
                 <a:cs typeface="Arial" panose="020B0604020202020204" pitchFamily="34" charset="0"/>
               </a:rPr>
-              <a:t>Marco teórico (5/6) </a:t>
+              <a:t>7. Marco teórico (5/6) </a:t>
             </a:r>
             <a:r>
               <a:rPr lang="es-ES" sz="2500" b="1" dirty="0">
@@ -13181,7 +13181,7 @@
                 <a:latin typeface="Arial" panose="020B0604020202020204" pitchFamily="34" charset="0"/>
                 <a:cs typeface="Arial" panose="020B0604020202020204" pitchFamily="34" charset="0"/>
               </a:rPr>
-              <a:t>Marco teórico (6/6) </a:t>
+              <a:t>7. Marco teórico (6/6) </a:t>
             </a:r>
             <a:r>
               <a:rPr lang="es-ES" sz="2500" b="1" dirty="0">
@@ -13352,13 +13352,13 @@
         </p:nvSpPr>
         <p:spPr>
           <a:xfrm>
-            <a:off x="2022591" y="589612"/>
-            <a:ext cx="2469510" cy="768477"/>
+            <a:off x="2022590" y="589612"/>
+            <a:ext cx="3836672" cy="768477"/>
           </a:xfrm>
         </p:spPr>
         <p:txBody>
           <a:bodyPr>
-            <a:normAutofit fontScale="90000"/>
+            <a:normAutofit/>
           </a:bodyPr>
           <a:lstStyle/>
           <a:p>
@@ -13370,7 +13370,7 @@
                 <a:latin typeface="Arial" panose="020B0604020202020204" pitchFamily="34" charset="0"/>
                 <a:cs typeface="Arial" panose="020B0604020202020204" pitchFamily="34" charset="0"/>
               </a:rPr>
-              <a:t>Desarrollo (1/9)</a:t>
+              <a:t>8. Desarrollo (1/9)</a:t>
             </a:r>
             <a:endParaRPr lang="es-ES" sz="2500" b="1" dirty="0">
               <a:solidFill>
@@ -13475,7 +13475,7 @@
         </p:nvSpPr>
         <p:spPr>
           <a:xfrm>
-            <a:off x="106531" y="6268388"/>
+            <a:off x="106531" y="6277266"/>
             <a:ext cx="7457491" cy="246221"/>
           </a:xfrm>
           <a:prstGeom prst="rect">
@@ -13579,7 +13579,7 @@
                 <a:latin typeface="Arial" panose="020B0604020202020204" pitchFamily="34" charset="0"/>
                 <a:cs typeface="Arial" panose="020B0604020202020204" pitchFamily="34" charset="0"/>
               </a:rPr>
-              <a:t>Desarrollo (2/9) – Plan del proyecto</a:t>
+              <a:t>8. Desarrollo (2/9) – Plan del proyecto</a:t>
             </a:r>
             <a:endParaRPr lang="es-ES" sz="2500" b="1" dirty="0">
               <a:solidFill>
@@ -13747,12 +13747,12 @@
         <p:spPr>
           <a:xfrm>
             <a:off x="2022591" y="589612"/>
-            <a:ext cx="6848788" cy="768477"/>
+            <a:ext cx="6988244" cy="768477"/>
           </a:xfrm>
         </p:spPr>
         <p:txBody>
           <a:bodyPr>
-            <a:normAutofit/>
+            <a:noAutofit/>
           </a:bodyPr>
           <a:lstStyle/>
           <a:p>
@@ -13764,7 +13764,7 @@
                 <a:latin typeface="Arial" panose="020B0604020202020204" pitchFamily="34" charset="0"/>
                 <a:cs typeface="Arial" panose="020B0604020202020204" pitchFamily="34" charset="0"/>
               </a:rPr>
-              <a:t>Desarrollo (3/9) – Repositorio del proyecto</a:t>
+              <a:t>8. Desarrollo (3/9) – Repositorio del proyecto</a:t>
             </a:r>
             <a:endParaRPr lang="es-ES" sz="2500" b="1" dirty="0">
               <a:solidFill>
@@ -14222,8 +14222,8 @@
         </p:nvSpPr>
         <p:spPr>
           <a:xfrm>
-            <a:off x="2022591" y="589612"/>
-            <a:ext cx="6848788" cy="768477"/>
+            <a:off x="2022590" y="589612"/>
+            <a:ext cx="7005999" cy="768477"/>
           </a:xfrm>
         </p:spPr>
         <p:txBody>
@@ -14240,7 +14240,7 @@
                 <a:latin typeface="Arial" panose="020B0604020202020204" pitchFamily="34" charset="0"/>
                 <a:cs typeface="Arial" panose="020B0604020202020204" pitchFamily="34" charset="0"/>
               </a:rPr>
-              <a:t>Desarrollo (4/9) – Resultados de la verificación</a:t>
+              <a:t>8. Desarrollo (4/9) – Resultados de la verificación</a:t>
             </a:r>
             <a:endParaRPr lang="es-ES" sz="2500" b="1" dirty="0">
               <a:solidFill>
@@ -14404,7 +14404,7 @@
                 <a:latin typeface="Arial" panose="020B0604020202020204" pitchFamily="34" charset="0"/>
                 <a:cs typeface="Arial" panose="020B0604020202020204" pitchFamily="34" charset="0"/>
               </a:rPr>
-              <a:t>Desarrollo (5/9) – Acta de reunión</a:t>
+              <a:t>8. Desarrollo (5/9) – Acta de reunión</a:t>
             </a:r>
             <a:endParaRPr lang="es-ES" sz="2500" b="1" dirty="0">
               <a:solidFill>
@@ -14551,26 +14551,26 @@
         <p:spPr>
           <a:xfrm>
             <a:off x="2022590" y="589612"/>
-            <a:ext cx="7121409" cy="768477"/>
+            <a:ext cx="7121410" cy="768477"/>
           </a:xfrm>
         </p:spPr>
         <p:txBody>
           <a:bodyPr>
-            <a:normAutofit fontScale="90000"/>
+            <a:normAutofit/>
           </a:bodyPr>
           <a:lstStyle/>
           <a:p>
             <a:r>
-              <a:rPr lang="es-CO" sz="2500" b="1" dirty="0">
+              <a:rPr lang="es-CO" sz="2200" b="1" dirty="0">
                 <a:solidFill>
                   <a:schemeClr val="bg1"/>
                 </a:solidFill>
                 <a:latin typeface="Arial" panose="020B0604020202020204" pitchFamily="34" charset="0"/>
                 <a:cs typeface="Arial" panose="020B0604020202020204" pitchFamily="34" charset="0"/>
               </a:rPr>
-              <a:t>Desarrollo (6/9) – Registro de estado de progreso</a:t>
-            </a:r>
-            <a:endParaRPr lang="es-ES" sz="2500" b="1" dirty="0">
+              <a:t>8. Desarrollo (6/9) – Registro de estado de progreso</a:t>
+            </a:r>
+            <a:endParaRPr lang="es-ES" sz="2200" b="1" dirty="0">
               <a:solidFill>
                 <a:schemeClr val="bg1"/>
               </a:solidFill>
@@ -14732,7 +14732,7 @@
                 <a:latin typeface="Arial" panose="020B0604020202020204" pitchFamily="34" charset="0"/>
                 <a:cs typeface="Arial" panose="020B0604020202020204" pitchFamily="34" charset="0"/>
               </a:rPr>
-              <a:t>Desarrollo (7/9) – Solicitud de cambio</a:t>
+              <a:t>8. Desarrollo (7/9) – Solicitud de cambio</a:t>
             </a:r>
             <a:endParaRPr lang="es-ES" sz="2500" b="1" dirty="0">
               <a:solidFill>
@@ -14896,7 +14896,7 @@
                 <a:latin typeface="Arial" panose="020B0604020202020204" pitchFamily="34" charset="0"/>
                 <a:cs typeface="Arial" panose="020B0604020202020204" pitchFamily="34" charset="0"/>
               </a:rPr>
-              <a:t>Desarrollo (8/9) – Registro de corrección</a:t>
+              <a:t>8. Desarrollo (8/9) – Registro de corrección</a:t>
             </a:r>
             <a:endParaRPr lang="es-ES" sz="2500" b="1" dirty="0">
               <a:solidFill>
@@ -15060,7 +15060,7 @@
                 <a:latin typeface="Arial" panose="020B0604020202020204" pitchFamily="34" charset="0"/>
                 <a:cs typeface="Arial" panose="020B0604020202020204" pitchFamily="34" charset="0"/>
               </a:rPr>
-              <a:t>Desarrollo (9/9) – Registro de aceptación</a:t>
+              <a:t>8. Desarrollo (9/9) – Registro de aceptación</a:t>
             </a:r>
             <a:endParaRPr lang="es-ES" sz="2500" b="1" dirty="0">
               <a:solidFill>
@@ -15260,7 +15260,7 @@
                 <a:latin typeface="Arial" panose="020B0604020202020204" pitchFamily="34" charset="0"/>
                 <a:cs typeface="Arial" panose="020B0604020202020204" pitchFamily="34" charset="0"/>
               </a:rPr>
-              <a:t>Conclusiones</a:t>
+              <a:t>9. Conclusiones</a:t>
             </a:r>
             <a:endParaRPr lang="es-ES" sz="2500" b="1" dirty="0">
               <a:solidFill>
@@ -15405,7 +15405,7 @@
                 <a:latin typeface="Arial" panose="020B0604020202020204" pitchFamily="34" charset="0"/>
                 <a:cs typeface="Arial" panose="020B0604020202020204" pitchFamily="34" charset="0"/>
               </a:rPr>
-              <a:t>8. Bibliografía (1/2)</a:t>
+              <a:t>10. Bibliografía (1/2)</a:t>
             </a:r>
             <a:endParaRPr lang="es-ES" sz="2500" b="1" dirty="0">
               <a:solidFill>
@@ -15704,7 +15704,7 @@
                 <a:latin typeface="Arial" panose="020B0604020202020204" pitchFamily="34" charset="0"/>
                 <a:cs typeface="Arial" panose="020B0604020202020204" pitchFamily="34" charset="0"/>
               </a:rPr>
-              <a:t>8. Bibliografía (2/2)</a:t>
+              <a:t>10. Bibliografía (2/2)</a:t>
             </a:r>
             <a:endParaRPr lang="es-ES" sz="2500" b="1" dirty="0">
               <a:solidFill>
@@ -16003,15 +16003,7 @@
                 <a:cs typeface="Arial" panose="020B0604020202020204" pitchFamily="34" charset="0"/>
                 <a:hlinkClick r:id="rId8" action="ppaction://hlinksldjump"/>
               </a:rPr>
-              <a:t>6. </a:t>
-            </a:r>
-            <a:r>
-              <a:rPr lang="es-CO" sz="1800">
-                <a:latin typeface="Arial" panose="020B0604020202020204" pitchFamily="34" charset="0"/>
-                <a:cs typeface="Arial" panose="020B0604020202020204" pitchFamily="34" charset="0"/>
-                <a:hlinkClick r:id="rId8" action="ppaction://hlinksldjump"/>
-              </a:rPr>
-              <a:t>Objetivos específicos</a:t>
+              <a:t>6. Objetivos específicos</a:t>
             </a:r>
             <a:endParaRPr lang="es-CO" sz="1800" dirty="0">
               <a:latin typeface="Arial" panose="020B0604020202020204" pitchFamily="34" charset="0"/>
@@ -16305,7 +16297,7 @@
                 <a:latin typeface="Arial" panose="020B0604020202020204" pitchFamily="34" charset="0"/>
                 <a:cs typeface="Arial" panose="020B0604020202020204" pitchFamily="34" charset="0"/>
               </a:rPr>
-              <a:t>Introducción (1/2)</a:t>
+              <a:t>1. Introducción (1/2)</a:t>
             </a:r>
           </a:p>
         </p:txBody>
@@ -16475,7 +16467,7 @@
                 <a:latin typeface="Arial" panose="020B0604020202020204" pitchFamily="34" charset="0"/>
                 <a:cs typeface="Arial" panose="020B0604020202020204" pitchFamily="34" charset="0"/>
               </a:rPr>
-              <a:t>Introducción (2/2) </a:t>
+              <a:t>1. Introducción (2/2) </a:t>
             </a:r>
           </a:p>
         </p:txBody>
@@ -16594,7 +16586,7 @@
                 <a:latin typeface="Arial" panose="020B0604020202020204" pitchFamily="34" charset="0"/>
                 <a:cs typeface="Arial" panose="020B0604020202020204" pitchFamily="34" charset="0"/>
               </a:rPr>
-              <a:t>Planteamiento del problema</a:t>
+              <a:t>2. Planteamiento del problema</a:t>
             </a:r>
           </a:p>
         </p:txBody>
@@ -16671,7 +16663,7 @@
                 <a:latin typeface="Arial" panose="020B0604020202020204" pitchFamily="34" charset="0"/>
                 <a:cs typeface="Arial" panose="020B0604020202020204" pitchFamily="34" charset="0"/>
               </a:rPr>
-              <a:t>Formulación del problema</a:t>
+              <a:t>3. Formulación del problema</a:t>
             </a:r>
           </a:p>
         </p:txBody>
@@ -16813,7 +16805,7 @@
                 <a:latin typeface="Arial" panose="020B0604020202020204" pitchFamily="34" charset="0"/>
                 <a:cs typeface="Arial" panose="020B0604020202020204" pitchFamily="34" charset="0"/>
               </a:rPr>
-              <a:t>Sistematización del problema</a:t>
+              <a:t>4. Sistematización del problema</a:t>
             </a:r>
           </a:p>
         </p:txBody>
@@ -16990,7 +16982,7 @@
                 <a:latin typeface="Arial" panose="020B0604020202020204" pitchFamily="34" charset="0"/>
                 <a:cs typeface="Arial" panose="020B0604020202020204" pitchFamily="34" charset="0"/>
               </a:rPr>
-              <a:t>Objetivo general</a:t>
+              <a:t>5. Objetivo general</a:t>
             </a:r>
           </a:p>
         </p:txBody>

</xml_diff>